<commit_message>
Class Design.pptx // 전체 Class Design 작성 및 MainFrame, Frame2, UIUpdate 세부부분 작성
</commit_message>
<xml_diff>
--- a/doc/3_ 설계서/Class Design.pptx
+++ b/doc/3_ 설계서/Class Design.pptx
@@ -1,19 +1,22 @@
 
 <file path=ppt/presentation.xml><?xml version="1.0" encoding="utf-8"?>
-<p:presentation xmlns:a="http://schemas.openxmlformats.org/drawingml/2006/main" xmlns:r="http://schemas.openxmlformats.org/officeDocument/2006/relationships" xmlns:p="http://schemas.openxmlformats.org/presentationml/2006/main" showSpecialPlsOnTitleSld="0" strictFirstAndLastChars="0" saveSubsetFonts="1">
+<p:presentation xmlns:a="http://schemas.openxmlformats.org/drawingml/2006/main" xmlns:r="http://schemas.openxmlformats.org/officeDocument/2006/relationships" xmlns:p="http://schemas.openxmlformats.org/presentationml/2006/main" showSpecialPlsOnTitleSld="0" strictFirstAndLastChars="0" saveSubsetFonts="1" autoCompressPictures="0">
   <p:sldMasterIdLst>
     <p:sldMasterId id="2147483655" r:id="rId1"/>
   </p:sldMasterIdLst>
   <p:notesMasterIdLst>
-    <p:notesMasterId r:id="rId5"/>
+    <p:notesMasterId r:id="rId8"/>
   </p:notesMasterIdLst>
   <p:handoutMasterIdLst>
-    <p:handoutMasterId r:id="rId6"/>
+    <p:handoutMasterId r:id="rId9"/>
   </p:handoutMasterIdLst>
   <p:sldIdLst>
     <p:sldId id="256" r:id="rId2"/>
     <p:sldId id="257" r:id="rId3"/>
     <p:sldId id="258" r:id="rId4"/>
+    <p:sldId id="259" r:id="rId5"/>
+    <p:sldId id="261" r:id="rId6"/>
+    <p:sldId id="260" r:id="rId7"/>
   </p:sldIdLst>
   <p:sldSz cx="9144000" cy="6858000" type="screen4x3"/>
   <p:notesSz cx="6797675" cy="9928225"/>
@@ -142,7 +145,46 @@
       </a:defRPr>
     </a:lvl9pPr>
   </p:defaultTextStyle>
+  <p:extLst>
+    <p:ext uri="{EFAFB233-063F-42B5-8137-9DF3F51BA10A}">
+      <p15:sldGuideLst xmlns:p15="http://schemas.microsoft.com/office/powerpoint/2012/main">
+        <p15:guide id="1" orient="horz">
+          <p15:clr>
+            <a:srgbClr val="A4A3A4"/>
+          </p15:clr>
+        </p15:guide>
+        <p15:guide id="2" pos="2880">
+          <p15:clr>
+            <a:srgbClr val="A4A3A4"/>
+          </p15:clr>
+        </p15:guide>
+        <p15:guide id="3" pos="6">
+          <p15:clr>
+            <a:srgbClr val="A4A3A4"/>
+          </p15:clr>
+        </p15:guide>
+      </p15:sldGuideLst>
+    </p:ext>
+    <p:ext uri="{2D200454-40CA-4A62-9FC3-DE9A4176ACB9}">
+      <p15:notesGuideLst xmlns:p15="http://schemas.microsoft.com/office/powerpoint/2012/main">
+        <p15:guide id="1" orient="horz" pos="3126">
+          <p15:clr>
+            <a:srgbClr val="A4A3A4"/>
+          </p15:clr>
+        </p15:guide>
+        <p15:guide id="2" pos="2140">
+          <p15:clr>
+            <a:srgbClr val="A4A3A4"/>
+          </p15:clr>
+        </p15:guide>
+      </p15:notesGuideLst>
+    </p:ext>
+  </p:extLst>
 </p:presentation>
+</file>
+
+<file path=ppt/revisionInfo.xml><?xml version="1.0" encoding="utf-8"?>
+<p1510:revInfo xmlns:a="http://schemas.openxmlformats.org/drawingml/2006/main" xmlns:r="http://schemas.openxmlformats.org/officeDocument/2006/relationships" xmlns:p1510="http://schemas.microsoft.com/office/powerpoint/2015/10/main"/>
 </file>
 
 <file path=ppt/handoutMasters/handoutMaster1.xml><?xml version="1.0" encoding="utf-8"?>
@@ -554,35 +596,35 @@
           <a:p>
             <a:pPr lvl="0"/>
             <a:r>
-              <a:rPr lang="en-GB" altLang="ko-KR" smtClean="0"/>
+              <a:rPr lang="en-GB" altLang="ko-KR"/>
               <a:t>Click to edit Master text styles</a:t>
             </a:r>
           </a:p>
           <a:p>
             <a:pPr lvl="1"/>
             <a:r>
-              <a:rPr lang="en-GB" altLang="ko-KR" smtClean="0"/>
+              <a:rPr lang="en-GB" altLang="ko-KR"/>
               <a:t>Second level</a:t>
             </a:r>
           </a:p>
           <a:p>
             <a:pPr lvl="2"/>
             <a:r>
-              <a:rPr lang="en-GB" altLang="ko-KR" smtClean="0"/>
+              <a:rPr lang="en-GB" altLang="ko-KR"/>
               <a:t>Third level</a:t>
             </a:r>
           </a:p>
           <a:p>
             <a:pPr lvl="3"/>
             <a:r>
-              <a:rPr lang="en-GB" altLang="ko-KR" smtClean="0"/>
+              <a:rPr lang="en-GB" altLang="ko-KR"/>
               <a:t>Fourth level</a:t>
             </a:r>
           </a:p>
           <a:p>
             <a:pPr lvl="4"/>
             <a:r>
-              <a:rPr lang="en-GB" altLang="ko-KR" smtClean="0"/>
+              <a:rPr lang="en-GB" altLang="ko-KR"/>
               <a:t>Fifth level</a:t>
             </a:r>
           </a:p>
@@ -973,7 +1015,7 @@
           </a:bodyPr>
           <a:lstStyle/>
           <a:p>
-            <a:endParaRPr lang="en-US" altLang="ko-KR" sz="2400" b="1" dirty="0" smtClean="0">
+            <a:endParaRPr lang="en-US" altLang="ko-KR" sz="2400" b="1" dirty="0">
               <a:latin typeface="HY헤드라인M" pitchFamily="18" charset="-127"/>
               <a:ea typeface="HY헤드라인M" pitchFamily="18" charset="-127"/>
             </a:endParaRPr>
@@ -1027,18 +1069,13 @@
             </a:lvl1pPr>
           </a:lstStyle>
           <a:p>
-            <a:r>
-              <a:rPr lang="en-US" altLang="ko-KR" dirty="0" smtClean="0"/>
-              <a:t/>
-            </a:r>
             <a:br>
-              <a:rPr lang="en-US" altLang="ko-KR" dirty="0" smtClean="0"/>
+              <a:rPr lang="en-US" altLang="ko-KR" dirty="0"/>
             </a:br>
             <a:r>
-              <a:rPr lang="ko-KR" altLang="en-US" dirty="0" smtClean="0"/>
+              <a:rPr lang="ko-KR" altLang="en-US" dirty="0"/>
               <a:t>마스터 제목 스타일 편집</a:t>
             </a:r>
-            <a:endParaRPr lang="ko-KR" altLang="en-US" dirty="0"/>
           </a:p>
         </p:txBody>
       </p:sp>
@@ -1076,7 +1113,7 @@
           <p:nvPr userDrawn="1">
             <p:extLst>
               <p:ext uri="{D42A27DB-BD31-4B8C-83A1-F6EECF244321}">
-                <p14:modId xmlns:p14="http://schemas.microsoft.com/office/powerpoint/2010/main" val="3385421182"/>
+                <p14:modId xmlns:p14="http://schemas.microsoft.com/office/powerpoint/2010/main" val="2642257216"/>
               </p:ext>
             </p:extLst>
           </p:nvPr>
@@ -1090,10 +1127,34 @@
             <a:tbl>
               <a:tblPr/>
               <a:tblGrid>
-                <a:gridCol w="1022523"/>
-                <a:gridCol w="3439486"/>
-                <a:gridCol w="947956"/>
-                <a:gridCol w="3523377"/>
+                <a:gridCol w="1022523">
+                  <a:extLst>
+                    <a:ext uri="{9D8B030D-6E8A-4147-A177-3AD203B41FA5}">
+                      <a16:colId xmlns:a16="http://schemas.microsoft.com/office/drawing/2014/main" val="20000"/>
+                    </a:ext>
+                  </a:extLst>
+                </a:gridCol>
+                <a:gridCol w="3439486">
+                  <a:extLst>
+                    <a:ext uri="{9D8B030D-6E8A-4147-A177-3AD203B41FA5}">
+                      <a16:colId xmlns:a16="http://schemas.microsoft.com/office/drawing/2014/main" val="20001"/>
+                    </a:ext>
+                  </a:extLst>
+                </a:gridCol>
+                <a:gridCol w="947956">
+                  <a:extLst>
+                    <a:ext uri="{9D8B030D-6E8A-4147-A177-3AD203B41FA5}">
+                      <a16:colId xmlns:a16="http://schemas.microsoft.com/office/drawing/2014/main" val="20002"/>
+                    </a:ext>
+                  </a:extLst>
+                </a:gridCol>
+                <a:gridCol w="3523377">
+                  <a:extLst>
+                    <a:ext uri="{9D8B030D-6E8A-4147-A177-3AD203B41FA5}">
+                      <a16:colId xmlns:a16="http://schemas.microsoft.com/office/drawing/2014/main" val="20003"/>
+                    </a:ext>
+                  </a:extLst>
+                </a:gridCol>
               </a:tblGrid>
               <a:tr h="299619">
                 <a:tc rowSpan="2">
@@ -1118,7 +1179,7 @@
                         <a:tabLst/>
                       </a:pPr>
                       <a:r>
-                        <a:rPr kumimoji="1" lang="ko-KR" altLang="en-US" sz="900" b="0" i="0" u="none" strike="noStrike" cap="none" normalizeH="0" baseline="0" dirty="0" smtClean="0">
+                        <a:rPr kumimoji="1" lang="ko-KR" altLang="en-US" sz="900" b="0" i="0" u="none" strike="noStrike" cap="none" normalizeH="0" baseline="0" dirty="0">
                           <a:ln>
                             <a:noFill/>
                           </a:ln>
@@ -1131,7 +1192,7 @@
                         </a:rPr>
                         <a:t>프로젝트 명</a:t>
                       </a:r>
-                      <a:endParaRPr kumimoji="1" lang="ko-KR" altLang="ko-KR" sz="900" b="0" i="0" u="none" strike="noStrike" cap="none" normalizeH="0" baseline="0" dirty="0" smtClean="0">
+                      <a:endParaRPr kumimoji="1" lang="ko-KR" altLang="ko-KR" sz="900" b="0" i="0" u="none" strike="noStrike" cap="none" normalizeH="0" baseline="0" dirty="0">
                         <a:ln>
                           <a:noFill/>
                         </a:ln>
@@ -1213,7 +1274,49 @@
                         <a:buNone/>
                         <a:tabLst/>
                       </a:pPr>
-                      <a:endParaRPr kumimoji="1" lang="ko-KR" altLang="ko-KR" sz="900" b="0" i="0" u="none" strike="noStrike" cap="none" normalizeH="0" baseline="0" dirty="0" smtClean="0">
+                      <a:r>
+                        <a:rPr kumimoji="1" lang="ko-KR" altLang="en-US" sz="1200" b="1" i="0" u="none" strike="noStrike" cap="none" normalizeH="0" baseline="0">
+                          <a:ln>
+                            <a:noFill/>
+                          </a:ln>
+                          <a:solidFill>
+                            <a:schemeClr val="tx1"/>
+                          </a:solidFill>
+                          <a:effectLst/>
+                          <a:latin typeface="맑은 고딕" pitchFamily="50" charset="-127"/>
+                          <a:ea typeface="맑은 고딕" pitchFamily="50" charset="-127"/>
+                        </a:rPr>
+                        <a:t>대학생을 위한 과목별 </a:t>
+                      </a:r>
+                      <a:r>
+                        <a:rPr kumimoji="1" lang="en-US" altLang="ko-KR" sz="1200" b="1" i="0" u="none" strike="noStrike" cap="none" normalizeH="0" baseline="0">
+                          <a:ln>
+                            <a:noFill/>
+                          </a:ln>
+                          <a:solidFill>
+                            <a:schemeClr val="tx1"/>
+                          </a:solidFill>
+                          <a:effectLst/>
+                          <a:latin typeface="맑은 고딕" pitchFamily="50" charset="-127"/>
+                          <a:ea typeface="맑은 고딕" pitchFamily="50" charset="-127"/>
+                        </a:rPr>
+                        <a:t>To do List </a:t>
+                      </a:r>
+                      <a:r>
+                        <a:rPr kumimoji="1" lang="ko-KR" altLang="en-US" sz="1200" b="1" i="0" u="none" strike="noStrike" cap="none" normalizeH="0" baseline="0">
+                          <a:ln>
+                            <a:noFill/>
+                          </a:ln>
+                          <a:solidFill>
+                            <a:schemeClr val="tx1"/>
+                          </a:solidFill>
+                          <a:effectLst/>
+                          <a:latin typeface="맑은 고딕" pitchFamily="50" charset="-127"/>
+                          <a:ea typeface="맑은 고딕" pitchFamily="50" charset="-127"/>
+                        </a:rPr>
+                        <a:t>관리 프로그램</a:t>
+                      </a:r>
+                      <a:endParaRPr kumimoji="1" lang="ko-KR" altLang="ko-KR" sz="1200" b="1" i="0" u="none" strike="noStrike" cap="none" normalizeH="0" baseline="0" dirty="0">
                         <a:ln>
                           <a:noFill/>
                         </a:ln>
@@ -1294,7 +1397,7 @@
                         <a:tabLst/>
                       </a:pPr>
                       <a:r>
-                        <a:rPr kumimoji="1" lang="ko-KR" altLang="en-US" sz="900" b="0" i="0" u="none" strike="noStrike" cap="none" normalizeH="0" baseline="0" dirty="0" smtClean="0">
+                        <a:rPr kumimoji="1" lang="ko-KR" altLang="en-US" sz="900" b="0" i="0" u="none" strike="noStrike" cap="none" normalizeH="0" baseline="0" dirty="0">
                           <a:ln>
                             <a:noFill/>
                           </a:ln>
@@ -1307,7 +1410,7 @@
                         </a:rPr>
                         <a:t>문서 명</a:t>
                       </a:r>
-                      <a:endParaRPr kumimoji="1" lang="ko-KR" altLang="ko-KR" sz="900" b="0" i="0" u="none" strike="noStrike" cap="none" normalizeH="0" baseline="0" dirty="0" smtClean="0">
+                      <a:endParaRPr kumimoji="1" lang="ko-KR" altLang="ko-KR" sz="900" b="0" i="0" u="none" strike="noStrike" cap="none" normalizeH="0" baseline="0" dirty="0">
                         <a:ln>
                           <a:noFill/>
                         </a:ln>
@@ -1390,7 +1493,7 @@
                         <a:tabLst/>
                       </a:pPr>
                       <a:r>
-                        <a:rPr kumimoji="1" lang="en-US" altLang="ko-KR" sz="900" b="0" i="0" u="none" strike="noStrike" cap="none" normalizeH="0" baseline="0" dirty="0" smtClean="0">
+                        <a:rPr kumimoji="1" lang="en-US" altLang="ko-KR" sz="900" b="0" i="0" u="none" strike="noStrike" cap="none" normalizeH="0" baseline="0" dirty="0">
                           <a:ln>
                             <a:noFill/>
                           </a:ln>
@@ -1401,23 +1504,9 @@
                           <a:latin typeface="맑은 고딕" pitchFamily="50" charset="-127"/>
                           <a:ea typeface="맑은 고딕" pitchFamily="50" charset="-127"/>
                         </a:rPr>
-                        <a:t>Class </a:t>
+                        <a:t>Class Design</a:t>
                       </a:r>
-                      <a:r>
-                        <a:rPr kumimoji="1" lang="ko-KR" altLang="en-US" sz="900" b="0" i="0" u="none" strike="noStrike" cap="none" normalizeH="0" baseline="0" dirty="0" smtClean="0">
-                          <a:ln>
-                            <a:noFill/>
-                          </a:ln>
-                          <a:solidFill>
-                            <a:schemeClr val="tx1"/>
-                          </a:solidFill>
-                          <a:effectLst/>
-                          <a:latin typeface="맑은 고딕" pitchFamily="50" charset="-127"/>
-                          <a:ea typeface="맑은 고딕" pitchFamily="50" charset="-127"/>
-                        </a:rPr>
-                        <a:t>설계서</a:t>
-                      </a:r>
-                      <a:endParaRPr kumimoji="1" lang="ko-KR" sz="900" b="0" i="0" u="none" strike="noStrike" cap="none" normalizeH="0" baseline="0" dirty="0" smtClean="0">
+                      <a:endParaRPr kumimoji="1" lang="ko-KR" sz="900" b="0" i="0" u="none" strike="noStrike" cap="none" normalizeH="0" baseline="0" dirty="0">
                         <a:ln>
                           <a:noFill/>
                         </a:ln>
@@ -1476,6 +1565,11 @@
                     <a:noFill/>
                   </a:tcPr>
                 </a:tc>
+                <a:extLst>
+                  <a:ext uri="{0D108BD9-81ED-4DB2-BD59-A6C34878D82A}">
+                    <a16:rowId xmlns:a16="http://schemas.microsoft.com/office/drawing/2014/main" val="10000"/>
+                  </a:ext>
+                </a:extLst>
               </a:tr>
               <a:tr h="297106">
                 <a:tc vMerge="1">
@@ -1499,7 +1593,7 @@
                         <a:buNone/>
                         <a:tabLst/>
                       </a:pPr>
-                      <a:endParaRPr kumimoji="1" lang="ko-KR" sz="900" b="0" i="0" u="none" strike="noStrike" cap="none" normalizeH="0" baseline="0" dirty="0" smtClean="0">
+                      <a:endParaRPr kumimoji="1" lang="ko-KR" sz="900" b="0" i="0" u="none" strike="noStrike" cap="none" normalizeH="0" baseline="0" dirty="0">
                         <a:ln>
                           <a:noFill/>
                         </a:ln>
@@ -1581,7 +1675,7 @@
                         <a:buNone/>
                         <a:tabLst/>
                       </a:pPr>
-                      <a:endParaRPr kumimoji="1" lang="ko-KR" altLang="ko-KR" sz="900" b="0" i="0" u="none" strike="noStrike" cap="none" normalizeH="0" baseline="0" dirty="0" smtClean="0">
+                      <a:endParaRPr kumimoji="1" lang="ko-KR" altLang="ko-KR" sz="900" b="0" i="0" u="none" strike="noStrike" cap="none" normalizeH="0" baseline="0" dirty="0">
                         <a:ln>
                           <a:noFill/>
                         </a:ln>
@@ -1662,7 +1756,7 @@
                         <a:tabLst/>
                       </a:pPr>
                       <a:r>
-                        <a:rPr kumimoji="1" lang="ko-KR" altLang="en-US" sz="900" b="0" i="0" u="none" strike="noStrike" cap="none" normalizeH="0" baseline="0" dirty="0" smtClean="0">
+                        <a:rPr kumimoji="1" lang="ko-KR" altLang="en-US" sz="900" b="0" i="0" u="none" strike="noStrike" cap="none" normalizeH="0" baseline="0" dirty="0">
                           <a:ln>
                             <a:noFill/>
                           </a:ln>
@@ -1675,7 +1769,7 @@
                         </a:rPr>
                         <a:t>버전</a:t>
                       </a:r>
-                      <a:endParaRPr kumimoji="1" lang="ko-KR" altLang="ko-KR" sz="900" b="0" i="0" u="none" strike="noStrike" cap="none" normalizeH="0" baseline="0" dirty="0" smtClean="0">
+                      <a:endParaRPr kumimoji="1" lang="ko-KR" altLang="ko-KR" sz="900" b="0" i="0" u="none" strike="noStrike" cap="none" normalizeH="0" baseline="0" dirty="0">
                         <a:ln>
                           <a:noFill/>
                         </a:ln>
@@ -1758,7 +1852,7 @@
                         <a:tabLst/>
                       </a:pPr>
                       <a:r>
-                        <a:rPr kumimoji="1" lang="en-US" altLang="ko-KR" sz="900" b="0" i="0" u="none" strike="noStrike" cap="none" normalizeH="0" baseline="0" dirty="0" smtClean="0">
+                        <a:rPr kumimoji="1" lang="en-US" altLang="ko-KR" sz="900" b="0" i="0" u="none" strike="noStrike" cap="none" normalizeH="0" baseline="0" dirty="0">
                           <a:ln>
                             <a:noFill/>
                           </a:ln>
@@ -1769,9 +1863,9 @@
                           <a:latin typeface="맑은 고딕" pitchFamily="50" charset="-127"/>
                           <a:ea typeface="맑은 고딕" pitchFamily="50" charset="-127"/>
                         </a:rPr>
-                        <a:t>V X.X</a:t>
+                        <a:t>20170524_01</a:t>
                       </a:r>
-                      <a:endParaRPr kumimoji="1" lang="ko-KR" altLang="ko-KR" sz="900" b="0" i="0" u="none" strike="noStrike" cap="none" normalizeH="0" baseline="0" dirty="0" smtClean="0">
+                      <a:endParaRPr kumimoji="1" lang="ko-KR" altLang="ko-KR" sz="900" b="0" i="0" u="none" strike="noStrike" cap="none" normalizeH="0" baseline="0" dirty="0">
                         <a:ln>
                           <a:noFill/>
                         </a:ln>
@@ -1830,6 +1924,11 @@
                     <a:noFill/>
                   </a:tcPr>
                 </a:tc>
+                <a:extLst>
+                  <a:ext uri="{0D108BD9-81ED-4DB2-BD59-A6C34878D82A}">
+                    <a16:rowId xmlns:a16="http://schemas.microsoft.com/office/drawing/2014/main" val="10001"/>
+                  </a:ext>
+                </a:extLst>
               </a:tr>
             </a:tbl>
           </a:graphicData>
@@ -1882,7 +1981,7 @@
           <a:p>
             <a:pPr algn="r"/>
             <a:r>
-              <a:rPr lang="ko-KR" altLang="en-US" dirty="0" smtClean="0"/>
+              <a:rPr lang="ko-KR" altLang="en-US"/>
               <a:t>팀 명</a:t>
             </a:r>
             <a:endParaRPr lang="en-US" altLang="ko-KR" dirty="0"/>
@@ -1939,7 +2038,7 @@
               <a:buNone/>
               <a:tabLst/>
             </a:pPr>
-            <a:endParaRPr kumimoji="0" lang="ko-KR" altLang="en-US" sz="1400" b="0" i="0" u="none" strike="noStrike" cap="none" normalizeH="0" baseline="0" smtClean="0">
+            <a:endParaRPr kumimoji="0" lang="ko-KR" altLang="en-US" sz="1400" b="0" i="0" u="none" strike="noStrike" cap="none" normalizeH="0" baseline="0">
               <a:ln>
                 <a:noFill/>
               </a:ln>
@@ -2008,7 +2107,7 @@
           </a:lstStyle>
           <a:p>
             <a:r>
-              <a:rPr lang="ko-KR" altLang="en-US" smtClean="0"/>
+              <a:rPr lang="ko-KR" altLang="en-US"/>
               <a:t>마스터 제목 스타일 편집</a:t>
             </a:r>
             <a:endParaRPr lang="ko-KR" altLang="en-US" dirty="0"/>
@@ -2058,35 +2157,35 @@
           <a:p>
             <a:pPr lvl="0"/>
             <a:r>
-              <a:rPr lang="ko-KR" altLang="en-US" smtClean="0"/>
+              <a:rPr lang="ko-KR" altLang="en-US"/>
               <a:t>마스터 텍스트 스타일을 편집합니다</a:t>
             </a:r>
           </a:p>
           <a:p>
             <a:pPr lvl="1"/>
             <a:r>
-              <a:rPr lang="ko-KR" altLang="en-US" smtClean="0"/>
+              <a:rPr lang="ko-KR" altLang="en-US"/>
               <a:t>둘째 수준</a:t>
             </a:r>
           </a:p>
           <a:p>
             <a:pPr lvl="2"/>
             <a:r>
-              <a:rPr lang="ko-KR" altLang="en-US" smtClean="0"/>
+              <a:rPr lang="ko-KR" altLang="en-US"/>
               <a:t>셋째 수준</a:t>
             </a:r>
           </a:p>
           <a:p>
             <a:pPr lvl="3"/>
             <a:r>
-              <a:rPr lang="ko-KR" altLang="en-US" smtClean="0"/>
+              <a:rPr lang="ko-KR" altLang="en-US"/>
               <a:t>넷째 수준</a:t>
             </a:r>
           </a:p>
           <a:p>
             <a:pPr lvl="4"/>
             <a:r>
-              <a:rPr lang="ko-KR" altLang="en-US" smtClean="0"/>
+              <a:rPr lang="ko-KR" altLang="en-US"/>
               <a:t>다섯째 수준</a:t>
             </a:r>
             <a:endParaRPr lang="ko-KR" altLang="en-US" dirty="0"/>
@@ -2210,7 +2309,7 @@
           <a:p>
             <a:pPr algn="r"/>
             <a:r>
-              <a:rPr lang="ko-KR" altLang="en-US" dirty="0" smtClean="0"/>
+              <a:rPr lang="ko-KR" altLang="en-US"/>
               <a:t>팀 명</a:t>
             </a:r>
             <a:endParaRPr lang="en-US" altLang="ko-KR" dirty="0"/>
@@ -2415,7 +2514,7 @@
           <a:p>
             <a:pPr algn="r"/>
             <a:r>
-              <a:rPr lang="ko-KR" altLang="en-US" dirty="0" smtClean="0"/>
+              <a:rPr lang="ko-KR" altLang="en-US"/>
               <a:t>팀 명</a:t>
             </a:r>
             <a:endParaRPr lang="en-US" altLang="ko-KR" dirty="0"/>
@@ -2961,22 +3060,17 @@
           <a:bodyPr/>
           <a:lstStyle/>
           <a:p>
-            <a:r>
-              <a:rPr lang="en-US" altLang="ko-KR" dirty="0" smtClean="0"/>
-              <a:t/>
-            </a:r>
             <a:br>
-              <a:rPr lang="en-US" altLang="ko-KR" dirty="0" smtClean="0"/>
+              <a:rPr lang="en-US" altLang="ko-KR" dirty="0"/>
             </a:br>
             <a:r>
-              <a:rPr lang="en-US" altLang="ko-KR" dirty="0" smtClean="0"/>
+              <a:rPr lang="en-US" altLang="ko-KR" dirty="0"/>
               <a:t>Class </a:t>
             </a:r>
             <a:r>
-              <a:rPr lang="ko-KR" altLang="en-US" dirty="0" smtClean="0"/>
+              <a:rPr lang="ko-KR" altLang="en-US" dirty="0"/>
               <a:t>설계서</a:t>
             </a:r>
-            <a:endParaRPr lang="ko-KR" altLang="en-US" dirty="0"/>
           </a:p>
         </p:txBody>
       </p:sp>
@@ -2989,7 +3083,7 @@
         <p:spPr>
           <a:xfrm>
             <a:off x="7751445" y="4372844"/>
-            <a:ext cx="768159" cy="400110"/>
+            <a:ext cx="760273" cy="400110"/>
           </a:xfrm>
           <a:prstGeom prst="rect">
             <a:avLst/>
@@ -3003,8 +3097,8 @@
           <a:lstStyle/>
           <a:p>
             <a:r>
-              <a:rPr lang="ko-KR" altLang="en-US" sz="2000" dirty="0" smtClean="0"/>
-              <a:t>팀 명</a:t>
+              <a:rPr lang="en-US" altLang="ko-KR" sz="2000" dirty="0"/>
+              <a:t>Tuna</a:t>
             </a:r>
             <a:endParaRPr lang="ko-KR" altLang="en-US" sz="2000" dirty="0"/>
           </a:p>
@@ -3051,10 +3145,9 @@
           <a:lstStyle/>
           <a:p>
             <a:r>
-              <a:rPr lang="ko-KR" altLang="en-US" dirty="0" smtClean="0"/>
+              <a:rPr lang="ko-KR" altLang="en-US" dirty="0"/>
               <a:t>변경 이력</a:t>
             </a:r>
-            <a:endParaRPr lang="ko-KR" altLang="en-US" dirty="0"/>
           </a:p>
         </p:txBody>
       </p:sp>
@@ -3075,8 +3168,8 @@
           <a:p>
             <a:pPr algn="r"/>
             <a:r>
-              <a:rPr lang="ko-KR" altLang="en-US" dirty="0" smtClean="0"/>
-              <a:t>팀 명</a:t>
+              <a:rPr lang="en-US" altLang="ko-KR"/>
+              <a:t>Tuna</a:t>
             </a:r>
             <a:endParaRPr lang="en-US" altLang="ko-KR" dirty="0"/>
           </a:p>
@@ -3092,14 +3185,14 @@
             <p:ph idx="1"/>
             <p:extLst>
               <p:ext uri="{D42A27DB-BD31-4B8C-83A1-F6EECF244321}">
-                <p14:modId xmlns:p14="http://schemas.microsoft.com/office/powerpoint/2010/main" val="3721839066"/>
+                <p14:modId xmlns:p14="http://schemas.microsoft.com/office/powerpoint/2010/main" val="2886462991"/>
               </p:ext>
             </p:extLst>
           </p:nvPr>
         </p:nvGraphicFramePr>
         <p:xfrm>
           <a:off x="280988" y="1025525"/>
-          <a:ext cx="8582024" cy="2966720"/>
+          <a:ext cx="8582024" cy="3235960"/>
         </p:xfrm>
         <a:graphic>
           <a:graphicData uri="http://schemas.openxmlformats.org/drawingml/2006/table">
@@ -3108,10 +3201,34 @@
                 <a:tableStyleId>{5940675A-B579-460E-94D1-54222C63F5DA}</a:tableStyleId>
               </a:tblPr>
               <a:tblGrid>
-                <a:gridCol w="2145506"/>
-                <a:gridCol w="2145506"/>
-                <a:gridCol w="2145506"/>
-                <a:gridCol w="2145506"/>
+                <a:gridCol w="2145506">
+                  <a:extLst>
+                    <a:ext uri="{9D8B030D-6E8A-4147-A177-3AD203B41FA5}">
+                      <a16:colId xmlns:a16="http://schemas.microsoft.com/office/drawing/2014/main" val="20000"/>
+                    </a:ext>
+                  </a:extLst>
+                </a:gridCol>
+                <a:gridCol w="2145506">
+                  <a:extLst>
+                    <a:ext uri="{9D8B030D-6E8A-4147-A177-3AD203B41FA5}">
+                      <a16:colId xmlns:a16="http://schemas.microsoft.com/office/drawing/2014/main" val="20001"/>
+                    </a:ext>
+                  </a:extLst>
+                </a:gridCol>
+                <a:gridCol w="2145506">
+                  <a:extLst>
+                    <a:ext uri="{9D8B030D-6E8A-4147-A177-3AD203B41FA5}">
+                      <a16:colId xmlns:a16="http://schemas.microsoft.com/office/drawing/2014/main" val="20002"/>
+                    </a:ext>
+                  </a:extLst>
+                </a:gridCol>
+                <a:gridCol w="2145506">
+                  <a:extLst>
+                    <a:ext uri="{9D8B030D-6E8A-4147-A177-3AD203B41FA5}">
+                      <a16:colId xmlns:a16="http://schemas.microsoft.com/office/drawing/2014/main" val="20003"/>
+                    </a:ext>
+                  </a:extLst>
+                </a:gridCol>
               </a:tblGrid>
               <a:tr h="370840">
                 <a:tc>
@@ -3121,7 +3238,7 @@
                     <a:p>
                       <a:pPr algn="ctr" latinLnBrk="1"/>
                       <a:r>
-                        <a:rPr lang="ko-KR" altLang="en-US" sz="1200" b="1" dirty="0" smtClean="0">
+                        <a:rPr lang="ko-KR" altLang="en-US" sz="1200" b="1" dirty="0">
                           <a:latin typeface="맑은 고딕" pitchFamily="50" charset="-127"/>
                           <a:ea typeface="맑은 고딕" pitchFamily="50" charset="-127"/>
                         </a:rPr>
@@ -3151,7 +3268,7 @@
                     <a:p>
                       <a:pPr algn="ctr" latinLnBrk="1"/>
                       <a:r>
-                        <a:rPr lang="ko-KR" altLang="en-US" sz="1200" b="1" dirty="0" smtClean="0">
+                        <a:rPr lang="ko-KR" altLang="en-US" sz="1200" b="1" dirty="0">
                           <a:latin typeface="맑은 고딕" pitchFamily="50" charset="-127"/>
                           <a:ea typeface="맑은 고딕" pitchFamily="50" charset="-127"/>
                         </a:rPr>
@@ -3181,7 +3298,7 @@
                     <a:p>
                       <a:pPr algn="ctr" latinLnBrk="1"/>
                       <a:r>
-                        <a:rPr lang="ko-KR" altLang="en-US" sz="1200" b="1" dirty="0" smtClean="0">
+                        <a:rPr lang="ko-KR" altLang="en-US" sz="1200" b="1" dirty="0">
                           <a:latin typeface="맑은 고딕" pitchFamily="50" charset="-127"/>
                           <a:ea typeface="맑은 고딕" pitchFamily="50" charset="-127"/>
                         </a:rPr>
@@ -3211,7 +3328,7 @@
                     <a:p>
                       <a:pPr algn="ctr" latinLnBrk="1"/>
                       <a:r>
-                        <a:rPr lang="ko-KR" altLang="en-US" sz="1200" b="1" dirty="0" smtClean="0">
+                        <a:rPr lang="ko-KR" altLang="en-US" sz="1200" b="1" dirty="0">
                           <a:latin typeface="맑은 고딕" pitchFamily="50" charset="-127"/>
                           <a:ea typeface="맑은 고딕" pitchFamily="50" charset="-127"/>
                         </a:rPr>
@@ -3234,6 +3351,11 @@
                     </a:solidFill>
                   </a:tcPr>
                 </a:tc>
+                <a:extLst>
+                  <a:ext uri="{0D108BD9-81ED-4DB2-BD59-A6C34878D82A}">
+                    <a16:rowId xmlns:a16="http://schemas.microsoft.com/office/drawing/2014/main" val="10000"/>
+                  </a:ext>
+                </a:extLst>
               </a:tr>
               <a:tr h="370840">
                 <a:tc>
@@ -3242,13 +3364,66 @@
                     <a:lstStyle/>
                     <a:p>
                       <a:pPr algn="ctr" latinLnBrk="1"/>
-                      <a:endParaRPr lang="ko-KR" altLang="en-US" sz="1200" b="0" dirty="0">
-                        <a:solidFill>
-                          <a:schemeClr val="tx1"/>
-                        </a:solidFill>
-                        <a:latin typeface="맑은 고딕" pitchFamily="50" charset="-127"/>
-                        <a:ea typeface="맑은 고딕" pitchFamily="50" charset="-127"/>
-                      </a:endParaRPr>
+                      <a:r>
+                        <a:rPr lang="en-US" altLang="ko-KR" sz="1200" b="0" dirty="0">
+                          <a:solidFill>
+                            <a:schemeClr val="tx1"/>
+                          </a:solidFill>
+                          <a:latin typeface="맑은 고딕" pitchFamily="50" charset="-127"/>
+                          <a:ea typeface="맑은 고딕" pitchFamily="50" charset="-127"/>
+                        </a:rPr>
+                        <a:t>2017</a:t>
+                      </a:r>
+                      <a:r>
+                        <a:rPr lang="ko-KR" altLang="en-US" sz="1200" b="0" dirty="0">
+                          <a:solidFill>
+                            <a:schemeClr val="tx1"/>
+                          </a:solidFill>
+                          <a:latin typeface="맑은 고딕" pitchFamily="50" charset="-127"/>
+                          <a:ea typeface="맑은 고딕" pitchFamily="50" charset="-127"/>
+                        </a:rPr>
+                        <a:t>년 </a:t>
+                      </a:r>
+                      <a:r>
+                        <a:rPr lang="en-US" altLang="ko-KR" sz="1200" b="0" dirty="0">
+                          <a:solidFill>
+                            <a:schemeClr val="tx1"/>
+                          </a:solidFill>
+                          <a:latin typeface="맑은 고딕" pitchFamily="50" charset="-127"/>
+                          <a:ea typeface="맑은 고딕" pitchFamily="50" charset="-127"/>
+                        </a:rPr>
+                        <a:t>05</a:t>
+                      </a:r>
+                      <a:r>
+                        <a:rPr lang="ko-KR" altLang="en-US" sz="1200" b="0" dirty="0">
+                          <a:solidFill>
+                            <a:schemeClr val="tx1"/>
+                          </a:solidFill>
+                          <a:latin typeface="맑은 고딕" pitchFamily="50" charset="-127"/>
+                          <a:ea typeface="맑은 고딕" pitchFamily="50" charset="-127"/>
+                        </a:rPr>
+                        <a:t>월 </a:t>
+                      </a:r>
+                      <a:r>
+                        <a:rPr lang="en-US" altLang="ko-KR" sz="1200" b="0" dirty="0">
+                          <a:solidFill>
+                            <a:schemeClr val="tx1"/>
+                          </a:solidFill>
+                          <a:latin typeface="맑은 고딕" pitchFamily="50" charset="-127"/>
+                          <a:ea typeface="맑은 고딕" pitchFamily="50" charset="-127"/>
+                        </a:rPr>
+                        <a:t>24</a:t>
+                      </a:r>
+                      <a:r>
+                        <a:rPr lang="ko-KR" altLang="en-US" sz="1200" b="0" dirty="0">
+                          <a:solidFill>
+                            <a:schemeClr val="tx1"/>
+                          </a:solidFill>
+                          <a:latin typeface="맑은 고딕" pitchFamily="50" charset="-127"/>
+                          <a:ea typeface="맑은 고딕" pitchFamily="50" charset="-127"/>
+                        </a:rPr>
+                        <a:t>일</a:t>
+                      </a:r>
                     </a:p>
                   </a:txBody>
                   <a:tcPr anchor="ctr">
@@ -3263,6 +3438,16 @@
                     <a:lstStyle/>
                     <a:p>
                       <a:pPr algn="ctr" latinLnBrk="1"/>
+                      <a:r>
+                        <a:rPr lang="en-US" altLang="ko-KR" sz="1200" b="0" dirty="0">
+                          <a:solidFill>
+                            <a:schemeClr val="tx1"/>
+                          </a:solidFill>
+                          <a:latin typeface="맑은 고딕" pitchFamily="50" charset="-127"/>
+                          <a:ea typeface="맑은 고딕" pitchFamily="50" charset="-127"/>
+                        </a:rPr>
+                        <a:t>01</a:t>
+                      </a:r>
                       <a:endParaRPr lang="ko-KR" altLang="en-US" sz="1200" b="0" dirty="0">
                         <a:solidFill>
                           <a:schemeClr val="tx1"/>
@@ -3284,6 +3469,110 @@
                     <a:lstStyle/>
                     <a:p>
                       <a:pPr latinLnBrk="1"/>
+                      <a:r>
+                        <a:rPr lang="ko-KR" altLang="en-US" sz="1200" b="0" dirty="0">
+                          <a:solidFill>
+                            <a:schemeClr val="tx1"/>
+                          </a:solidFill>
+                          <a:latin typeface="맑은 고딕" pitchFamily="50" charset="-127"/>
+                          <a:ea typeface="맑은 고딕" pitchFamily="50" charset="-127"/>
+                        </a:rPr>
+                        <a:t>전체 </a:t>
+                      </a:r>
+                      <a:r>
+                        <a:rPr lang="en-US" altLang="ko-KR" sz="1200" b="0" dirty="0">
+                          <a:solidFill>
+                            <a:schemeClr val="tx1"/>
+                          </a:solidFill>
+                          <a:latin typeface="맑은 고딕" pitchFamily="50" charset="-127"/>
+                          <a:ea typeface="맑은 고딕" pitchFamily="50" charset="-127"/>
+                        </a:rPr>
+                        <a:t>Class Design </a:t>
+                      </a:r>
+                      <a:r>
+                        <a:rPr lang="ko-KR" altLang="en-US" sz="1200" b="0" dirty="0">
+                          <a:solidFill>
+                            <a:schemeClr val="tx1"/>
+                          </a:solidFill>
+                          <a:latin typeface="맑은 고딕" pitchFamily="50" charset="-127"/>
+                          <a:ea typeface="맑은 고딕" pitchFamily="50" charset="-127"/>
+                        </a:rPr>
+                        <a:t>작성 및 </a:t>
+                      </a:r>
+                      <a:r>
+                        <a:rPr lang="en-US" altLang="ko-KR" sz="1200" b="0" dirty="0" err="1">
+                          <a:solidFill>
+                            <a:schemeClr val="tx1"/>
+                          </a:solidFill>
+                          <a:latin typeface="맑은 고딕" pitchFamily="50" charset="-127"/>
+                          <a:ea typeface="맑은 고딕" pitchFamily="50" charset="-127"/>
+                        </a:rPr>
+                        <a:t>MainFrame</a:t>
+                      </a:r>
+                      <a:r>
+                        <a:rPr lang="en-US" altLang="ko-KR" sz="1200" b="0" dirty="0">
+                          <a:solidFill>
+                            <a:schemeClr val="tx1"/>
+                          </a:solidFill>
+                          <a:latin typeface="맑은 고딕" pitchFamily="50" charset="-127"/>
+                          <a:ea typeface="맑은 고딕" pitchFamily="50" charset="-127"/>
+                        </a:rPr>
+                        <a:t>, Frame2, </a:t>
+                      </a:r>
+                      <a:r>
+                        <a:rPr lang="en-US" altLang="ko-KR" sz="1200" b="0" dirty="0" err="1">
+                          <a:solidFill>
+                            <a:schemeClr val="tx1"/>
+                          </a:solidFill>
+                          <a:latin typeface="맑은 고딕" pitchFamily="50" charset="-127"/>
+                          <a:ea typeface="맑은 고딕" pitchFamily="50" charset="-127"/>
+                        </a:rPr>
+                        <a:t>UIUpdate</a:t>
+                      </a:r>
+                      <a:r>
+                        <a:rPr lang="en-US" altLang="ko-KR" sz="1200" b="0" dirty="0">
+                          <a:solidFill>
+                            <a:schemeClr val="tx1"/>
+                          </a:solidFill>
+                          <a:latin typeface="맑은 고딕" pitchFamily="50" charset="-127"/>
+                          <a:ea typeface="맑은 고딕" pitchFamily="50" charset="-127"/>
+                        </a:rPr>
+                        <a:t> </a:t>
+                      </a:r>
+                      <a:r>
+                        <a:rPr lang="ko-KR" altLang="en-US" sz="1200" b="0" dirty="0">
+                          <a:solidFill>
+                            <a:schemeClr val="tx1"/>
+                          </a:solidFill>
+                          <a:latin typeface="맑은 고딕" pitchFamily="50" charset="-127"/>
+                          <a:ea typeface="맑은 고딕" pitchFamily="50" charset="-127"/>
+                        </a:rPr>
+                        <a:t>세부부분 작성</a:t>
+                      </a:r>
+                    </a:p>
+                  </a:txBody>
+                  <a:tcPr anchor="ctr">
+                    <a:solidFill>
+                      <a:schemeClr val="bg1"/>
+                    </a:solidFill>
+                  </a:tcPr>
+                </a:tc>
+                <a:tc>
+                  <a:txBody>
+                    <a:bodyPr/>
+                    <a:lstStyle/>
+                    <a:p>
+                      <a:pPr algn="ctr" latinLnBrk="1"/>
+                      <a:r>
+                        <a:rPr lang="ko-KR" altLang="en-US" sz="1200" b="0" dirty="0" err="1">
+                          <a:solidFill>
+                            <a:schemeClr val="tx1"/>
+                          </a:solidFill>
+                          <a:latin typeface="맑은 고딕" pitchFamily="50" charset="-127"/>
+                          <a:ea typeface="맑은 고딕" pitchFamily="50" charset="-127"/>
+                        </a:rPr>
+                        <a:t>김주민</a:t>
+                      </a:r>
                       <a:endParaRPr lang="ko-KR" altLang="en-US" sz="1200" b="0" dirty="0">
                         <a:solidFill>
                           <a:schemeClr val="tx1"/>
@@ -3299,27 +3588,11 @@
                     </a:solidFill>
                   </a:tcPr>
                 </a:tc>
-                <a:tc>
-                  <a:txBody>
-                    <a:bodyPr/>
-                    <a:lstStyle/>
-                    <a:p>
-                      <a:pPr algn="ctr" latinLnBrk="1"/>
-                      <a:endParaRPr lang="ko-KR" altLang="en-US" sz="1200" b="0" dirty="0">
-                        <a:solidFill>
-                          <a:schemeClr val="tx1"/>
-                        </a:solidFill>
-                        <a:latin typeface="맑은 고딕" pitchFamily="50" charset="-127"/>
-                        <a:ea typeface="맑은 고딕" pitchFamily="50" charset="-127"/>
-                      </a:endParaRPr>
-                    </a:p>
-                  </a:txBody>
-                  <a:tcPr anchor="ctr">
-                    <a:solidFill>
-                      <a:schemeClr val="bg1"/>
-                    </a:solidFill>
-                  </a:tcPr>
-                </a:tc>
+                <a:extLst>
+                  <a:ext uri="{0D108BD9-81ED-4DB2-BD59-A6C34878D82A}">
+                    <a16:rowId xmlns:a16="http://schemas.microsoft.com/office/drawing/2014/main" val="10001"/>
+                  </a:ext>
+                </a:extLst>
               </a:tr>
               <a:tr h="370840">
                 <a:tc>
@@ -3406,6 +3679,11 @@
                     </a:solidFill>
                   </a:tcPr>
                 </a:tc>
+                <a:extLst>
+                  <a:ext uri="{0D108BD9-81ED-4DB2-BD59-A6C34878D82A}">
+                    <a16:rowId xmlns:a16="http://schemas.microsoft.com/office/drawing/2014/main" val="10002"/>
+                  </a:ext>
+                </a:extLst>
               </a:tr>
               <a:tr h="370840">
                 <a:tc>
@@ -3492,6 +3770,11 @@
                     </a:solidFill>
                   </a:tcPr>
                 </a:tc>
+                <a:extLst>
+                  <a:ext uri="{0D108BD9-81ED-4DB2-BD59-A6C34878D82A}">
+                    <a16:rowId xmlns:a16="http://schemas.microsoft.com/office/drawing/2014/main" val="10003"/>
+                  </a:ext>
+                </a:extLst>
               </a:tr>
               <a:tr h="370840">
                 <a:tc>
@@ -3578,6 +3861,11 @@
                     </a:solidFill>
                   </a:tcPr>
                 </a:tc>
+                <a:extLst>
+                  <a:ext uri="{0D108BD9-81ED-4DB2-BD59-A6C34878D82A}">
+                    <a16:rowId xmlns:a16="http://schemas.microsoft.com/office/drawing/2014/main" val="10004"/>
+                  </a:ext>
+                </a:extLst>
               </a:tr>
               <a:tr h="370840">
                 <a:tc>
@@ -3664,6 +3952,11 @@
                     </a:solidFill>
                   </a:tcPr>
                 </a:tc>
+                <a:extLst>
+                  <a:ext uri="{0D108BD9-81ED-4DB2-BD59-A6C34878D82A}">
+                    <a16:rowId xmlns:a16="http://schemas.microsoft.com/office/drawing/2014/main" val="10005"/>
+                  </a:ext>
+                </a:extLst>
               </a:tr>
               <a:tr h="370840">
                 <a:tc>
@@ -3750,6 +4043,11 @@
                     </a:solidFill>
                   </a:tcPr>
                 </a:tc>
+                <a:extLst>
+                  <a:ext uri="{0D108BD9-81ED-4DB2-BD59-A6C34878D82A}">
+                    <a16:rowId xmlns:a16="http://schemas.microsoft.com/office/drawing/2014/main" val="10006"/>
+                  </a:ext>
+                </a:extLst>
               </a:tr>
               <a:tr h="370840">
                 <a:tc>
@@ -3836,6 +4134,11 @@
                     </a:solidFill>
                   </a:tcPr>
                 </a:tc>
+                <a:extLst>
+                  <a:ext uri="{0D108BD9-81ED-4DB2-BD59-A6C34878D82A}">
+                    <a16:rowId xmlns:a16="http://schemas.microsoft.com/office/drawing/2014/main" val="10007"/>
+                  </a:ext>
+                </a:extLst>
               </a:tr>
             </a:tbl>
           </a:graphicData>
@@ -3883,85 +4186,271 @@
           <a:p>
             <a:pPr algn="r"/>
             <a:r>
-              <a:rPr lang="ko-KR" altLang="en-US" dirty="0" smtClean="0"/>
+              <a:rPr lang="en-US" altLang="ko-KR" dirty="0"/>
+              <a:t>TUNA</a:t>
+            </a:r>
+          </a:p>
+        </p:txBody>
+      </p:sp>
+      <p:pic>
+        <p:nvPicPr>
+          <p:cNvPr id="17" name="그림 16"/>
+          <p:cNvPicPr>
+            <a:picLocks noChangeAspect="1"/>
+          </p:cNvPicPr>
+          <p:nvPr/>
+        </p:nvPicPr>
+        <p:blipFill>
+          <a:blip r:embed="rId2"/>
+          <a:stretch>
+            <a:fillRect/>
+          </a:stretch>
+        </p:blipFill>
+        <p:spPr>
+          <a:xfrm>
+            <a:off x="1379220" y="746974"/>
+            <a:ext cx="6345180" cy="5783525"/>
+          </a:xfrm>
+          <a:prstGeom prst="rect">
+            <a:avLst/>
+          </a:prstGeom>
+        </p:spPr>
+      </p:pic>
+    </p:spTree>
+  </p:cSld>
+  <p:clrMapOvr>
+    <a:masterClrMapping/>
+  </p:clrMapOvr>
+</p:sld>
+</file>
+
+<file path=ppt/slides/slide4.xml><?xml version="1.0" encoding="utf-8"?>
+<p:sld xmlns:a="http://schemas.openxmlformats.org/drawingml/2006/main" xmlns:r="http://schemas.openxmlformats.org/officeDocument/2006/relationships" xmlns:p="http://schemas.openxmlformats.org/presentationml/2006/main">
+  <p:cSld>
+    <p:spTree>
+      <p:nvGrpSpPr>
+        <p:cNvPr id="1" name=""/>
+        <p:cNvGrpSpPr/>
+        <p:nvPr/>
+      </p:nvGrpSpPr>
+      <p:grpSpPr>
+        <a:xfrm>
+          <a:off x="0" y="0"/>
+          <a:ext cx="0" cy="0"/>
+          <a:chOff x="0" y="0"/>
+          <a:chExt cx="0" cy="0"/>
+        </a:xfrm>
+      </p:grpSpPr>
+      <p:sp>
+        <p:nvSpPr>
+          <p:cNvPr id="2" name="바닥글 개체 틀 1"/>
+          <p:cNvSpPr>
+            <a:spLocks noGrp="1"/>
+          </p:cNvSpPr>
+          <p:nvPr>
+            <p:ph type="ftr" sz="quarter" idx="3"/>
+          </p:nvPr>
+        </p:nvSpPr>
+        <p:spPr/>
+        <p:txBody>
+          <a:bodyPr/>
+          <a:lstStyle/>
+          <a:p>
+            <a:pPr algn="r"/>
+            <a:r>
+              <a:rPr lang="ko-KR" altLang="en-US"/>
               <a:t>팀 명</a:t>
             </a:r>
             <a:endParaRPr lang="en-US" altLang="ko-KR" dirty="0"/>
           </a:p>
         </p:txBody>
       </p:sp>
-      <p:sp>
-        <p:nvSpPr>
-          <p:cNvPr id="24" name="TextBox 23"/>
-          <p:cNvSpPr txBox="1"/>
+      <p:pic>
+        <p:nvPicPr>
+          <p:cNvPr id="3" name="그림 2"/>
+          <p:cNvPicPr>
+            <a:picLocks noChangeAspect="1"/>
+          </p:cNvPicPr>
           <p:nvPr/>
-        </p:nvSpPr>
+        </p:nvPicPr>
+        <p:blipFill>
+          <a:blip r:embed="rId2"/>
+          <a:stretch>
+            <a:fillRect/>
+          </a:stretch>
+        </p:blipFill>
         <p:spPr>
           <a:xfrm>
-            <a:off x="914400" y="931659"/>
-            <a:ext cx="752129" cy="307777"/>
+            <a:off x="167640" y="883301"/>
+            <a:ext cx="8587740" cy="5101821"/>
           </a:xfrm>
           <a:prstGeom prst="rect">
             <a:avLst/>
           </a:prstGeom>
-          <a:noFill/>
         </p:spPr>
+      </p:pic>
+    </p:spTree>
+    <p:extLst>
+      <p:ext uri="{BB962C8B-B14F-4D97-AF65-F5344CB8AC3E}">
+        <p14:creationId xmlns:p14="http://schemas.microsoft.com/office/powerpoint/2010/main" val="1665250424"/>
+      </p:ext>
+    </p:extLst>
+  </p:cSld>
+  <p:clrMapOvr>
+    <a:masterClrMapping/>
+  </p:clrMapOvr>
+</p:sld>
+</file>
+
+<file path=ppt/slides/slide5.xml><?xml version="1.0" encoding="utf-8"?>
+<p:sld xmlns:a="http://schemas.openxmlformats.org/drawingml/2006/main" xmlns:r="http://schemas.openxmlformats.org/officeDocument/2006/relationships" xmlns:p="http://schemas.openxmlformats.org/presentationml/2006/main">
+  <p:cSld>
+    <p:spTree>
+      <p:nvGrpSpPr>
+        <p:cNvPr id="1" name=""/>
+        <p:cNvGrpSpPr/>
+        <p:nvPr/>
+      </p:nvGrpSpPr>
+      <p:grpSpPr>
+        <a:xfrm>
+          <a:off x="0" y="0"/>
+          <a:ext cx="0" cy="0"/>
+          <a:chOff x="0" y="0"/>
+          <a:chExt cx="0" cy="0"/>
+        </a:xfrm>
+      </p:grpSpPr>
+      <p:sp>
+        <p:nvSpPr>
+          <p:cNvPr id="2" name="바닥글 개체 틀 1"/>
+          <p:cNvSpPr>
+            <a:spLocks noGrp="1"/>
+          </p:cNvSpPr>
+          <p:nvPr>
+            <p:ph type="ftr" sz="quarter" idx="3"/>
+          </p:nvPr>
+        </p:nvSpPr>
+        <p:spPr/>
         <p:txBody>
-          <a:bodyPr wrap="none" rtlCol="0">
-            <a:spAutoFit/>
-          </a:bodyPr>
+          <a:bodyPr/>
           <a:lstStyle/>
           <a:p>
+            <a:pPr algn="r"/>
             <a:r>
-              <a:rPr lang="en-US" altLang="ko-KR" dirty="0" smtClean="0"/>
-              <a:t>&lt;</a:t>
+              <a:rPr lang="ko-KR" altLang="en-US"/>
+              <a:t>팀 명</a:t>
             </a:r>
-            <a:r>
-              <a:rPr lang="ko-KR" altLang="en-US" dirty="0" smtClean="0"/>
-              <a:t>예시</a:t>
-            </a:r>
-            <a:r>
-              <a:rPr lang="en-US" altLang="ko-KR" dirty="0" smtClean="0"/>
-              <a:t>&gt;</a:t>
-            </a:r>
-            <a:endParaRPr lang="ko-KR" altLang="en-US" dirty="0"/>
+            <a:endParaRPr lang="en-US" altLang="ko-KR" dirty="0"/>
           </a:p>
         </p:txBody>
       </p:sp>
       <p:pic>
         <p:nvPicPr>
-          <p:cNvPr id="25" name="Picture 3"/>
+          <p:cNvPr id="3" name="그림 2"/>
           <p:cNvPicPr>
-            <a:picLocks noChangeAspect="1" noChangeArrowheads="1"/>
+            <a:picLocks noChangeAspect="1"/>
           </p:cNvPicPr>
           <p:nvPr/>
         </p:nvPicPr>
         <p:blipFill>
-          <a:blip r:embed="rId2" cstate="print"/>
-          <a:srcRect/>
+          <a:blip r:embed="rId2"/>
           <a:stretch>
             <a:fillRect/>
           </a:stretch>
         </p:blipFill>
-        <p:spPr bwMode="auto">
+        <p:spPr>
           <a:xfrm>
-            <a:off x="1146106" y="1806652"/>
-            <a:ext cx="7058326" cy="1290231"/>
+            <a:off x="1715073" y="976055"/>
+            <a:ext cx="5746053" cy="5195802"/>
           </a:xfrm>
           <a:prstGeom prst="rect">
             <a:avLst/>
           </a:prstGeom>
-          <a:noFill/>
-          <a:ln w="9525">
-            <a:noFill/>
-            <a:miter lim="800000"/>
-            <a:headEnd/>
-            <a:tailEnd/>
-          </a:ln>
-          <a:effectLst/>
         </p:spPr>
       </p:pic>
     </p:spTree>
+    <p:extLst>
+      <p:ext uri="{BB962C8B-B14F-4D97-AF65-F5344CB8AC3E}">
+        <p14:creationId xmlns:p14="http://schemas.microsoft.com/office/powerpoint/2010/main" val="632426846"/>
+      </p:ext>
+    </p:extLst>
+  </p:cSld>
+  <p:clrMapOvr>
+    <a:masterClrMapping/>
+  </p:clrMapOvr>
+</p:sld>
+</file>
+
+<file path=ppt/slides/slide6.xml><?xml version="1.0" encoding="utf-8"?>
+<p:sld xmlns:a="http://schemas.openxmlformats.org/drawingml/2006/main" xmlns:r="http://schemas.openxmlformats.org/officeDocument/2006/relationships" xmlns:p="http://schemas.openxmlformats.org/presentationml/2006/main">
+  <p:cSld>
+    <p:spTree>
+      <p:nvGrpSpPr>
+        <p:cNvPr id="1" name=""/>
+        <p:cNvGrpSpPr/>
+        <p:nvPr/>
+      </p:nvGrpSpPr>
+      <p:grpSpPr>
+        <a:xfrm>
+          <a:off x="0" y="0"/>
+          <a:ext cx="0" cy="0"/>
+          <a:chOff x="0" y="0"/>
+          <a:chExt cx="0" cy="0"/>
+        </a:xfrm>
+      </p:grpSpPr>
+      <p:sp>
+        <p:nvSpPr>
+          <p:cNvPr id="2" name="바닥글 개체 틀 1"/>
+          <p:cNvSpPr>
+            <a:spLocks noGrp="1"/>
+          </p:cNvSpPr>
+          <p:nvPr>
+            <p:ph type="ftr" sz="quarter" idx="3"/>
+          </p:nvPr>
+        </p:nvSpPr>
+        <p:spPr/>
+        <p:txBody>
+          <a:bodyPr/>
+          <a:lstStyle/>
+          <a:p>
+            <a:pPr algn="r"/>
+            <a:r>
+              <a:rPr lang="ko-KR" altLang="en-US"/>
+              <a:t>팀 명</a:t>
+            </a:r>
+            <a:endParaRPr lang="en-US" altLang="ko-KR" dirty="0"/>
+          </a:p>
+        </p:txBody>
+      </p:sp>
+      <p:pic>
+        <p:nvPicPr>
+          <p:cNvPr id="3" name="그림 2"/>
+          <p:cNvPicPr>
+            <a:picLocks noChangeAspect="1"/>
+          </p:cNvPicPr>
+          <p:nvPr/>
+        </p:nvPicPr>
+        <p:blipFill>
+          <a:blip r:embed="rId2"/>
+          <a:stretch>
+            <a:fillRect/>
+          </a:stretch>
+        </p:blipFill>
+        <p:spPr>
+          <a:xfrm>
+            <a:off x="200022" y="922020"/>
+            <a:ext cx="8782275" cy="4736610"/>
+          </a:xfrm>
+          <a:prstGeom prst="rect">
+            <a:avLst/>
+          </a:prstGeom>
+        </p:spPr>
+      </p:pic>
+    </p:spTree>
+    <p:extLst>
+      <p:ext uri="{BB962C8B-B14F-4D97-AF65-F5344CB8AC3E}">
+        <p14:creationId xmlns:p14="http://schemas.microsoft.com/office/powerpoint/2010/main" val="3338057399"/>
+      </p:ext>
+    </p:extLst>
   </p:cSld>
   <p:clrMapOvr>
     <a:masterClrMapping/>

</xml_diff>

<commit_message>
Classs Diagram, Frame4/Fram3/GovalVal Updated
</commit_message>
<xml_diff>
--- a/doc/3_ 설계서/Class Design.pptx
+++ b/doc/3_ 설계서/Class Design.pptx
@@ -5,10 +5,10 @@
     <p:sldMasterId id="2147483655" r:id="rId1"/>
   </p:sldMasterIdLst>
   <p:notesMasterIdLst>
-    <p:notesMasterId r:id="rId8"/>
+    <p:notesMasterId r:id="rId11"/>
   </p:notesMasterIdLst>
   <p:handoutMasterIdLst>
-    <p:handoutMasterId r:id="rId9"/>
+    <p:handoutMasterId r:id="rId12"/>
   </p:handoutMasterIdLst>
   <p:sldIdLst>
     <p:sldId id="256" r:id="rId2"/>
@@ -17,6 +17,9 @@
     <p:sldId id="259" r:id="rId5"/>
     <p:sldId id="261" r:id="rId6"/>
     <p:sldId id="260" r:id="rId7"/>
+    <p:sldId id="262" r:id="rId8"/>
+    <p:sldId id="263" r:id="rId9"/>
+    <p:sldId id="264" r:id="rId10"/>
   </p:sldIdLst>
   <p:sldSz cx="9144000" cy="6858000" type="screen4x3"/>
   <p:notesSz cx="6797675" cy="9928225"/>
@@ -3185,14 +3188,14 @@
             <p:ph idx="1"/>
             <p:extLst>
               <p:ext uri="{D42A27DB-BD31-4B8C-83A1-F6EECF244321}">
-                <p14:modId xmlns:p14="http://schemas.microsoft.com/office/powerpoint/2010/main" val="2886462991"/>
+                <p14:modId xmlns:p14="http://schemas.microsoft.com/office/powerpoint/2010/main" val="932198133"/>
               </p:ext>
             </p:extLst>
           </p:nvPr>
         </p:nvGraphicFramePr>
         <p:xfrm>
           <a:off x="280988" y="1025525"/>
-          <a:ext cx="8582024" cy="3235960"/>
+          <a:ext cx="8582024" cy="3322320"/>
         </p:xfrm>
         <a:graphic>
           <a:graphicData uri="http://schemas.openxmlformats.org/drawingml/2006/table">
@@ -3601,13 +3604,66 @@
                     <a:lstStyle/>
                     <a:p>
                       <a:pPr algn="ctr" latinLnBrk="1"/>
-                      <a:endParaRPr lang="ko-KR" altLang="en-US" sz="1200" b="0" dirty="0">
-                        <a:solidFill>
-                          <a:schemeClr val="tx1"/>
-                        </a:solidFill>
-                        <a:latin typeface="맑은 고딕" pitchFamily="50" charset="-127"/>
-                        <a:ea typeface="맑은 고딕" pitchFamily="50" charset="-127"/>
-                      </a:endParaRPr>
+                      <a:r>
+                        <a:rPr lang="en-US" altLang="ko-KR" sz="1200" b="0" dirty="0">
+                          <a:solidFill>
+                            <a:schemeClr val="tx1"/>
+                          </a:solidFill>
+                          <a:latin typeface="맑은 고딕" pitchFamily="50" charset="-127"/>
+                          <a:ea typeface="맑은 고딕" pitchFamily="50" charset="-127"/>
+                        </a:rPr>
+                        <a:t>2017</a:t>
+                      </a:r>
+                      <a:r>
+                        <a:rPr lang="ko-KR" altLang="en-US" sz="1200" b="0" dirty="0">
+                          <a:solidFill>
+                            <a:schemeClr val="tx1"/>
+                          </a:solidFill>
+                          <a:latin typeface="맑은 고딕" pitchFamily="50" charset="-127"/>
+                          <a:ea typeface="맑은 고딕" pitchFamily="50" charset="-127"/>
+                        </a:rPr>
+                        <a:t>년 </a:t>
+                      </a:r>
+                      <a:r>
+                        <a:rPr lang="en-US" altLang="ko-KR" sz="1200" b="0" dirty="0">
+                          <a:solidFill>
+                            <a:schemeClr val="tx1"/>
+                          </a:solidFill>
+                          <a:latin typeface="맑은 고딕" pitchFamily="50" charset="-127"/>
+                          <a:ea typeface="맑은 고딕" pitchFamily="50" charset="-127"/>
+                        </a:rPr>
+                        <a:t>05</a:t>
+                      </a:r>
+                      <a:r>
+                        <a:rPr lang="ko-KR" altLang="en-US" sz="1200" b="0" dirty="0">
+                          <a:solidFill>
+                            <a:schemeClr val="tx1"/>
+                          </a:solidFill>
+                          <a:latin typeface="맑은 고딕" pitchFamily="50" charset="-127"/>
+                          <a:ea typeface="맑은 고딕" pitchFamily="50" charset="-127"/>
+                        </a:rPr>
+                        <a:t>월 </a:t>
+                      </a:r>
+                      <a:r>
+                        <a:rPr lang="en-US" altLang="ko-KR" sz="1200" b="0" dirty="0">
+                          <a:solidFill>
+                            <a:schemeClr val="tx1"/>
+                          </a:solidFill>
+                          <a:latin typeface="맑은 고딕" pitchFamily="50" charset="-127"/>
+                          <a:ea typeface="맑은 고딕" pitchFamily="50" charset="-127"/>
+                        </a:rPr>
+                        <a:t>25</a:t>
+                      </a:r>
+                      <a:r>
+                        <a:rPr lang="ko-KR" altLang="en-US" sz="1200" b="0" dirty="0">
+                          <a:solidFill>
+                            <a:schemeClr val="tx1"/>
+                          </a:solidFill>
+                          <a:latin typeface="맑은 고딕" pitchFamily="50" charset="-127"/>
+                          <a:ea typeface="맑은 고딕" pitchFamily="50" charset="-127"/>
+                        </a:rPr>
+                        <a:t>일</a:t>
+                      </a:r>
                     </a:p>
                   </a:txBody>
                   <a:tcPr anchor="ctr">
@@ -3622,6 +3678,16 @@
                     <a:lstStyle/>
                     <a:p>
                       <a:pPr algn="ctr" latinLnBrk="1"/>
+                      <a:r>
+                        <a:rPr lang="en-US" altLang="ko-KR" sz="1200" b="0" dirty="0">
+                          <a:solidFill>
+                            <a:schemeClr val="tx1"/>
+                          </a:solidFill>
+                          <a:latin typeface="맑은 고딕" pitchFamily="50" charset="-127"/>
+                          <a:ea typeface="맑은 고딕" pitchFamily="50" charset="-127"/>
+                        </a:rPr>
+                        <a:t>01</a:t>
+                      </a:r>
                       <a:endParaRPr lang="ko-KR" altLang="en-US" sz="1200" b="0" dirty="0">
                         <a:solidFill>
                           <a:schemeClr val="tx1"/>
@@ -3643,13 +3709,46 @@
                     <a:lstStyle/>
                     <a:p>
                       <a:pPr latinLnBrk="1"/>
-                      <a:endParaRPr lang="ko-KR" altLang="en-US" sz="1200" b="0">
-                        <a:solidFill>
-                          <a:schemeClr val="tx1"/>
-                        </a:solidFill>
-                        <a:latin typeface="맑은 고딕" pitchFamily="50" charset="-127"/>
-                        <a:ea typeface="맑은 고딕" pitchFamily="50" charset="-127"/>
-                      </a:endParaRPr>
+                      <a:r>
+                        <a:rPr lang="en-US" altLang="ko-KR" sz="1200" b="0" dirty="0">
+                          <a:solidFill>
+                            <a:schemeClr val="tx1"/>
+                          </a:solidFill>
+                          <a:latin typeface="맑은 고딕" pitchFamily="50" charset="-127"/>
+                          <a:ea typeface="맑은 고딕" pitchFamily="50" charset="-127"/>
+                        </a:rPr>
+                        <a:t>Frame4, Frame3, </a:t>
+                      </a:r>
+                      <a:r>
+                        <a:rPr lang="en-US" altLang="ko-KR" sz="1200" b="0" dirty="0" err="1">
+                          <a:solidFill>
+                            <a:schemeClr val="tx1"/>
+                          </a:solidFill>
+                          <a:latin typeface="맑은 고딕" pitchFamily="50" charset="-127"/>
+                          <a:ea typeface="맑은 고딕" pitchFamily="50" charset="-127"/>
+                        </a:rPr>
+                        <a:t>GlovalVal</a:t>
+                      </a:r>
+                      <a:r>
+                        <a:rPr lang="en-US" altLang="ko-KR" sz="1200" b="0" dirty="0">
+                          <a:solidFill>
+                            <a:schemeClr val="tx1"/>
+                          </a:solidFill>
+                          <a:latin typeface="맑은 고딕" pitchFamily="50" charset="-127"/>
+                          <a:ea typeface="맑은 고딕" pitchFamily="50" charset="-127"/>
+                        </a:rPr>
+                        <a:t> </a:t>
+                      </a:r>
+                      <a:r>
+                        <a:rPr lang="ko-KR" altLang="en-US" sz="1200" b="0" dirty="0">
+                          <a:solidFill>
+                            <a:schemeClr val="tx1"/>
+                          </a:solidFill>
+                          <a:latin typeface="맑은 고딕" pitchFamily="50" charset="-127"/>
+                          <a:ea typeface="맑은 고딕" pitchFamily="50" charset="-127"/>
+                        </a:rPr>
+                        <a:t>세부 항목 업데이트</a:t>
+                      </a:r>
                     </a:p>
                   </a:txBody>
                   <a:tcPr anchor="ctr">
@@ -3664,13 +3763,16 @@
                     <a:lstStyle/>
                     <a:p>
                       <a:pPr algn="ctr" latinLnBrk="1"/>
-                      <a:endParaRPr lang="ko-KR" altLang="en-US" sz="1200" b="0" dirty="0">
-                        <a:solidFill>
-                          <a:schemeClr val="tx1"/>
-                        </a:solidFill>
-                        <a:latin typeface="맑은 고딕" pitchFamily="50" charset="-127"/>
-                        <a:ea typeface="맑은 고딕" pitchFamily="50" charset="-127"/>
-                      </a:endParaRPr>
+                      <a:r>
+                        <a:rPr lang="ko-KR" altLang="en-US" sz="1200" b="0" dirty="0">
+                          <a:solidFill>
+                            <a:schemeClr val="tx1"/>
+                          </a:solidFill>
+                          <a:latin typeface="맑은 고딕" pitchFamily="50" charset="-127"/>
+                          <a:ea typeface="맑은 고딕" pitchFamily="50" charset="-127"/>
+                        </a:rPr>
+                        <a:t>김은호</a:t>
+                      </a:r>
                     </a:p>
                   </a:txBody>
                   <a:tcPr anchor="ctr">
@@ -4449,6 +4551,240 @@
     <p:extLst>
       <p:ext uri="{BB962C8B-B14F-4D97-AF65-F5344CB8AC3E}">
         <p14:creationId xmlns:p14="http://schemas.microsoft.com/office/powerpoint/2010/main" val="3338057399"/>
+      </p:ext>
+    </p:extLst>
+  </p:cSld>
+  <p:clrMapOvr>
+    <a:masterClrMapping/>
+  </p:clrMapOvr>
+</p:sld>
+</file>
+
+<file path=ppt/slides/slide7.xml><?xml version="1.0" encoding="utf-8"?>
+<p:sld xmlns:a="http://schemas.openxmlformats.org/drawingml/2006/main" xmlns:r="http://schemas.openxmlformats.org/officeDocument/2006/relationships" xmlns:p="http://schemas.openxmlformats.org/presentationml/2006/main">
+  <p:cSld>
+    <p:spTree>
+      <p:nvGrpSpPr>
+        <p:cNvPr id="1" name=""/>
+        <p:cNvGrpSpPr/>
+        <p:nvPr/>
+      </p:nvGrpSpPr>
+      <p:grpSpPr>
+        <a:xfrm>
+          <a:off x="0" y="0"/>
+          <a:ext cx="0" cy="0"/>
+          <a:chOff x="0" y="0"/>
+          <a:chExt cx="0" cy="0"/>
+        </a:xfrm>
+      </p:grpSpPr>
+      <p:sp>
+        <p:nvSpPr>
+          <p:cNvPr id="2" name="바닥글 개체 틀 1"/>
+          <p:cNvSpPr>
+            <a:spLocks noGrp="1"/>
+          </p:cNvSpPr>
+          <p:nvPr>
+            <p:ph type="ftr" sz="quarter" idx="3"/>
+          </p:nvPr>
+        </p:nvSpPr>
+        <p:spPr/>
+        <p:txBody>
+          <a:bodyPr/>
+          <a:lstStyle/>
+          <a:p>
+            <a:pPr algn="r"/>
+            <a:r>
+              <a:rPr lang="ko-KR" altLang="en-US"/>
+              <a:t>팀 명</a:t>
+            </a:r>
+            <a:endParaRPr lang="en-US" altLang="ko-KR" dirty="0"/>
+          </a:p>
+        </p:txBody>
+      </p:sp>
+      <p:pic>
+        <p:nvPicPr>
+          <p:cNvPr id="7" name="그림 6"/>
+          <p:cNvPicPr>
+            <a:picLocks noChangeAspect="1"/>
+          </p:cNvPicPr>
+          <p:nvPr/>
+        </p:nvPicPr>
+        <p:blipFill>
+          <a:blip r:embed="rId2"/>
+          <a:stretch>
+            <a:fillRect/>
+          </a:stretch>
+        </p:blipFill>
+        <p:spPr>
+          <a:xfrm>
+            <a:off x="217714" y="877833"/>
+            <a:ext cx="8712463" cy="5300062"/>
+          </a:xfrm>
+          <a:prstGeom prst="rect">
+            <a:avLst/>
+          </a:prstGeom>
+        </p:spPr>
+      </p:pic>
+    </p:spTree>
+    <p:extLst>
+      <p:ext uri="{BB962C8B-B14F-4D97-AF65-F5344CB8AC3E}">
+        <p14:creationId xmlns:p14="http://schemas.microsoft.com/office/powerpoint/2010/main" val="4003923472"/>
+      </p:ext>
+    </p:extLst>
+  </p:cSld>
+  <p:clrMapOvr>
+    <a:masterClrMapping/>
+  </p:clrMapOvr>
+</p:sld>
+</file>
+
+<file path=ppt/slides/slide8.xml><?xml version="1.0" encoding="utf-8"?>
+<p:sld xmlns:a="http://schemas.openxmlformats.org/drawingml/2006/main" xmlns:r="http://schemas.openxmlformats.org/officeDocument/2006/relationships" xmlns:p="http://schemas.openxmlformats.org/presentationml/2006/main">
+  <p:cSld>
+    <p:spTree>
+      <p:nvGrpSpPr>
+        <p:cNvPr id="1" name=""/>
+        <p:cNvGrpSpPr/>
+        <p:nvPr/>
+      </p:nvGrpSpPr>
+      <p:grpSpPr>
+        <a:xfrm>
+          <a:off x="0" y="0"/>
+          <a:ext cx="0" cy="0"/>
+          <a:chOff x="0" y="0"/>
+          <a:chExt cx="0" cy="0"/>
+        </a:xfrm>
+      </p:grpSpPr>
+      <p:sp>
+        <p:nvSpPr>
+          <p:cNvPr id="2" name="바닥글 개체 틀 1"/>
+          <p:cNvSpPr>
+            <a:spLocks noGrp="1"/>
+          </p:cNvSpPr>
+          <p:nvPr>
+            <p:ph type="ftr" sz="quarter" idx="3"/>
+          </p:nvPr>
+        </p:nvSpPr>
+        <p:spPr/>
+        <p:txBody>
+          <a:bodyPr/>
+          <a:lstStyle/>
+          <a:p>
+            <a:pPr algn="r"/>
+            <a:r>
+              <a:rPr lang="ko-KR" altLang="en-US"/>
+              <a:t>팀 명</a:t>
+            </a:r>
+            <a:endParaRPr lang="en-US" altLang="ko-KR" dirty="0"/>
+          </a:p>
+        </p:txBody>
+      </p:sp>
+      <p:pic>
+        <p:nvPicPr>
+          <p:cNvPr id="7" name="그림 6"/>
+          <p:cNvPicPr>
+            <a:picLocks noChangeAspect="1"/>
+          </p:cNvPicPr>
+          <p:nvPr/>
+        </p:nvPicPr>
+        <p:blipFill>
+          <a:blip r:embed="rId2"/>
+          <a:stretch>
+            <a:fillRect/>
+          </a:stretch>
+        </p:blipFill>
+        <p:spPr>
+          <a:xfrm>
+            <a:off x="326108" y="1430955"/>
+            <a:ext cx="8534400" cy="4134665"/>
+          </a:xfrm>
+          <a:prstGeom prst="rect">
+            <a:avLst/>
+          </a:prstGeom>
+        </p:spPr>
+      </p:pic>
+    </p:spTree>
+    <p:extLst>
+      <p:ext uri="{BB962C8B-B14F-4D97-AF65-F5344CB8AC3E}">
+        <p14:creationId xmlns:p14="http://schemas.microsoft.com/office/powerpoint/2010/main" val="683381687"/>
+      </p:ext>
+    </p:extLst>
+  </p:cSld>
+  <p:clrMapOvr>
+    <a:masterClrMapping/>
+  </p:clrMapOvr>
+</p:sld>
+</file>
+
+<file path=ppt/slides/slide9.xml><?xml version="1.0" encoding="utf-8"?>
+<p:sld xmlns:a="http://schemas.openxmlformats.org/drawingml/2006/main" xmlns:r="http://schemas.openxmlformats.org/officeDocument/2006/relationships" xmlns:p="http://schemas.openxmlformats.org/presentationml/2006/main">
+  <p:cSld>
+    <p:spTree>
+      <p:nvGrpSpPr>
+        <p:cNvPr id="1" name=""/>
+        <p:cNvGrpSpPr/>
+        <p:nvPr/>
+      </p:nvGrpSpPr>
+      <p:grpSpPr>
+        <a:xfrm>
+          <a:off x="0" y="0"/>
+          <a:ext cx="0" cy="0"/>
+          <a:chOff x="0" y="0"/>
+          <a:chExt cx="0" cy="0"/>
+        </a:xfrm>
+      </p:grpSpPr>
+      <p:sp>
+        <p:nvSpPr>
+          <p:cNvPr id="2" name="바닥글 개체 틀 1"/>
+          <p:cNvSpPr>
+            <a:spLocks noGrp="1"/>
+          </p:cNvSpPr>
+          <p:nvPr>
+            <p:ph type="ftr" sz="quarter" idx="3"/>
+          </p:nvPr>
+        </p:nvSpPr>
+        <p:spPr/>
+        <p:txBody>
+          <a:bodyPr/>
+          <a:lstStyle/>
+          <a:p>
+            <a:pPr algn="r"/>
+            <a:r>
+              <a:rPr lang="ko-KR" altLang="en-US"/>
+              <a:t>팀 명</a:t>
+            </a:r>
+            <a:endParaRPr lang="en-US" altLang="ko-KR" dirty="0"/>
+          </a:p>
+        </p:txBody>
+      </p:sp>
+      <p:pic>
+        <p:nvPicPr>
+          <p:cNvPr id="5" name="그림 4"/>
+          <p:cNvPicPr>
+            <a:picLocks noChangeAspect="1"/>
+          </p:cNvPicPr>
+          <p:nvPr/>
+        </p:nvPicPr>
+        <p:blipFill>
+          <a:blip r:embed="rId2"/>
+          <a:stretch>
+            <a:fillRect/>
+          </a:stretch>
+        </p:blipFill>
+        <p:spPr>
+          <a:xfrm>
+            <a:off x="258159" y="1541417"/>
+            <a:ext cx="8602349" cy="4028843"/>
+          </a:xfrm>
+          <a:prstGeom prst="rect">
+            <a:avLst/>
+          </a:prstGeom>
+        </p:spPr>
+      </p:pic>
+    </p:spTree>
+    <p:extLst>
+      <p:ext uri="{BB962C8B-B14F-4D97-AF65-F5344CB8AC3E}">
+        <p14:creationId xmlns:p14="http://schemas.microsoft.com/office/powerpoint/2010/main" val="77776264"/>
       </p:ext>
     </p:extLst>
   </p:cSld>

</xml_diff>

<commit_message>
doc/3_ 설계서/Class Design.pptx Class Design_4_tuna_김태현_20170525_02 내용 검토
</commit_message>
<xml_diff>
--- a/doc/3_ 설계서/Class Design.pptx
+++ b/doc/3_ 설계서/Class Design.pptx
@@ -150,7 +150,7 @@
   </p:defaultTextStyle>
   <p:extLst>
     <p:ext uri="{EFAFB233-063F-42B5-8137-9DF3F51BA10A}">
-      <p15:sldGuideLst xmlns:p15="http://schemas.microsoft.com/office/powerpoint/2012/main">
+      <p15:sldGuideLst xmlns:p15="http://schemas.microsoft.com/office/powerpoint/2012/main" xmlns="">
         <p15:guide id="1" orient="horz">
           <p15:clr>
             <a:srgbClr val="A4A3A4"/>
@@ -169,7 +169,7 @@
       </p15:sldGuideLst>
     </p:ext>
     <p:ext uri="{2D200454-40CA-4A62-9FC3-DE9A4176ACB9}">
-      <p15:notesGuideLst xmlns:p15="http://schemas.microsoft.com/office/powerpoint/2012/main">
+      <p15:notesGuideLst xmlns:p15="http://schemas.microsoft.com/office/powerpoint/2012/main" xmlns="">
         <p15:guide id="1" orient="horz" pos="3126">
           <p15:clr>
             <a:srgbClr val="A4A3A4"/>
@@ -407,7 +407,7 @@
     </p:spTree>
     <p:extLst>
       <p:ext uri="{BB962C8B-B14F-4D97-AF65-F5344CB8AC3E}">
-        <p14:creationId xmlns:p14="http://schemas.microsoft.com/office/powerpoint/2010/main" val="508471591"/>
+        <p14:creationId xmlns:p14="http://schemas.microsoft.com/office/powerpoint/2010/main" xmlns="" val="508471591"/>
       </p:ext>
     </p:extLst>
   </p:cSld>
@@ -733,7 +733,7 @@
     </p:spTree>
     <p:extLst>
       <p:ext uri="{BB962C8B-B14F-4D97-AF65-F5344CB8AC3E}">
-        <p14:creationId xmlns:p14="http://schemas.microsoft.com/office/powerpoint/2010/main" val="860101577"/>
+        <p14:creationId xmlns:p14="http://schemas.microsoft.com/office/powerpoint/2010/main" xmlns="" val="860101577"/>
       </p:ext>
     </p:extLst>
   </p:cSld>
@@ -1072,6 +1072,10 @@
             </a:lvl1pPr>
           </a:lstStyle>
           <a:p>
+            <a:r>
+              <a:rPr lang="en-US" altLang="ko-KR" dirty="0"/>
+              <a:t/>
+            </a:r>
             <a:br>
               <a:rPr lang="en-US" altLang="ko-KR" dirty="0"/>
             </a:br>
@@ -1116,7 +1120,7 @@
           <p:nvPr userDrawn="1">
             <p:extLst>
               <p:ext uri="{D42A27DB-BD31-4B8C-83A1-F6EECF244321}">
-                <p14:modId xmlns:p14="http://schemas.microsoft.com/office/powerpoint/2010/main" val="2642257216"/>
+                <p14:modId xmlns:p14="http://schemas.microsoft.com/office/powerpoint/2010/main" xmlns="" val="2642257216"/>
               </p:ext>
             </p:extLst>
           </p:nvPr>
@@ -1133,28 +1137,28 @@
                 <a:gridCol w="1022523">
                   <a:extLst>
                     <a:ext uri="{9D8B030D-6E8A-4147-A177-3AD203B41FA5}">
-                      <a16:colId xmlns:a16="http://schemas.microsoft.com/office/drawing/2014/main" val="20000"/>
+                      <a16:colId xmlns:a16="http://schemas.microsoft.com/office/drawing/2014/main" xmlns="" val="20000"/>
                     </a:ext>
                   </a:extLst>
                 </a:gridCol>
                 <a:gridCol w="3439486">
                   <a:extLst>
                     <a:ext uri="{9D8B030D-6E8A-4147-A177-3AD203B41FA5}">
-                      <a16:colId xmlns:a16="http://schemas.microsoft.com/office/drawing/2014/main" val="20001"/>
+                      <a16:colId xmlns:a16="http://schemas.microsoft.com/office/drawing/2014/main" xmlns="" val="20001"/>
                     </a:ext>
                   </a:extLst>
                 </a:gridCol>
                 <a:gridCol w="947956">
                   <a:extLst>
                     <a:ext uri="{9D8B030D-6E8A-4147-A177-3AD203B41FA5}">
-                      <a16:colId xmlns:a16="http://schemas.microsoft.com/office/drawing/2014/main" val="20002"/>
+                      <a16:colId xmlns:a16="http://schemas.microsoft.com/office/drawing/2014/main" xmlns="" val="20002"/>
                     </a:ext>
                   </a:extLst>
                 </a:gridCol>
                 <a:gridCol w="3523377">
                   <a:extLst>
                     <a:ext uri="{9D8B030D-6E8A-4147-A177-3AD203B41FA5}">
-                      <a16:colId xmlns:a16="http://schemas.microsoft.com/office/drawing/2014/main" val="20003"/>
+                      <a16:colId xmlns:a16="http://schemas.microsoft.com/office/drawing/2014/main" xmlns="" val="20003"/>
                     </a:ext>
                   </a:extLst>
                 </a:gridCol>
@@ -1570,7 +1574,7 @@
                 </a:tc>
                 <a:extLst>
                   <a:ext uri="{0D108BD9-81ED-4DB2-BD59-A6C34878D82A}">
-                    <a16:rowId xmlns:a16="http://schemas.microsoft.com/office/drawing/2014/main" val="10000"/>
+                    <a16:rowId xmlns:a16="http://schemas.microsoft.com/office/drawing/2014/main" xmlns="" val="10000"/>
                   </a:ext>
                 </a:extLst>
               </a:tr>
@@ -1929,7 +1933,7 @@
                 </a:tc>
                 <a:extLst>
                   <a:ext uri="{0D108BD9-81ED-4DB2-BD59-A6C34878D82A}">
-                    <a16:rowId xmlns:a16="http://schemas.microsoft.com/office/drawing/2014/main" val="10001"/>
+                    <a16:rowId xmlns:a16="http://schemas.microsoft.com/office/drawing/2014/main" xmlns="" val="10001"/>
                   </a:ext>
                 </a:extLst>
               </a:tr>
@@ -3063,6 +3067,10 @@
           <a:bodyPr/>
           <a:lstStyle/>
           <a:p>
+            <a:r>
+              <a:rPr lang="en-US" altLang="ko-KR" dirty="0"/>
+              <a:t/>
+            </a:r>
             <a:br>
               <a:rPr lang="en-US" altLang="ko-KR" dirty="0"/>
             </a:br>
@@ -3188,7 +3196,7 @@
             <p:ph idx="1"/>
             <p:extLst>
               <p:ext uri="{D42A27DB-BD31-4B8C-83A1-F6EECF244321}">
-                <p14:modId xmlns:p14="http://schemas.microsoft.com/office/powerpoint/2010/main" val="932198133"/>
+                <p14:modId xmlns:p14="http://schemas.microsoft.com/office/powerpoint/2010/main" xmlns="" val="932198133"/>
               </p:ext>
             </p:extLst>
           </p:nvPr>
@@ -3207,28 +3215,28 @@
                 <a:gridCol w="2145506">
                   <a:extLst>
                     <a:ext uri="{9D8B030D-6E8A-4147-A177-3AD203B41FA5}">
-                      <a16:colId xmlns:a16="http://schemas.microsoft.com/office/drawing/2014/main" val="20000"/>
+                      <a16:colId xmlns:a16="http://schemas.microsoft.com/office/drawing/2014/main" xmlns="" val="20000"/>
                     </a:ext>
                   </a:extLst>
                 </a:gridCol>
                 <a:gridCol w="2145506">
                   <a:extLst>
                     <a:ext uri="{9D8B030D-6E8A-4147-A177-3AD203B41FA5}">
-                      <a16:colId xmlns:a16="http://schemas.microsoft.com/office/drawing/2014/main" val="20001"/>
+                      <a16:colId xmlns:a16="http://schemas.microsoft.com/office/drawing/2014/main" xmlns="" val="20001"/>
                     </a:ext>
                   </a:extLst>
                 </a:gridCol>
                 <a:gridCol w="2145506">
                   <a:extLst>
                     <a:ext uri="{9D8B030D-6E8A-4147-A177-3AD203B41FA5}">
-                      <a16:colId xmlns:a16="http://schemas.microsoft.com/office/drawing/2014/main" val="20002"/>
+                      <a16:colId xmlns:a16="http://schemas.microsoft.com/office/drawing/2014/main" xmlns="" val="20002"/>
                     </a:ext>
                   </a:extLst>
                 </a:gridCol>
                 <a:gridCol w="2145506">
                   <a:extLst>
                     <a:ext uri="{9D8B030D-6E8A-4147-A177-3AD203B41FA5}">
-                      <a16:colId xmlns:a16="http://schemas.microsoft.com/office/drawing/2014/main" val="20003"/>
+                      <a16:colId xmlns:a16="http://schemas.microsoft.com/office/drawing/2014/main" xmlns="" val="20003"/>
                     </a:ext>
                   </a:extLst>
                 </a:gridCol>
@@ -3356,7 +3364,7 @@
                 </a:tc>
                 <a:extLst>
                   <a:ext uri="{0D108BD9-81ED-4DB2-BD59-A6C34878D82A}">
-                    <a16:rowId xmlns:a16="http://schemas.microsoft.com/office/drawing/2014/main" val="10000"/>
+                    <a16:rowId xmlns:a16="http://schemas.microsoft.com/office/drawing/2014/main" xmlns="" val="10000"/>
                   </a:ext>
                 </a:extLst>
               </a:tr>
@@ -3593,7 +3601,7 @@
                 </a:tc>
                 <a:extLst>
                   <a:ext uri="{0D108BD9-81ED-4DB2-BD59-A6C34878D82A}">
-                    <a16:rowId xmlns:a16="http://schemas.microsoft.com/office/drawing/2014/main" val="10001"/>
+                    <a16:rowId xmlns:a16="http://schemas.microsoft.com/office/drawing/2014/main" xmlns="" val="10001"/>
                   </a:ext>
                 </a:extLst>
               </a:tr>
@@ -3783,7 +3791,7 @@
                 </a:tc>
                 <a:extLst>
                   <a:ext uri="{0D108BD9-81ED-4DB2-BD59-A6C34878D82A}">
-                    <a16:rowId xmlns:a16="http://schemas.microsoft.com/office/drawing/2014/main" val="10002"/>
+                    <a16:rowId xmlns:a16="http://schemas.microsoft.com/office/drawing/2014/main" xmlns="" val="10002"/>
                   </a:ext>
                 </a:extLst>
               </a:tr>
@@ -3794,6 +3802,66 @@
                     <a:lstStyle/>
                     <a:p>
                       <a:pPr algn="ctr" latinLnBrk="1"/>
+                      <a:r>
+                        <a:rPr lang="en-US" altLang="ko-KR" sz="1200" b="0" dirty="0" smtClean="0">
+                          <a:solidFill>
+                            <a:schemeClr val="tx1"/>
+                          </a:solidFill>
+                          <a:latin typeface="맑은 고딕" pitchFamily="50" charset="-127"/>
+                          <a:ea typeface="맑은 고딕" pitchFamily="50" charset="-127"/>
+                        </a:rPr>
+                        <a:t>2017</a:t>
+                      </a:r>
+                      <a:r>
+                        <a:rPr lang="ko-KR" altLang="en-US" sz="1200" b="0" dirty="0" smtClean="0">
+                          <a:solidFill>
+                            <a:schemeClr val="tx1"/>
+                          </a:solidFill>
+                          <a:latin typeface="맑은 고딕" pitchFamily="50" charset="-127"/>
+                          <a:ea typeface="맑은 고딕" pitchFamily="50" charset="-127"/>
+                        </a:rPr>
+                        <a:t>년 </a:t>
+                      </a:r>
+                      <a:r>
+                        <a:rPr lang="en-US" altLang="ko-KR" sz="1200" b="0" dirty="0" smtClean="0">
+                          <a:solidFill>
+                            <a:schemeClr val="tx1"/>
+                          </a:solidFill>
+                          <a:latin typeface="맑은 고딕" pitchFamily="50" charset="-127"/>
+                          <a:ea typeface="맑은 고딕" pitchFamily="50" charset="-127"/>
+                        </a:rPr>
+                        <a:t>05</a:t>
+                      </a:r>
+                      <a:r>
+                        <a:rPr lang="ko-KR" altLang="en-US" sz="1200" b="0" dirty="0" smtClean="0">
+                          <a:solidFill>
+                            <a:schemeClr val="tx1"/>
+                          </a:solidFill>
+                          <a:latin typeface="맑은 고딕" pitchFamily="50" charset="-127"/>
+                          <a:ea typeface="맑은 고딕" pitchFamily="50" charset="-127"/>
+                        </a:rPr>
+                        <a:t>월 </a:t>
+                      </a:r>
+                      <a:r>
+                        <a:rPr lang="en-US" altLang="ko-KR" sz="1200" b="0" dirty="0" smtClean="0">
+                          <a:solidFill>
+                            <a:schemeClr val="tx1"/>
+                          </a:solidFill>
+                          <a:latin typeface="맑은 고딕" pitchFamily="50" charset="-127"/>
+                          <a:ea typeface="맑은 고딕" pitchFamily="50" charset="-127"/>
+                        </a:rPr>
+                        <a:t>25</a:t>
+                      </a:r>
+                      <a:r>
+                        <a:rPr lang="ko-KR" altLang="en-US" sz="1200" b="0" dirty="0" smtClean="0">
+                          <a:solidFill>
+                            <a:schemeClr val="tx1"/>
+                          </a:solidFill>
+                          <a:latin typeface="맑은 고딕" pitchFamily="50" charset="-127"/>
+                          <a:ea typeface="맑은 고딕" pitchFamily="50" charset="-127"/>
+                        </a:rPr>
+                        <a:t>일</a:t>
+                      </a:r>
                       <a:endParaRPr lang="ko-KR" altLang="en-US" sz="1200" b="0" dirty="0">
                         <a:solidFill>
                           <a:schemeClr val="tx1"/>
@@ -3815,6 +3883,16 @@
                     <a:lstStyle/>
                     <a:p>
                       <a:pPr algn="ctr" latinLnBrk="1"/>
+                      <a:r>
+                        <a:rPr lang="en-US" altLang="ko-KR" sz="1200" b="0" dirty="0" smtClean="0">
+                          <a:solidFill>
+                            <a:schemeClr val="tx1"/>
+                          </a:solidFill>
+                          <a:latin typeface="맑은 고딕" pitchFamily="50" charset="-127"/>
+                          <a:ea typeface="맑은 고딕" pitchFamily="50" charset="-127"/>
+                        </a:rPr>
+                        <a:t>02</a:t>
+                      </a:r>
                       <a:endParaRPr lang="ko-KR" altLang="en-US" sz="1200" b="0" dirty="0">
                         <a:solidFill>
                           <a:schemeClr val="tx1"/>
@@ -3836,7 +3914,17 @@
                     <a:lstStyle/>
                     <a:p>
                       <a:pPr latinLnBrk="1"/>
-                      <a:endParaRPr lang="ko-KR" altLang="en-US" sz="1200" b="0">
+                      <a:r>
+                        <a:rPr lang="ko-KR" altLang="en-US" sz="1200" b="0" dirty="0" smtClean="0">
+                          <a:solidFill>
+                            <a:schemeClr val="tx1"/>
+                          </a:solidFill>
+                          <a:latin typeface="맑은 고딕" pitchFamily="50" charset="-127"/>
+                          <a:ea typeface="맑은 고딕" pitchFamily="50" charset="-127"/>
+                        </a:rPr>
+                        <a:t>검토</a:t>
+                      </a:r>
+                      <a:endParaRPr lang="ko-KR" altLang="en-US" sz="1200" b="0" dirty="0">
                         <a:solidFill>
                           <a:schemeClr val="tx1"/>
                         </a:solidFill>
@@ -3857,6 +3945,16 @@
                     <a:lstStyle/>
                     <a:p>
                       <a:pPr algn="ctr" latinLnBrk="1"/>
+                      <a:r>
+                        <a:rPr lang="ko-KR" altLang="en-US" sz="1200" b="0" smtClean="0">
+                          <a:solidFill>
+                            <a:schemeClr val="tx1"/>
+                          </a:solidFill>
+                          <a:latin typeface="맑은 고딕" pitchFamily="50" charset="-127"/>
+                          <a:ea typeface="맑은 고딕" pitchFamily="50" charset="-127"/>
+                        </a:rPr>
+                        <a:t>김태현</a:t>
+                      </a:r>
                       <a:endParaRPr lang="ko-KR" altLang="en-US" sz="1200" b="0" dirty="0">
                         <a:solidFill>
                           <a:schemeClr val="tx1"/>
@@ -3874,7 +3972,7 @@
                 </a:tc>
                 <a:extLst>
                   <a:ext uri="{0D108BD9-81ED-4DB2-BD59-A6C34878D82A}">
-                    <a16:rowId xmlns:a16="http://schemas.microsoft.com/office/drawing/2014/main" val="10003"/>
+                    <a16:rowId xmlns:a16="http://schemas.microsoft.com/office/drawing/2014/main" xmlns="" val="10003"/>
                   </a:ext>
                 </a:extLst>
               </a:tr>
@@ -3965,7 +4063,7 @@
                 </a:tc>
                 <a:extLst>
                   <a:ext uri="{0D108BD9-81ED-4DB2-BD59-A6C34878D82A}">
-                    <a16:rowId xmlns:a16="http://schemas.microsoft.com/office/drawing/2014/main" val="10004"/>
+                    <a16:rowId xmlns:a16="http://schemas.microsoft.com/office/drawing/2014/main" xmlns="" val="10004"/>
                   </a:ext>
                 </a:extLst>
               </a:tr>
@@ -4056,7 +4154,7 @@
                 </a:tc>
                 <a:extLst>
                   <a:ext uri="{0D108BD9-81ED-4DB2-BD59-A6C34878D82A}">
-                    <a16:rowId xmlns:a16="http://schemas.microsoft.com/office/drawing/2014/main" val="10005"/>
+                    <a16:rowId xmlns:a16="http://schemas.microsoft.com/office/drawing/2014/main" xmlns="" val="10005"/>
                   </a:ext>
                 </a:extLst>
               </a:tr>
@@ -4147,7 +4245,7 @@
                 </a:tc>
                 <a:extLst>
                   <a:ext uri="{0D108BD9-81ED-4DB2-BD59-A6C34878D82A}">
-                    <a16:rowId xmlns:a16="http://schemas.microsoft.com/office/drawing/2014/main" val="10006"/>
+                    <a16:rowId xmlns:a16="http://schemas.microsoft.com/office/drawing/2014/main" xmlns="" val="10006"/>
                   </a:ext>
                 </a:extLst>
               </a:tr>
@@ -4238,7 +4336,7 @@
                 </a:tc>
                 <a:extLst>
                   <a:ext uri="{0D108BD9-81ED-4DB2-BD59-A6C34878D82A}">
-                    <a16:rowId xmlns:a16="http://schemas.microsoft.com/office/drawing/2014/main" val="10007"/>
+                    <a16:rowId xmlns:a16="http://schemas.microsoft.com/office/drawing/2014/main" xmlns="" val="10007"/>
                   </a:ext>
                 </a:extLst>
               </a:tr>
@@ -4394,7 +4492,7 @@
     </p:spTree>
     <p:extLst>
       <p:ext uri="{BB962C8B-B14F-4D97-AF65-F5344CB8AC3E}">
-        <p14:creationId xmlns:p14="http://schemas.microsoft.com/office/powerpoint/2010/main" val="1665250424"/>
+        <p14:creationId xmlns:p14="http://schemas.microsoft.com/office/powerpoint/2010/main" xmlns="" val="1665250424"/>
       </p:ext>
     </p:extLst>
   </p:cSld>
@@ -4472,7 +4570,7 @@
     </p:spTree>
     <p:extLst>
       <p:ext uri="{BB962C8B-B14F-4D97-AF65-F5344CB8AC3E}">
-        <p14:creationId xmlns:p14="http://schemas.microsoft.com/office/powerpoint/2010/main" val="632426846"/>
+        <p14:creationId xmlns:p14="http://schemas.microsoft.com/office/powerpoint/2010/main" xmlns="" val="632426846"/>
       </p:ext>
     </p:extLst>
   </p:cSld>
@@ -4550,7 +4648,7 @@
     </p:spTree>
     <p:extLst>
       <p:ext uri="{BB962C8B-B14F-4D97-AF65-F5344CB8AC3E}">
-        <p14:creationId xmlns:p14="http://schemas.microsoft.com/office/powerpoint/2010/main" val="3338057399"/>
+        <p14:creationId xmlns:p14="http://schemas.microsoft.com/office/powerpoint/2010/main" xmlns="" val="3338057399"/>
       </p:ext>
     </p:extLst>
   </p:cSld>
@@ -4628,7 +4726,7 @@
     </p:spTree>
     <p:extLst>
       <p:ext uri="{BB962C8B-B14F-4D97-AF65-F5344CB8AC3E}">
-        <p14:creationId xmlns:p14="http://schemas.microsoft.com/office/powerpoint/2010/main" val="4003923472"/>
+        <p14:creationId xmlns:p14="http://schemas.microsoft.com/office/powerpoint/2010/main" xmlns="" val="4003923472"/>
       </p:ext>
     </p:extLst>
   </p:cSld>
@@ -4706,7 +4804,7 @@
     </p:spTree>
     <p:extLst>
       <p:ext uri="{BB962C8B-B14F-4D97-AF65-F5344CB8AC3E}">
-        <p14:creationId xmlns:p14="http://schemas.microsoft.com/office/powerpoint/2010/main" val="683381687"/>
+        <p14:creationId xmlns:p14="http://schemas.microsoft.com/office/powerpoint/2010/main" xmlns="" val="683381687"/>
       </p:ext>
     </p:extLst>
   </p:cSld>
@@ -4784,7 +4882,7 @@
     </p:spTree>
     <p:extLst>
       <p:ext uri="{BB962C8B-B14F-4D97-AF65-F5344CB8AC3E}">
-        <p14:creationId xmlns:p14="http://schemas.microsoft.com/office/powerpoint/2010/main" val="77776264"/>
+        <p14:creationId xmlns:p14="http://schemas.microsoft.com/office/powerpoint/2010/main" xmlns="" val="77776264"/>
       </p:ext>
     </p:extLst>
   </p:cSld>

</xml_diff>

<commit_message>
doc/3_ 설계서/Class Design.pptx Class Design_4_tuna_김주민_201311109_03 전체 Design, GlobalVal, 꼬리말 수정
</commit_message>
<xml_diff>
--- a/doc/3_ 설계서/Class Design.pptx
+++ b/doc/3_ 설계서/Class Design.pptx
@@ -150,7 +150,7 @@
   </p:defaultTextStyle>
   <p:extLst>
     <p:ext uri="{EFAFB233-063F-42B5-8137-9DF3F51BA10A}">
-      <p15:sldGuideLst xmlns:p15="http://schemas.microsoft.com/office/powerpoint/2012/main" xmlns="">
+      <p15:sldGuideLst xmlns:p15="http://schemas.microsoft.com/office/powerpoint/2012/main">
         <p15:guide id="1" orient="horz">
           <p15:clr>
             <a:srgbClr val="A4A3A4"/>
@@ -169,7 +169,7 @@
       </p15:sldGuideLst>
     </p:ext>
     <p:ext uri="{2D200454-40CA-4A62-9FC3-DE9A4176ACB9}">
-      <p15:notesGuideLst xmlns:p15="http://schemas.microsoft.com/office/powerpoint/2012/main" xmlns="">
+      <p15:notesGuideLst xmlns:p15="http://schemas.microsoft.com/office/powerpoint/2012/main">
         <p15:guide id="1" orient="horz" pos="3126">
           <p15:clr>
             <a:srgbClr val="A4A3A4"/>
@@ -407,7 +407,7 @@
     </p:spTree>
     <p:extLst>
       <p:ext uri="{BB962C8B-B14F-4D97-AF65-F5344CB8AC3E}">
-        <p14:creationId xmlns:p14="http://schemas.microsoft.com/office/powerpoint/2010/main" xmlns="" val="508471591"/>
+        <p14:creationId xmlns:p14="http://schemas.microsoft.com/office/powerpoint/2010/main" val="508471591"/>
       </p:ext>
     </p:extLst>
   </p:cSld>
@@ -733,7 +733,7 @@
     </p:spTree>
     <p:extLst>
       <p:ext uri="{BB962C8B-B14F-4D97-AF65-F5344CB8AC3E}">
-        <p14:creationId xmlns:p14="http://schemas.microsoft.com/office/powerpoint/2010/main" xmlns="" val="860101577"/>
+        <p14:creationId xmlns:p14="http://schemas.microsoft.com/office/powerpoint/2010/main" val="860101577"/>
       </p:ext>
     </p:extLst>
   </p:cSld>
@@ -1072,10 +1072,6 @@
             </a:lvl1pPr>
           </a:lstStyle>
           <a:p>
-            <a:r>
-              <a:rPr lang="en-US" altLang="ko-KR" dirty="0"/>
-              <a:t/>
-            </a:r>
             <a:br>
               <a:rPr lang="en-US" altLang="ko-KR" dirty="0"/>
             </a:br>
@@ -1120,7 +1116,7 @@
           <p:nvPr userDrawn="1">
             <p:extLst>
               <p:ext uri="{D42A27DB-BD31-4B8C-83A1-F6EECF244321}">
-                <p14:modId xmlns:p14="http://schemas.microsoft.com/office/powerpoint/2010/main" xmlns="" val="2642257216"/>
+                <p14:modId xmlns:p14="http://schemas.microsoft.com/office/powerpoint/2010/main" val="2817668981"/>
               </p:ext>
             </p:extLst>
           </p:nvPr>
@@ -1137,28 +1133,28 @@
                 <a:gridCol w="1022523">
                   <a:extLst>
                     <a:ext uri="{9D8B030D-6E8A-4147-A177-3AD203B41FA5}">
-                      <a16:colId xmlns:a16="http://schemas.microsoft.com/office/drawing/2014/main" xmlns="" val="20000"/>
+                      <a16:colId xmlns:a16="http://schemas.microsoft.com/office/drawing/2014/main" val="20000"/>
                     </a:ext>
                   </a:extLst>
                 </a:gridCol>
                 <a:gridCol w="3439486">
                   <a:extLst>
                     <a:ext uri="{9D8B030D-6E8A-4147-A177-3AD203B41FA5}">
-                      <a16:colId xmlns:a16="http://schemas.microsoft.com/office/drawing/2014/main" xmlns="" val="20001"/>
+                      <a16:colId xmlns:a16="http://schemas.microsoft.com/office/drawing/2014/main" val="20001"/>
                     </a:ext>
                   </a:extLst>
                 </a:gridCol>
                 <a:gridCol w="947956">
                   <a:extLst>
                     <a:ext uri="{9D8B030D-6E8A-4147-A177-3AD203B41FA5}">
-                      <a16:colId xmlns:a16="http://schemas.microsoft.com/office/drawing/2014/main" xmlns="" val="20002"/>
+                      <a16:colId xmlns:a16="http://schemas.microsoft.com/office/drawing/2014/main" val="20002"/>
                     </a:ext>
                   </a:extLst>
                 </a:gridCol>
                 <a:gridCol w="3523377">
                   <a:extLst>
                     <a:ext uri="{9D8B030D-6E8A-4147-A177-3AD203B41FA5}">
-                      <a16:colId xmlns:a16="http://schemas.microsoft.com/office/drawing/2014/main" xmlns="" val="20003"/>
+                      <a16:colId xmlns:a16="http://schemas.microsoft.com/office/drawing/2014/main" val="20003"/>
                     </a:ext>
                   </a:extLst>
                 </a:gridCol>
@@ -1574,7 +1570,7 @@
                 </a:tc>
                 <a:extLst>
                   <a:ext uri="{0D108BD9-81ED-4DB2-BD59-A6C34878D82A}">
-                    <a16:rowId xmlns:a16="http://schemas.microsoft.com/office/drawing/2014/main" xmlns="" val="10000"/>
+                    <a16:rowId xmlns:a16="http://schemas.microsoft.com/office/drawing/2014/main" val="10000"/>
                   </a:ext>
                 </a:extLst>
               </a:tr>
@@ -1870,7 +1866,7 @@
                           <a:latin typeface="맑은 고딕" pitchFamily="50" charset="-127"/>
                           <a:ea typeface="맑은 고딕" pitchFamily="50" charset="-127"/>
                         </a:rPr>
-                        <a:t>20170524_01</a:t>
+                        <a:t>20170525_03</a:t>
                       </a:r>
                       <a:endParaRPr kumimoji="1" lang="ko-KR" altLang="ko-KR" sz="900" b="0" i="0" u="none" strike="noStrike" cap="none" normalizeH="0" baseline="0" dirty="0">
                         <a:ln>
@@ -1933,7 +1929,7 @@
                 </a:tc>
                 <a:extLst>
                   <a:ext uri="{0D108BD9-81ED-4DB2-BD59-A6C34878D82A}">
-                    <a16:rowId xmlns:a16="http://schemas.microsoft.com/office/drawing/2014/main" xmlns="" val="10001"/>
+                    <a16:rowId xmlns:a16="http://schemas.microsoft.com/office/drawing/2014/main" val="10001"/>
                   </a:ext>
                 </a:extLst>
               </a:tr>
@@ -1988,10 +1984,9 @@
           <a:p>
             <a:pPr algn="r"/>
             <a:r>
-              <a:rPr lang="ko-KR" altLang="en-US"/>
-              <a:t>팀 명</a:t>
+              <a:rPr lang="en-US" altLang="ko-KR" dirty="0"/>
+              <a:t>Tuna</a:t>
             </a:r>
-            <a:endParaRPr lang="en-US" altLang="ko-KR" dirty="0"/>
           </a:p>
         </p:txBody>
       </p:sp>
@@ -3067,10 +3062,6 @@
           <a:bodyPr/>
           <a:lstStyle/>
           <a:p>
-            <a:r>
-              <a:rPr lang="en-US" altLang="ko-KR" dirty="0"/>
-              <a:t/>
-            </a:r>
             <a:br>
               <a:rPr lang="en-US" altLang="ko-KR" dirty="0"/>
             </a:br>
@@ -3196,14 +3187,14 @@
             <p:ph idx="1"/>
             <p:extLst>
               <p:ext uri="{D42A27DB-BD31-4B8C-83A1-F6EECF244321}">
-                <p14:modId xmlns:p14="http://schemas.microsoft.com/office/powerpoint/2010/main" xmlns="" val="932198133"/>
+                <p14:modId xmlns:p14="http://schemas.microsoft.com/office/powerpoint/2010/main" val="1003843080"/>
               </p:ext>
             </p:extLst>
           </p:nvPr>
         </p:nvGraphicFramePr>
         <p:xfrm>
           <a:off x="280988" y="1025525"/>
-          <a:ext cx="8582024" cy="3322320"/>
+          <a:ext cx="8582024" cy="3408680"/>
         </p:xfrm>
         <a:graphic>
           <a:graphicData uri="http://schemas.openxmlformats.org/drawingml/2006/table">
@@ -3215,28 +3206,28 @@
                 <a:gridCol w="2145506">
                   <a:extLst>
                     <a:ext uri="{9D8B030D-6E8A-4147-A177-3AD203B41FA5}">
-                      <a16:colId xmlns:a16="http://schemas.microsoft.com/office/drawing/2014/main" xmlns="" val="20000"/>
+                      <a16:colId xmlns:a16="http://schemas.microsoft.com/office/drawing/2014/main" val="20000"/>
                     </a:ext>
                   </a:extLst>
                 </a:gridCol>
                 <a:gridCol w="2145506">
                   <a:extLst>
                     <a:ext uri="{9D8B030D-6E8A-4147-A177-3AD203B41FA5}">
-                      <a16:colId xmlns:a16="http://schemas.microsoft.com/office/drawing/2014/main" xmlns="" val="20001"/>
+                      <a16:colId xmlns:a16="http://schemas.microsoft.com/office/drawing/2014/main" val="20001"/>
                     </a:ext>
                   </a:extLst>
                 </a:gridCol>
                 <a:gridCol w="2145506">
                   <a:extLst>
                     <a:ext uri="{9D8B030D-6E8A-4147-A177-3AD203B41FA5}">
-                      <a16:colId xmlns:a16="http://schemas.microsoft.com/office/drawing/2014/main" xmlns="" val="20002"/>
+                      <a16:colId xmlns:a16="http://schemas.microsoft.com/office/drawing/2014/main" val="20002"/>
                     </a:ext>
                   </a:extLst>
                 </a:gridCol>
                 <a:gridCol w="2145506">
                   <a:extLst>
                     <a:ext uri="{9D8B030D-6E8A-4147-A177-3AD203B41FA5}">
-                      <a16:colId xmlns:a16="http://schemas.microsoft.com/office/drawing/2014/main" xmlns="" val="20003"/>
+                      <a16:colId xmlns:a16="http://schemas.microsoft.com/office/drawing/2014/main" val="20003"/>
                     </a:ext>
                   </a:extLst>
                 </a:gridCol>
@@ -3364,7 +3355,7 @@
                 </a:tc>
                 <a:extLst>
                   <a:ext uri="{0D108BD9-81ED-4DB2-BD59-A6C34878D82A}">
-                    <a16:rowId xmlns:a16="http://schemas.microsoft.com/office/drawing/2014/main" xmlns="" val="10000"/>
+                    <a16:rowId xmlns:a16="http://schemas.microsoft.com/office/drawing/2014/main" val="10000"/>
                   </a:ext>
                 </a:extLst>
               </a:tr>
@@ -3601,7 +3592,7 @@
                 </a:tc>
                 <a:extLst>
                   <a:ext uri="{0D108BD9-81ED-4DB2-BD59-A6C34878D82A}">
-                    <a16:rowId xmlns:a16="http://schemas.microsoft.com/office/drawing/2014/main" xmlns="" val="10001"/>
+                    <a16:rowId xmlns:a16="http://schemas.microsoft.com/office/drawing/2014/main" val="10001"/>
                   </a:ext>
                 </a:extLst>
               </a:tr>
@@ -3791,7 +3782,7 @@
                 </a:tc>
                 <a:extLst>
                   <a:ext uri="{0D108BD9-81ED-4DB2-BD59-A6C34878D82A}">
-                    <a16:rowId xmlns:a16="http://schemas.microsoft.com/office/drawing/2014/main" xmlns="" val="10002"/>
+                    <a16:rowId xmlns:a16="http://schemas.microsoft.com/office/drawing/2014/main" val="10002"/>
                   </a:ext>
                 </a:extLst>
               </a:tr>
@@ -3803,7 +3794,7 @@
                     <a:p>
                       <a:pPr algn="ctr" latinLnBrk="1"/>
                       <a:r>
-                        <a:rPr lang="en-US" altLang="ko-KR" sz="1200" b="0" dirty="0" smtClean="0">
+                        <a:rPr lang="en-US" altLang="ko-KR" sz="1200" b="0" dirty="0">
                           <a:solidFill>
                             <a:schemeClr val="tx1"/>
                           </a:solidFill>
@@ -3813,7 +3804,7 @@
                         <a:t>2017</a:t>
                       </a:r>
                       <a:r>
-                        <a:rPr lang="ko-KR" altLang="en-US" sz="1200" b="0" dirty="0" smtClean="0">
+                        <a:rPr lang="ko-KR" altLang="en-US" sz="1200" b="0" dirty="0">
                           <a:solidFill>
                             <a:schemeClr val="tx1"/>
                           </a:solidFill>
@@ -3823,7 +3814,7 @@
                         <a:t>년 </a:t>
                       </a:r>
                       <a:r>
-                        <a:rPr lang="en-US" altLang="ko-KR" sz="1200" b="0" dirty="0" smtClean="0">
+                        <a:rPr lang="en-US" altLang="ko-KR" sz="1200" b="0" dirty="0">
                           <a:solidFill>
                             <a:schemeClr val="tx1"/>
                           </a:solidFill>
@@ -3833,7 +3824,7 @@
                         <a:t>05</a:t>
                       </a:r>
                       <a:r>
-                        <a:rPr lang="ko-KR" altLang="en-US" sz="1200" b="0" dirty="0" smtClean="0">
+                        <a:rPr lang="ko-KR" altLang="en-US" sz="1200" b="0" dirty="0">
                           <a:solidFill>
                             <a:schemeClr val="tx1"/>
                           </a:solidFill>
@@ -3843,7 +3834,7 @@
                         <a:t>월 </a:t>
                       </a:r>
                       <a:r>
-                        <a:rPr lang="en-US" altLang="ko-KR" sz="1200" b="0" dirty="0" smtClean="0">
+                        <a:rPr lang="en-US" altLang="ko-KR" sz="1200" b="0" dirty="0">
                           <a:solidFill>
                             <a:schemeClr val="tx1"/>
                           </a:solidFill>
@@ -3853,7 +3844,7 @@
                         <a:t>25</a:t>
                       </a:r>
                       <a:r>
-                        <a:rPr lang="ko-KR" altLang="en-US" sz="1200" b="0" dirty="0" smtClean="0">
+                        <a:rPr lang="ko-KR" altLang="en-US" sz="1200" b="0" dirty="0">
                           <a:solidFill>
                             <a:schemeClr val="tx1"/>
                           </a:solidFill>
@@ -3862,13 +3853,6 @@
                         </a:rPr>
                         <a:t>일</a:t>
                       </a:r>
-                      <a:endParaRPr lang="ko-KR" altLang="en-US" sz="1200" b="0" dirty="0">
-                        <a:solidFill>
-                          <a:schemeClr val="tx1"/>
-                        </a:solidFill>
-                        <a:latin typeface="맑은 고딕" pitchFamily="50" charset="-127"/>
-                        <a:ea typeface="맑은 고딕" pitchFamily="50" charset="-127"/>
-                      </a:endParaRPr>
                     </a:p>
                   </a:txBody>
                   <a:tcPr anchor="ctr">
@@ -3884,7 +3868,7 @@
                     <a:p>
                       <a:pPr algn="ctr" latinLnBrk="1"/>
                       <a:r>
-                        <a:rPr lang="en-US" altLang="ko-KR" sz="1200" b="0" dirty="0" smtClean="0">
+                        <a:rPr lang="en-US" altLang="ko-KR" sz="1200" b="0" dirty="0">
                           <a:solidFill>
                             <a:schemeClr val="tx1"/>
                           </a:solidFill>
@@ -3915,7 +3899,7 @@
                     <a:p>
                       <a:pPr latinLnBrk="1"/>
                       <a:r>
-                        <a:rPr lang="ko-KR" altLang="en-US" sz="1200" b="0" dirty="0" smtClean="0">
+                        <a:rPr lang="ko-KR" altLang="en-US" sz="1200" b="0" dirty="0">
                           <a:solidFill>
                             <a:schemeClr val="tx1"/>
                           </a:solidFill>
@@ -3924,13 +3908,6 @@
                         </a:rPr>
                         <a:t>검토</a:t>
                       </a:r>
-                      <a:endParaRPr lang="ko-KR" altLang="en-US" sz="1200" b="0" dirty="0">
-                        <a:solidFill>
-                          <a:schemeClr val="tx1"/>
-                        </a:solidFill>
-                        <a:latin typeface="맑은 고딕" pitchFamily="50" charset="-127"/>
-                        <a:ea typeface="맑은 고딕" pitchFamily="50" charset="-127"/>
-                      </a:endParaRPr>
                     </a:p>
                   </a:txBody>
                   <a:tcPr anchor="ctr">
@@ -3946,7 +3923,7 @@
                     <a:p>
                       <a:pPr algn="ctr" latinLnBrk="1"/>
                       <a:r>
-                        <a:rPr lang="ko-KR" altLang="en-US" sz="1200" b="0" smtClean="0">
+                        <a:rPr lang="ko-KR" altLang="en-US" sz="1200" b="0">
                           <a:solidFill>
                             <a:schemeClr val="tx1"/>
                           </a:solidFill>
@@ -3972,7 +3949,223 @@
                 </a:tc>
                 <a:extLst>
                   <a:ext uri="{0D108BD9-81ED-4DB2-BD59-A6C34878D82A}">
-                    <a16:rowId xmlns:a16="http://schemas.microsoft.com/office/drawing/2014/main" xmlns="" val="10003"/>
+                    <a16:rowId xmlns:a16="http://schemas.microsoft.com/office/drawing/2014/main" val="10003"/>
+                  </a:ext>
+                </a:extLst>
+              </a:tr>
+              <a:tr h="370840">
+                <a:tc>
+                  <a:txBody>
+                    <a:bodyPr/>
+                    <a:lstStyle/>
+                    <a:p>
+                      <a:pPr marL="0" marR="0" lvl="0" indent="0" algn="ctr" defTabSz="914400" rtl="0" eaLnBrk="1" fontAlgn="auto" latinLnBrk="1" hangingPunct="1">
+                        <a:lnSpc>
+                          <a:spcPct val="100000"/>
+                        </a:lnSpc>
+                        <a:spcBef>
+                          <a:spcPts val="0"/>
+                        </a:spcBef>
+                        <a:spcAft>
+                          <a:spcPts val="0"/>
+                        </a:spcAft>
+                        <a:buClrTx/>
+                        <a:buSzTx/>
+                        <a:buFontTx/>
+                        <a:buNone/>
+                        <a:tabLst/>
+                        <a:defRPr/>
+                      </a:pPr>
+                      <a:r>
+                        <a:rPr lang="en-US" altLang="ko-KR" sz="1200" b="0" dirty="0">
+                          <a:solidFill>
+                            <a:schemeClr val="tx1"/>
+                          </a:solidFill>
+                          <a:latin typeface="맑은 고딕" pitchFamily="50" charset="-127"/>
+                          <a:ea typeface="맑은 고딕" pitchFamily="50" charset="-127"/>
+                        </a:rPr>
+                        <a:t>2017</a:t>
+                      </a:r>
+                      <a:r>
+                        <a:rPr lang="ko-KR" altLang="en-US" sz="1200" b="0" dirty="0">
+                          <a:solidFill>
+                            <a:schemeClr val="tx1"/>
+                          </a:solidFill>
+                          <a:latin typeface="맑은 고딕" pitchFamily="50" charset="-127"/>
+                          <a:ea typeface="맑은 고딕" pitchFamily="50" charset="-127"/>
+                        </a:rPr>
+                        <a:t>년 </a:t>
+                      </a:r>
+                      <a:r>
+                        <a:rPr lang="en-US" altLang="ko-KR" sz="1200" b="0" dirty="0">
+                          <a:solidFill>
+                            <a:schemeClr val="tx1"/>
+                          </a:solidFill>
+                          <a:latin typeface="맑은 고딕" pitchFamily="50" charset="-127"/>
+                          <a:ea typeface="맑은 고딕" pitchFamily="50" charset="-127"/>
+                        </a:rPr>
+                        <a:t>05</a:t>
+                      </a:r>
+                      <a:r>
+                        <a:rPr lang="ko-KR" altLang="en-US" sz="1200" b="0" dirty="0">
+                          <a:solidFill>
+                            <a:schemeClr val="tx1"/>
+                          </a:solidFill>
+                          <a:latin typeface="맑은 고딕" pitchFamily="50" charset="-127"/>
+                          <a:ea typeface="맑은 고딕" pitchFamily="50" charset="-127"/>
+                        </a:rPr>
+                        <a:t>월 </a:t>
+                      </a:r>
+                      <a:r>
+                        <a:rPr lang="en-US" altLang="ko-KR" sz="1200" b="0" dirty="0">
+                          <a:solidFill>
+                            <a:schemeClr val="tx1"/>
+                          </a:solidFill>
+                          <a:latin typeface="맑은 고딕" pitchFamily="50" charset="-127"/>
+                          <a:ea typeface="맑은 고딕" pitchFamily="50" charset="-127"/>
+                        </a:rPr>
+                        <a:t>25</a:t>
+                      </a:r>
+                      <a:r>
+                        <a:rPr lang="ko-KR" altLang="en-US" sz="1200" b="0" dirty="0">
+                          <a:solidFill>
+                            <a:schemeClr val="tx1"/>
+                          </a:solidFill>
+                          <a:latin typeface="맑은 고딕" pitchFamily="50" charset="-127"/>
+                          <a:ea typeface="맑은 고딕" pitchFamily="50" charset="-127"/>
+                        </a:rPr>
+                        <a:t>일</a:t>
+                      </a:r>
+                    </a:p>
+                  </a:txBody>
+                  <a:tcPr anchor="ctr">
+                    <a:solidFill>
+                      <a:schemeClr val="bg1"/>
+                    </a:solidFill>
+                  </a:tcPr>
+                </a:tc>
+                <a:tc>
+                  <a:txBody>
+                    <a:bodyPr/>
+                    <a:lstStyle/>
+                    <a:p>
+                      <a:pPr algn="ctr" latinLnBrk="1"/>
+                      <a:r>
+                        <a:rPr lang="en-US" altLang="ko-KR" sz="1200" b="0" dirty="0">
+                          <a:solidFill>
+                            <a:schemeClr val="tx1"/>
+                          </a:solidFill>
+                          <a:latin typeface="맑은 고딕" pitchFamily="50" charset="-127"/>
+                          <a:ea typeface="맑은 고딕" pitchFamily="50" charset="-127"/>
+                        </a:rPr>
+                        <a:t>03</a:t>
+                      </a:r>
+                      <a:endParaRPr lang="ko-KR" altLang="en-US" sz="1200" b="0" dirty="0">
+                        <a:solidFill>
+                          <a:schemeClr val="tx1"/>
+                        </a:solidFill>
+                        <a:latin typeface="맑은 고딕" pitchFamily="50" charset="-127"/>
+                        <a:ea typeface="맑은 고딕" pitchFamily="50" charset="-127"/>
+                      </a:endParaRPr>
+                    </a:p>
+                  </a:txBody>
+                  <a:tcPr anchor="ctr">
+                    <a:solidFill>
+                      <a:schemeClr val="bg1"/>
+                    </a:solidFill>
+                  </a:tcPr>
+                </a:tc>
+                <a:tc>
+                  <a:txBody>
+                    <a:bodyPr/>
+                    <a:lstStyle/>
+                    <a:p>
+                      <a:pPr latinLnBrk="1"/>
+                      <a:r>
+                        <a:rPr lang="ko-KR" altLang="en-US" sz="1200" b="0" dirty="0">
+                          <a:solidFill>
+                            <a:schemeClr val="tx1"/>
+                          </a:solidFill>
+                          <a:latin typeface="맑은 고딕" pitchFamily="50" charset="-127"/>
+                          <a:ea typeface="맑은 고딕" pitchFamily="50" charset="-127"/>
+                        </a:rPr>
+                        <a:t>전체 </a:t>
+                      </a:r>
+                      <a:r>
+                        <a:rPr lang="en-US" altLang="ko-KR" sz="1200" b="0" dirty="0">
+                          <a:solidFill>
+                            <a:schemeClr val="tx1"/>
+                          </a:solidFill>
+                          <a:latin typeface="맑은 고딕" pitchFamily="50" charset="-127"/>
+                          <a:ea typeface="맑은 고딕" pitchFamily="50" charset="-127"/>
+                        </a:rPr>
+                        <a:t>Design, </a:t>
+                      </a:r>
+                      <a:r>
+                        <a:rPr lang="en-US" altLang="ko-KR" sz="1200" b="0" dirty="0" err="1">
+                          <a:solidFill>
+                            <a:schemeClr val="tx1"/>
+                          </a:solidFill>
+                          <a:latin typeface="맑은 고딕" pitchFamily="50" charset="-127"/>
+                          <a:ea typeface="맑은 고딕" pitchFamily="50" charset="-127"/>
+                        </a:rPr>
+                        <a:t>GlobalVal</a:t>
+                      </a:r>
+                      <a:r>
+                        <a:rPr lang="en-US" altLang="ko-KR" sz="1200" b="0" dirty="0">
+                          <a:solidFill>
+                            <a:schemeClr val="tx1"/>
+                          </a:solidFill>
+                          <a:latin typeface="맑은 고딕" pitchFamily="50" charset="-127"/>
+                          <a:ea typeface="맑은 고딕" pitchFamily="50" charset="-127"/>
+                        </a:rPr>
+                        <a:t>, </a:t>
+                      </a:r>
+                      <a:r>
+                        <a:rPr lang="ko-KR" altLang="en-US" sz="1200" b="0" dirty="0">
+                          <a:solidFill>
+                            <a:schemeClr val="tx1"/>
+                          </a:solidFill>
+                          <a:latin typeface="맑은 고딕" pitchFamily="50" charset="-127"/>
+                          <a:ea typeface="맑은 고딕" pitchFamily="50" charset="-127"/>
+                        </a:rPr>
+                        <a:t>꼬리말 수정</a:t>
+                      </a:r>
+                    </a:p>
+                  </a:txBody>
+                  <a:tcPr anchor="ctr">
+                    <a:solidFill>
+                      <a:schemeClr val="bg1"/>
+                    </a:solidFill>
+                  </a:tcPr>
+                </a:tc>
+                <a:tc>
+                  <a:txBody>
+                    <a:bodyPr/>
+                    <a:lstStyle/>
+                    <a:p>
+                      <a:pPr algn="ctr" latinLnBrk="1"/>
+                      <a:r>
+                        <a:rPr lang="ko-KR" altLang="en-US" sz="1200" b="0" dirty="0">
+                          <a:solidFill>
+                            <a:schemeClr val="tx1"/>
+                          </a:solidFill>
+                          <a:latin typeface="맑은 고딕" pitchFamily="50" charset="-127"/>
+                          <a:ea typeface="맑은 고딕" pitchFamily="50" charset="-127"/>
+                        </a:rPr>
+                        <a:t>김주민</a:t>
+                      </a:r>
+                    </a:p>
+                  </a:txBody>
+                  <a:tcPr anchor="ctr">
+                    <a:solidFill>
+                      <a:schemeClr val="bg1"/>
+                    </a:solidFill>
+                  </a:tcPr>
+                </a:tc>
+                <a:extLst>
+                  <a:ext uri="{0D108BD9-81ED-4DB2-BD59-A6C34878D82A}">
+                    <a16:rowId xmlns:a16="http://schemas.microsoft.com/office/drawing/2014/main" val="10004"/>
                   </a:ext>
                 </a:extLst>
               </a:tr>
@@ -4063,7 +4256,7 @@
                 </a:tc>
                 <a:extLst>
                   <a:ext uri="{0D108BD9-81ED-4DB2-BD59-A6C34878D82A}">
-                    <a16:rowId xmlns:a16="http://schemas.microsoft.com/office/drawing/2014/main" xmlns="" val="10004"/>
+                    <a16:rowId xmlns:a16="http://schemas.microsoft.com/office/drawing/2014/main" val="10005"/>
                   </a:ext>
                 </a:extLst>
               </a:tr>
@@ -4154,7 +4347,7 @@
                 </a:tc>
                 <a:extLst>
                   <a:ext uri="{0D108BD9-81ED-4DB2-BD59-A6C34878D82A}">
-                    <a16:rowId xmlns:a16="http://schemas.microsoft.com/office/drawing/2014/main" xmlns="" val="10005"/>
+                    <a16:rowId xmlns:a16="http://schemas.microsoft.com/office/drawing/2014/main" val="10006"/>
                   </a:ext>
                 </a:extLst>
               </a:tr>
@@ -4245,98 +4438,7 @@
                 </a:tc>
                 <a:extLst>
                   <a:ext uri="{0D108BD9-81ED-4DB2-BD59-A6C34878D82A}">
-                    <a16:rowId xmlns:a16="http://schemas.microsoft.com/office/drawing/2014/main" xmlns="" val="10006"/>
-                  </a:ext>
-                </a:extLst>
-              </a:tr>
-              <a:tr h="370840">
-                <a:tc>
-                  <a:txBody>
-                    <a:bodyPr/>
-                    <a:lstStyle/>
-                    <a:p>
-                      <a:pPr algn="ctr" latinLnBrk="1"/>
-                      <a:endParaRPr lang="ko-KR" altLang="en-US" sz="1200" b="0">
-                        <a:solidFill>
-                          <a:schemeClr val="tx1"/>
-                        </a:solidFill>
-                        <a:latin typeface="맑은 고딕" pitchFamily="50" charset="-127"/>
-                        <a:ea typeface="맑은 고딕" pitchFamily="50" charset="-127"/>
-                      </a:endParaRPr>
-                    </a:p>
-                  </a:txBody>
-                  <a:tcPr anchor="ctr">
-                    <a:solidFill>
-                      <a:schemeClr val="bg1"/>
-                    </a:solidFill>
-                  </a:tcPr>
-                </a:tc>
-                <a:tc>
-                  <a:txBody>
-                    <a:bodyPr/>
-                    <a:lstStyle/>
-                    <a:p>
-                      <a:pPr algn="ctr" latinLnBrk="1"/>
-                      <a:endParaRPr lang="ko-KR" altLang="en-US" sz="1200" b="0" dirty="0">
-                        <a:solidFill>
-                          <a:schemeClr val="tx1"/>
-                        </a:solidFill>
-                        <a:latin typeface="맑은 고딕" pitchFamily="50" charset="-127"/>
-                        <a:ea typeface="맑은 고딕" pitchFamily="50" charset="-127"/>
-                      </a:endParaRPr>
-                    </a:p>
-                  </a:txBody>
-                  <a:tcPr anchor="ctr">
-                    <a:solidFill>
-                      <a:schemeClr val="bg1"/>
-                    </a:solidFill>
-                  </a:tcPr>
-                </a:tc>
-                <a:tc>
-                  <a:txBody>
-                    <a:bodyPr/>
-                    <a:lstStyle/>
-                    <a:p>
-                      <a:pPr latinLnBrk="1"/>
-                      <a:endParaRPr lang="ko-KR" altLang="en-US" sz="1200" b="0" dirty="0">
-                        <a:solidFill>
-                          <a:schemeClr val="tx1"/>
-                        </a:solidFill>
-                        <a:latin typeface="맑은 고딕" pitchFamily="50" charset="-127"/>
-                        <a:ea typeface="맑은 고딕" pitchFamily="50" charset="-127"/>
-                      </a:endParaRPr>
-                    </a:p>
-                  </a:txBody>
-                  <a:tcPr anchor="ctr">
-                    <a:solidFill>
-                      <a:schemeClr val="bg1"/>
-                    </a:solidFill>
-                  </a:tcPr>
-                </a:tc>
-                <a:tc>
-                  <a:txBody>
-                    <a:bodyPr/>
-                    <a:lstStyle/>
-                    <a:p>
-                      <a:pPr algn="ctr" latinLnBrk="1"/>
-                      <a:endParaRPr lang="ko-KR" altLang="en-US" sz="1200" b="0" dirty="0">
-                        <a:solidFill>
-                          <a:schemeClr val="tx1"/>
-                        </a:solidFill>
-                        <a:latin typeface="맑은 고딕" pitchFamily="50" charset="-127"/>
-                        <a:ea typeface="맑은 고딕" pitchFamily="50" charset="-127"/>
-                      </a:endParaRPr>
-                    </a:p>
-                  </a:txBody>
-                  <a:tcPr anchor="ctr">
-                    <a:solidFill>
-                      <a:schemeClr val="bg1"/>
-                    </a:solidFill>
-                  </a:tcPr>
-                </a:tc>
-                <a:extLst>
-                  <a:ext uri="{0D108BD9-81ED-4DB2-BD59-A6C34878D82A}">
-                    <a16:rowId xmlns:a16="http://schemas.microsoft.com/office/drawing/2014/main" xmlns="" val="10007"/>
+                    <a16:rowId xmlns:a16="http://schemas.microsoft.com/office/drawing/2014/main" val="10007"/>
                   </a:ext>
                 </a:extLst>
               </a:tr>
@@ -4387,14 +4489,14 @@
             <a:pPr algn="r"/>
             <a:r>
               <a:rPr lang="en-US" altLang="ko-KR" dirty="0"/>
-              <a:t>TUNA</a:t>
+              <a:t>Tuna</a:t>
             </a:r>
           </a:p>
         </p:txBody>
       </p:sp>
       <p:pic>
         <p:nvPicPr>
-          <p:cNvPr id="17" name="그림 16"/>
+          <p:cNvPr id="4" name="그림 3"/>
           <p:cNvPicPr>
             <a:picLocks noChangeAspect="1"/>
           </p:cNvPicPr>
@@ -4408,8 +4510,8 @@
         </p:blipFill>
         <p:spPr>
           <a:xfrm>
-            <a:off x="1379220" y="746974"/>
-            <a:ext cx="6345180" cy="5783525"/>
+            <a:off x="1599167" y="733425"/>
+            <a:ext cx="6362358" cy="5800724"/>
           </a:xfrm>
           <a:prstGeom prst="rect">
             <a:avLst/>
@@ -4458,10 +4560,9 @@
           <a:p>
             <a:pPr algn="r"/>
             <a:r>
-              <a:rPr lang="ko-KR" altLang="en-US"/>
-              <a:t>팀 명</a:t>
+              <a:rPr lang="en-US" altLang="ko-KR" dirty="0"/>
+              <a:t>Tuna</a:t>
             </a:r>
-            <a:endParaRPr lang="en-US" altLang="ko-KR" dirty="0"/>
           </a:p>
         </p:txBody>
       </p:sp>
@@ -4492,7 +4593,7 @@
     </p:spTree>
     <p:extLst>
       <p:ext uri="{BB962C8B-B14F-4D97-AF65-F5344CB8AC3E}">
-        <p14:creationId xmlns:p14="http://schemas.microsoft.com/office/powerpoint/2010/main" xmlns="" val="1665250424"/>
+        <p14:creationId xmlns:p14="http://schemas.microsoft.com/office/powerpoint/2010/main" val="1665250424"/>
       </p:ext>
     </p:extLst>
   </p:cSld>
@@ -4536,10 +4637,9 @@
           <a:p>
             <a:pPr algn="r"/>
             <a:r>
-              <a:rPr lang="ko-KR" altLang="en-US"/>
-              <a:t>팀 명</a:t>
+              <a:rPr lang="en-US" altLang="ko-KR" dirty="0"/>
+              <a:t>Tuna</a:t>
             </a:r>
-            <a:endParaRPr lang="en-US" altLang="ko-KR" dirty="0"/>
           </a:p>
         </p:txBody>
       </p:sp>
@@ -4570,7 +4670,7 @@
     </p:spTree>
     <p:extLst>
       <p:ext uri="{BB962C8B-B14F-4D97-AF65-F5344CB8AC3E}">
-        <p14:creationId xmlns:p14="http://schemas.microsoft.com/office/powerpoint/2010/main" xmlns="" val="632426846"/>
+        <p14:creationId xmlns:p14="http://schemas.microsoft.com/office/powerpoint/2010/main" val="632426846"/>
       </p:ext>
     </p:extLst>
   </p:cSld>
@@ -4614,10 +4714,9 @@
           <a:p>
             <a:pPr algn="r"/>
             <a:r>
-              <a:rPr lang="ko-KR" altLang="en-US"/>
-              <a:t>팀 명</a:t>
+              <a:rPr lang="en-US" altLang="ko-KR" dirty="0"/>
+              <a:t>Tuna</a:t>
             </a:r>
-            <a:endParaRPr lang="en-US" altLang="ko-KR" dirty="0"/>
           </a:p>
         </p:txBody>
       </p:sp>
@@ -4648,7 +4747,7 @@
     </p:spTree>
     <p:extLst>
       <p:ext uri="{BB962C8B-B14F-4D97-AF65-F5344CB8AC3E}">
-        <p14:creationId xmlns:p14="http://schemas.microsoft.com/office/powerpoint/2010/main" xmlns="" val="3338057399"/>
+        <p14:creationId xmlns:p14="http://schemas.microsoft.com/office/powerpoint/2010/main" val="3338057399"/>
       </p:ext>
     </p:extLst>
   </p:cSld>
@@ -4692,10 +4791,9 @@
           <a:p>
             <a:pPr algn="r"/>
             <a:r>
-              <a:rPr lang="ko-KR" altLang="en-US"/>
-              <a:t>팀 명</a:t>
+              <a:rPr lang="en-US" altLang="ko-KR" dirty="0"/>
+              <a:t>Tuna</a:t>
             </a:r>
-            <a:endParaRPr lang="en-US" altLang="ko-KR" dirty="0"/>
           </a:p>
         </p:txBody>
       </p:sp>
@@ -4726,7 +4824,7 @@
     </p:spTree>
     <p:extLst>
       <p:ext uri="{BB962C8B-B14F-4D97-AF65-F5344CB8AC3E}">
-        <p14:creationId xmlns:p14="http://schemas.microsoft.com/office/powerpoint/2010/main" xmlns="" val="4003923472"/>
+        <p14:creationId xmlns:p14="http://schemas.microsoft.com/office/powerpoint/2010/main" val="4003923472"/>
       </p:ext>
     </p:extLst>
   </p:cSld>
@@ -4770,10 +4868,9 @@
           <a:p>
             <a:pPr algn="r"/>
             <a:r>
-              <a:rPr lang="ko-KR" altLang="en-US"/>
-              <a:t>팀 명</a:t>
+              <a:rPr lang="en-US" altLang="ko-KR" dirty="0"/>
+              <a:t>Tuna</a:t>
             </a:r>
-            <a:endParaRPr lang="en-US" altLang="ko-KR" dirty="0"/>
           </a:p>
         </p:txBody>
       </p:sp>
@@ -4804,7 +4901,7 @@
     </p:spTree>
     <p:extLst>
       <p:ext uri="{BB962C8B-B14F-4D97-AF65-F5344CB8AC3E}">
-        <p14:creationId xmlns:p14="http://schemas.microsoft.com/office/powerpoint/2010/main" xmlns="" val="683381687"/>
+        <p14:creationId xmlns:p14="http://schemas.microsoft.com/office/powerpoint/2010/main" val="683381687"/>
       </p:ext>
     </p:extLst>
   </p:cSld>
@@ -4848,16 +4945,15 @@
           <a:p>
             <a:pPr algn="r"/>
             <a:r>
-              <a:rPr lang="ko-KR" altLang="en-US"/>
-              <a:t>팀 명</a:t>
+              <a:rPr lang="en-US" altLang="ko-KR" dirty="0"/>
+              <a:t>Tuna</a:t>
             </a:r>
-            <a:endParaRPr lang="en-US" altLang="ko-KR" dirty="0"/>
           </a:p>
         </p:txBody>
       </p:sp>
       <p:pic>
         <p:nvPicPr>
-          <p:cNvPr id="5" name="그림 4"/>
+          <p:cNvPr id="3" name="그림 2"/>
           <p:cNvPicPr>
             <a:picLocks noChangeAspect="1"/>
           </p:cNvPicPr>
@@ -4871,8 +4967,8 @@
         </p:blipFill>
         <p:spPr>
           <a:xfrm>
-            <a:off x="258159" y="1541417"/>
-            <a:ext cx="8602349" cy="4028843"/>
+            <a:off x="225976" y="874392"/>
+            <a:ext cx="8748832" cy="4409209"/>
           </a:xfrm>
           <a:prstGeom prst="rect">
             <a:avLst/>
@@ -4882,7 +4978,7 @@
     </p:spTree>
     <p:extLst>
       <p:ext uri="{BB962C8B-B14F-4D97-AF65-F5344CB8AC3E}">
-        <p14:creationId xmlns:p14="http://schemas.microsoft.com/office/powerpoint/2010/main" xmlns="" val="77776264"/>
+        <p14:creationId xmlns:p14="http://schemas.microsoft.com/office/powerpoint/2010/main" val="77776264"/>
       </p:ext>
     </p:extLst>
   </p:cSld>

</xml_diff>

<commit_message>
doc/3_ 설계서/Class Design.pptx Class Design_4_tuna_김주민_201311109_04 전체 Design, MainFrame 변수 수정
</commit_message>
<xml_diff>
--- a/doc/3_ 설계서/Class Design.pptx
+++ b/doc/3_ 설계서/Class Design.pptx
@@ -1116,7 +1116,7 @@
           <p:nvPr userDrawn="1">
             <p:extLst>
               <p:ext uri="{D42A27DB-BD31-4B8C-83A1-F6EECF244321}">
-                <p14:modId xmlns:p14="http://schemas.microsoft.com/office/powerpoint/2010/main" val="2817668981"/>
+                <p14:modId xmlns:p14="http://schemas.microsoft.com/office/powerpoint/2010/main" val="2700793136"/>
               </p:ext>
             </p:extLst>
           </p:nvPr>
@@ -1866,7 +1866,7 @@
                           <a:latin typeface="맑은 고딕" pitchFamily="50" charset="-127"/>
                           <a:ea typeface="맑은 고딕" pitchFamily="50" charset="-127"/>
                         </a:rPr>
-                        <a:t>20170525_03</a:t>
+                        <a:t>20170525_04</a:t>
                       </a:r>
                       <a:endParaRPr kumimoji="1" lang="ko-KR" altLang="ko-KR" sz="900" b="0" i="0" u="none" strike="noStrike" cap="none" normalizeH="0" baseline="0" dirty="0">
                         <a:ln>
@@ -3187,14 +3187,14 @@
             <p:ph idx="1"/>
             <p:extLst>
               <p:ext uri="{D42A27DB-BD31-4B8C-83A1-F6EECF244321}">
-                <p14:modId xmlns:p14="http://schemas.microsoft.com/office/powerpoint/2010/main" val="1003843080"/>
+                <p14:modId xmlns:p14="http://schemas.microsoft.com/office/powerpoint/2010/main" val="3755899299"/>
               </p:ext>
             </p:extLst>
           </p:nvPr>
         </p:nvGraphicFramePr>
         <p:xfrm>
           <a:off x="280988" y="1025525"/>
-          <a:ext cx="8582024" cy="3408680"/>
+          <a:ext cx="8582024" cy="3495040"/>
         </p:xfrm>
         <a:graphic>
           <a:graphicData uri="http://schemas.openxmlformats.org/drawingml/2006/table">
@@ -4175,14 +4175,83 @@
                     <a:bodyPr/>
                     <a:lstStyle/>
                     <a:p>
-                      <a:pPr algn="ctr" latinLnBrk="1"/>
-                      <a:endParaRPr lang="ko-KR" altLang="en-US" sz="1200" b="0">
-                        <a:solidFill>
-                          <a:schemeClr val="tx1"/>
-                        </a:solidFill>
-                        <a:latin typeface="맑은 고딕" pitchFamily="50" charset="-127"/>
-                        <a:ea typeface="맑은 고딕" pitchFamily="50" charset="-127"/>
-                      </a:endParaRPr>
+                      <a:pPr marL="0" marR="0" lvl="0" indent="0" algn="ctr" defTabSz="914400" rtl="0" eaLnBrk="1" fontAlgn="auto" latinLnBrk="1" hangingPunct="1">
+                        <a:lnSpc>
+                          <a:spcPct val="100000"/>
+                        </a:lnSpc>
+                        <a:spcBef>
+                          <a:spcPts val="0"/>
+                        </a:spcBef>
+                        <a:spcAft>
+                          <a:spcPts val="0"/>
+                        </a:spcAft>
+                        <a:buClrTx/>
+                        <a:buSzTx/>
+                        <a:buFontTx/>
+                        <a:buNone/>
+                        <a:tabLst/>
+                        <a:defRPr/>
+                      </a:pPr>
+                      <a:r>
+                        <a:rPr lang="en-US" altLang="ko-KR" sz="1200" b="0" dirty="0">
+                          <a:solidFill>
+                            <a:schemeClr val="tx1"/>
+                          </a:solidFill>
+                          <a:latin typeface="맑은 고딕" pitchFamily="50" charset="-127"/>
+                          <a:ea typeface="맑은 고딕" pitchFamily="50" charset="-127"/>
+                        </a:rPr>
+                        <a:t>2017</a:t>
+                      </a:r>
+                      <a:r>
+                        <a:rPr lang="ko-KR" altLang="en-US" sz="1200" b="0" dirty="0">
+                          <a:solidFill>
+                            <a:schemeClr val="tx1"/>
+                          </a:solidFill>
+                          <a:latin typeface="맑은 고딕" pitchFamily="50" charset="-127"/>
+                          <a:ea typeface="맑은 고딕" pitchFamily="50" charset="-127"/>
+                        </a:rPr>
+                        <a:t>년 </a:t>
+                      </a:r>
+                      <a:r>
+                        <a:rPr lang="en-US" altLang="ko-KR" sz="1200" b="0" dirty="0">
+                          <a:solidFill>
+                            <a:schemeClr val="tx1"/>
+                          </a:solidFill>
+                          <a:latin typeface="맑은 고딕" pitchFamily="50" charset="-127"/>
+                          <a:ea typeface="맑은 고딕" pitchFamily="50" charset="-127"/>
+                        </a:rPr>
+                        <a:t>05</a:t>
+                      </a:r>
+                      <a:r>
+                        <a:rPr lang="ko-KR" altLang="en-US" sz="1200" b="0" dirty="0">
+                          <a:solidFill>
+                            <a:schemeClr val="tx1"/>
+                          </a:solidFill>
+                          <a:latin typeface="맑은 고딕" pitchFamily="50" charset="-127"/>
+                          <a:ea typeface="맑은 고딕" pitchFamily="50" charset="-127"/>
+                        </a:rPr>
+                        <a:t>월 </a:t>
+                      </a:r>
+                      <a:r>
+                        <a:rPr lang="en-US" altLang="ko-KR" sz="1200" b="0" dirty="0">
+                          <a:solidFill>
+                            <a:schemeClr val="tx1"/>
+                          </a:solidFill>
+                          <a:latin typeface="맑은 고딕" pitchFamily="50" charset="-127"/>
+                          <a:ea typeface="맑은 고딕" pitchFamily="50" charset="-127"/>
+                        </a:rPr>
+                        <a:t>25</a:t>
+                      </a:r>
+                      <a:r>
+                        <a:rPr lang="ko-KR" altLang="en-US" sz="1200" b="0" dirty="0">
+                          <a:solidFill>
+                            <a:schemeClr val="tx1"/>
+                          </a:solidFill>
+                          <a:latin typeface="맑은 고딕" pitchFamily="50" charset="-127"/>
+                          <a:ea typeface="맑은 고딕" pitchFamily="50" charset="-127"/>
+                        </a:rPr>
+                        <a:t>일</a:t>
+                      </a:r>
                     </a:p>
                   </a:txBody>
                   <a:tcPr anchor="ctr">
@@ -4197,6 +4266,16 @@
                     <a:lstStyle/>
                     <a:p>
                       <a:pPr algn="ctr" latinLnBrk="1"/>
+                      <a:r>
+                        <a:rPr lang="en-US" altLang="ko-KR" sz="1200" b="0" dirty="0">
+                          <a:solidFill>
+                            <a:schemeClr val="tx1"/>
+                          </a:solidFill>
+                          <a:latin typeface="맑은 고딕" pitchFamily="50" charset="-127"/>
+                          <a:ea typeface="맑은 고딕" pitchFamily="50" charset="-127"/>
+                        </a:rPr>
+                        <a:t>04</a:t>
+                      </a:r>
                       <a:endParaRPr lang="ko-KR" altLang="en-US" sz="1200" b="0" dirty="0">
                         <a:solidFill>
                           <a:schemeClr val="tx1"/>
@@ -4218,13 +4297,56 @@
                     <a:lstStyle/>
                     <a:p>
                       <a:pPr latinLnBrk="1"/>
-                      <a:endParaRPr lang="ko-KR" altLang="en-US" sz="1200" b="0" dirty="0">
-                        <a:solidFill>
-                          <a:schemeClr val="tx1"/>
-                        </a:solidFill>
-                        <a:latin typeface="맑은 고딕" pitchFamily="50" charset="-127"/>
-                        <a:ea typeface="맑은 고딕" pitchFamily="50" charset="-127"/>
-                      </a:endParaRPr>
+                      <a:r>
+                        <a:rPr lang="ko-KR" altLang="en-US" sz="1200" b="0" dirty="0">
+                          <a:solidFill>
+                            <a:schemeClr val="tx1"/>
+                          </a:solidFill>
+                          <a:latin typeface="맑은 고딕" pitchFamily="50" charset="-127"/>
+                          <a:ea typeface="맑은 고딕" pitchFamily="50" charset="-127"/>
+                        </a:rPr>
+                        <a:t>전체 </a:t>
+                      </a:r>
+                      <a:r>
+                        <a:rPr lang="en-US" altLang="ko-KR" sz="1200" b="0" dirty="0">
+                          <a:solidFill>
+                            <a:schemeClr val="tx1"/>
+                          </a:solidFill>
+                          <a:latin typeface="맑은 고딕" pitchFamily="50" charset="-127"/>
+                          <a:ea typeface="맑은 고딕" pitchFamily="50" charset="-127"/>
+                        </a:rPr>
+                        <a:t>Design, </a:t>
+                      </a:r>
+                      <a:r>
+                        <a:rPr lang="en-US" altLang="ko-KR" sz="1200" b="0" dirty="0" err="1">
+                          <a:solidFill>
+                            <a:schemeClr val="tx1"/>
+                          </a:solidFill>
+                          <a:latin typeface="맑은 고딕" pitchFamily="50" charset="-127"/>
+                          <a:ea typeface="맑은 고딕" pitchFamily="50" charset="-127"/>
+                        </a:rPr>
+                        <a:t>MainFrame</a:t>
+                      </a:r>
+                      <a:r>
+                        <a:rPr lang="en-US" altLang="ko-KR" sz="1200" b="0" dirty="0">
+                          <a:solidFill>
+                            <a:schemeClr val="tx1"/>
+                          </a:solidFill>
+                          <a:latin typeface="맑은 고딕" pitchFamily="50" charset="-127"/>
+                          <a:ea typeface="맑은 고딕" pitchFamily="50" charset="-127"/>
+                        </a:rPr>
+                        <a:t> </a:t>
+                      </a:r>
+                      <a:r>
+                        <a:rPr lang="ko-KR" altLang="en-US" sz="1200" b="0" dirty="0">
+                          <a:solidFill>
+                            <a:schemeClr val="tx1"/>
+                          </a:solidFill>
+                          <a:latin typeface="맑은 고딕" pitchFamily="50" charset="-127"/>
+                          <a:ea typeface="맑은 고딕" pitchFamily="50" charset="-127"/>
+                        </a:rPr>
+                        <a:t>변수 수정</a:t>
+                      </a:r>
                     </a:p>
                   </a:txBody>
                   <a:tcPr anchor="ctr">
@@ -4239,13 +4361,16 @@
                     <a:lstStyle/>
                     <a:p>
                       <a:pPr algn="ctr" latinLnBrk="1"/>
-                      <a:endParaRPr lang="ko-KR" altLang="en-US" sz="1200" b="0" dirty="0">
-                        <a:solidFill>
-                          <a:schemeClr val="tx1"/>
-                        </a:solidFill>
-                        <a:latin typeface="맑은 고딕" pitchFamily="50" charset="-127"/>
-                        <a:ea typeface="맑은 고딕" pitchFamily="50" charset="-127"/>
-                      </a:endParaRPr>
+                      <a:r>
+                        <a:rPr lang="ko-KR" altLang="en-US" sz="1200" b="0" dirty="0">
+                          <a:solidFill>
+                            <a:schemeClr val="tx1"/>
+                          </a:solidFill>
+                          <a:latin typeface="맑은 고딕" pitchFamily="50" charset="-127"/>
+                          <a:ea typeface="맑은 고딕" pitchFamily="50" charset="-127"/>
+                        </a:rPr>
+                        <a:t>김주민</a:t>
+                      </a:r>
                     </a:p>
                   </a:txBody>
                   <a:tcPr anchor="ctr">
@@ -4496,7 +4621,7 @@
       </p:sp>
       <p:pic>
         <p:nvPicPr>
-          <p:cNvPr id="4" name="그림 3"/>
+          <p:cNvPr id="5" name="그림 4"/>
           <p:cNvPicPr>
             <a:picLocks noChangeAspect="1"/>
           </p:cNvPicPr>
@@ -4510,8 +4635,8 @@
         </p:blipFill>
         <p:spPr>
           <a:xfrm>
-            <a:off x="1599167" y="733425"/>
-            <a:ext cx="6362358" cy="5800724"/>
+            <a:off x="1537301" y="769434"/>
+            <a:ext cx="6246250" cy="5694866"/>
           </a:xfrm>
           <a:prstGeom prst="rect">
             <a:avLst/>
@@ -4568,7 +4693,7 @@
       </p:sp>
       <p:pic>
         <p:nvPicPr>
-          <p:cNvPr id="3" name="그림 2"/>
+          <p:cNvPr id="4" name="그림 3"/>
           <p:cNvPicPr>
             <a:picLocks noChangeAspect="1"/>
           </p:cNvPicPr>
@@ -4582,8 +4707,8 @@
         </p:blipFill>
         <p:spPr>
           <a:xfrm>
-            <a:off x="167640" y="883301"/>
-            <a:ext cx="8587740" cy="5101821"/>
+            <a:off x="167268" y="935479"/>
+            <a:ext cx="8787161" cy="5198132"/>
           </a:xfrm>
           <a:prstGeom prst="rect">
             <a:avLst/>

</xml_diff>

<commit_message>
doc/3_ 설계서/Class Design.pptx Class Design_4_tuna_김태현_20170525_05 최종 검토
</commit_message>
<xml_diff>
--- a/doc/3_ 설계서/Class Design.pptx
+++ b/doc/3_ 설계서/Class Design.pptx
@@ -150,7 +150,7 @@
   </p:defaultTextStyle>
   <p:extLst>
     <p:ext uri="{EFAFB233-063F-42B5-8137-9DF3F51BA10A}">
-      <p15:sldGuideLst xmlns:p15="http://schemas.microsoft.com/office/powerpoint/2012/main">
+      <p15:sldGuideLst xmlns:p15="http://schemas.microsoft.com/office/powerpoint/2012/main" xmlns="">
         <p15:guide id="1" orient="horz">
           <p15:clr>
             <a:srgbClr val="A4A3A4"/>
@@ -169,7 +169,7 @@
       </p15:sldGuideLst>
     </p:ext>
     <p:ext uri="{2D200454-40CA-4A62-9FC3-DE9A4176ACB9}">
-      <p15:notesGuideLst xmlns:p15="http://schemas.microsoft.com/office/powerpoint/2012/main">
+      <p15:notesGuideLst xmlns:p15="http://schemas.microsoft.com/office/powerpoint/2012/main" xmlns="">
         <p15:guide id="1" orient="horz" pos="3126">
           <p15:clr>
             <a:srgbClr val="A4A3A4"/>
@@ -257,7 +257,7 @@
             </a:lvl1pPr>
           </a:lstStyle>
           <a:p>
-            <a:endParaRPr lang="en-US"/>
+            <a:endParaRPr lang="en-US" dirty="0"/>
           </a:p>
         </p:txBody>
       </p:sp>
@@ -303,7 +303,7 @@
             </a:lvl1pPr>
           </a:lstStyle>
           <a:p>
-            <a:endParaRPr lang="en-US"/>
+            <a:endParaRPr lang="en-US" dirty="0"/>
           </a:p>
         </p:txBody>
       </p:sp>
@@ -349,7 +349,7 @@
             </a:lvl1pPr>
           </a:lstStyle>
           <a:p>
-            <a:endParaRPr lang="en-US"/>
+            <a:endParaRPr lang="en-US" dirty="0"/>
           </a:p>
         </p:txBody>
       </p:sp>
@@ -400,14 +400,14 @@
               <a:pPr/>
               <a:t>‹#›</a:t>
             </a:fld>
-            <a:endParaRPr lang="en-US"/>
+            <a:endParaRPr lang="en-US" dirty="0"/>
           </a:p>
         </p:txBody>
       </p:sp>
     </p:spTree>
     <p:extLst>
       <p:ext uri="{BB962C8B-B14F-4D97-AF65-F5344CB8AC3E}">
-        <p14:creationId xmlns:p14="http://schemas.microsoft.com/office/powerpoint/2010/main" val="508471591"/>
+        <p14:creationId xmlns:p14="http://schemas.microsoft.com/office/powerpoint/2010/main" xmlns="" val="508471591"/>
       </p:ext>
     </p:extLst>
   </p:cSld>
@@ -482,7 +482,7 @@
             </a:lvl1pPr>
           </a:lstStyle>
           <a:p>
-            <a:endParaRPr lang="en-US"/>
+            <a:endParaRPr lang="en-US" dirty="0"/>
           </a:p>
         </p:txBody>
       </p:sp>
@@ -528,7 +528,7 @@
             </a:lvl1pPr>
           </a:lstStyle>
           <a:p>
-            <a:endParaRPr lang="en-US"/>
+            <a:endParaRPr lang="en-US" dirty="0"/>
           </a:p>
         </p:txBody>
       </p:sp>
@@ -675,7 +675,7 @@
             </a:lvl1pPr>
           </a:lstStyle>
           <a:p>
-            <a:endParaRPr lang="en-US"/>
+            <a:endParaRPr lang="en-US" dirty="0"/>
           </a:p>
         </p:txBody>
       </p:sp>
@@ -726,14 +726,14 @@
               <a:pPr/>
               <a:t>‹#›</a:t>
             </a:fld>
-            <a:endParaRPr lang="en-US"/>
+            <a:endParaRPr lang="en-US" dirty="0"/>
           </a:p>
         </p:txBody>
       </p:sp>
     </p:spTree>
     <p:extLst>
       <p:ext uri="{BB962C8B-B14F-4D97-AF65-F5344CB8AC3E}">
-        <p14:creationId xmlns:p14="http://schemas.microsoft.com/office/powerpoint/2010/main" val="860101577"/>
+        <p14:creationId xmlns:p14="http://schemas.microsoft.com/office/powerpoint/2010/main" xmlns="" val="860101577"/>
       </p:ext>
     </p:extLst>
   </p:cSld>
@@ -863,6 +863,170 @@
 </p:notesMaster>
 </file>
 
+<file path=ppt/notesSlides/notesSlide1.xml><?xml version="1.0" encoding="utf-8"?>
+<p:notes xmlns:a="http://schemas.openxmlformats.org/drawingml/2006/main" xmlns:r="http://schemas.openxmlformats.org/officeDocument/2006/relationships" xmlns:p="http://schemas.openxmlformats.org/presentationml/2006/main">
+  <p:cSld>
+    <p:spTree>
+      <p:nvGrpSpPr>
+        <p:cNvPr id="1" name=""/>
+        <p:cNvGrpSpPr/>
+        <p:nvPr/>
+      </p:nvGrpSpPr>
+      <p:grpSpPr>
+        <a:xfrm>
+          <a:off x="0" y="0"/>
+          <a:ext cx="0" cy="0"/>
+          <a:chOff x="0" y="0"/>
+          <a:chExt cx="0" cy="0"/>
+        </a:xfrm>
+      </p:grpSpPr>
+      <p:sp>
+        <p:nvSpPr>
+          <p:cNvPr id="2" name="슬라이드 이미지 개체 틀 1"/>
+          <p:cNvSpPr>
+            <a:spLocks noGrp="1" noRot="1" noChangeAspect="1"/>
+          </p:cNvSpPr>
+          <p:nvPr>
+            <p:ph type="sldImg"/>
+          </p:nvPr>
+        </p:nvSpPr>
+        <p:spPr/>
+      </p:sp>
+      <p:sp>
+        <p:nvSpPr>
+          <p:cNvPr id="3" name="슬라이드 노트 개체 틀 2"/>
+          <p:cNvSpPr>
+            <a:spLocks noGrp="1"/>
+          </p:cNvSpPr>
+          <p:nvPr>
+            <p:ph type="body" idx="1"/>
+          </p:nvPr>
+        </p:nvSpPr>
+        <p:spPr/>
+        <p:txBody>
+          <a:bodyPr>
+            <a:normAutofit/>
+          </a:bodyPr>
+          <a:lstStyle/>
+          <a:p>
+            <a:endParaRPr lang="ko-KR" altLang="en-US"/>
+          </a:p>
+        </p:txBody>
+      </p:sp>
+      <p:sp>
+        <p:nvSpPr>
+          <p:cNvPr id="4" name="슬라이드 번호 개체 틀 3"/>
+          <p:cNvSpPr>
+            <a:spLocks noGrp="1"/>
+          </p:cNvSpPr>
+          <p:nvPr>
+            <p:ph type="sldNum" sz="quarter" idx="10"/>
+          </p:nvPr>
+        </p:nvSpPr>
+        <p:spPr/>
+        <p:txBody>
+          <a:bodyPr/>
+          <a:lstStyle/>
+          <a:p>
+            <a:fld id="{379E618C-E705-4CD1-A19E-88052652622A}" type="slidenum">
+              <a:rPr lang="en-US" smtClean="0"/>
+              <a:pPr/>
+              <a:t>3</a:t>
+            </a:fld>
+            <a:endParaRPr lang="en-US" dirty="0"/>
+          </a:p>
+        </p:txBody>
+      </p:sp>
+    </p:spTree>
+  </p:cSld>
+  <p:clrMapOvr>
+    <a:masterClrMapping/>
+  </p:clrMapOvr>
+</p:notes>
+</file>
+
+<file path=ppt/notesSlides/notesSlide2.xml><?xml version="1.0" encoding="utf-8"?>
+<p:notes xmlns:a="http://schemas.openxmlformats.org/drawingml/2006/main" xmlns:r="http://schemas.openxmlformats.org/officeDocument/2006/relationships" xmlns:p="http://schemas.openxmlformats.org/presentationml/2006/main">
+  <p:cSld>
+    <p:spTree>
+      <p:nvGrpSpPr>
+        <p:cNvPr id="1" name=""/>
+        <p:cNvGrpSpPr/>
+        <p:nvPr/>
+      </p:nvGrpSpPr>
+      <p:grpSpPr>
+        <a:xfrm>
+          <a:off x="0" y="0"/>
+          <a:ext cx="0" cy="0"/>
+          <a:chOff x="0" y="0"/>
+          <a:chExt cx="0" cy="0"/>
+        </a:xfrm>
+      </p:grpSpPr>
+      <p:sp>
+        <p:nvSpPr>
+          <p:cNvPr id="2" name="슬라이드 이미지 개체 틀 1"/>
+          <p:cNvSpPr>
+            <a:spLocks noGrp="1" noRot="1" noChangeAspect="1"/>
+          </p:cNvSpPr>
+          <p:nvPr>
+            <p:ph type="sldImg"/>
+          </p:nvPr>
+        </p:nvSpPr>
+        <p:spPr/>
+      </p:sp>
+      <p:sp>
+        <p:nvSpPr>
+          <p:cNvPr id="3" name="슬라이드 노트 개체 틀 2"/>
+          <p:cNvSpPr>
+            <a:spLocks noGrp="1"/>
+          </p:cNvSpPr>
+          <p:nvPr>
+            <p:ph type="body" idx="1"/>
+          </p:nvPr>
+        </p:nvSpPr>
+        <p:spPr/>
+        <p:txBody>
+          <a:bodyPr>
+            <a:normAutofit/>
+          </a:bodyPr>
+          <a:lstStyle/>
+          <a:p>
+            <a:endParaRPr lang="ko-KR" altLang="en-US"/>
+          </a:p>
+        </p:txBody>
+      </p:sp>
+      <p:sp>
+        <p:nvSpPr>
+          <p:cNvPr id="4" name="슬라이드 번호 개체 틀 3"/>
+          <p:cNvSpPr>
+            <a:spLocks noGrp="1"/>
+          </p:cNvSpPr>
+          <p:nvPr>
+            <p:ph type="sldNum" sz="quarter" idx="10"/>
+          </p:nvPr>
+        </p:nvSpPr>
+        <p:spPr/>
+        <p:txBody>
+          <a:bodyPr/>
+          <a:lstStyle/>
+          <a:p>
+            <a:fld id="{379E618C-E705-4CD1-A19E-88052652622A}" type="slidenum">
+              <a:rPr lang="en-US" smtClean="0"/>
+              <a:pPr/>
+              <a:t>5</a:t>
+            </a:fld>
+            <a:endParaRPr lang="en-US" dirty="0"/>
+          </a:p>
+        </p:txBody>
+      </p:sp>
+    </p:spTree>
+  </p:cSld>
+  <p:clrMapOvr>
+    <a:masterClrMapping/>
+  </p:clrMapOvr>
+</p:notes>
+</file>
+
 <file path=ppt/slideLayouts/slideLayout1.xml><?xml version="1.0" encoding="utf-8"?>
 <p:sldLayout xmlns:a="http://schemas.openxmlformats.org/drawingml/2006/main" xmlns:r="http://schemas.openxmlformats.org/officeDocument/2006/relationships" xmlns:p="http://schemas.openxmlformats.org/presentationml/2006/main" showMasterSp="0" preserve="1" userDrawn="1">
   <p:cSld name="제목 슬라이드">
@@ -916,7 +1080,7 @@
                 <a:spcPct val="50000"/>
               </a:spcBef>
             </a:pPr>
-            <a:endParaRPr kumimoji="1" lang="ko-KR" altLang="en-US" sz="1200">
+            <a:endParaRPr kumimoji="1" lang="ko-KR" altLang="en-US" sz="1200" dirty="0">
               <a:solidFill>
                 <a:schemeClr val="bg1"/>
               </a:solidFill>
@@ -957,7 +1121,7 @@
           <a:bodyPr wrap="none" anchor="ctr"/>
           <a:lstStyle/>
           <a:p>
-            <a:endParaRPr lang="ko-KR" altLang="en-US"/>
+            <a:endParaRPr lang="ko-KR" altLang="en-US" dirty="0"/>
           </a:p>
         </p:txBody>
       </p:sp>
@@ -992,7 +1156,7 @@
           <a:bodyPr wrap="none" lIns="90000" tIns="46800" rIns="90000" bIns="46800" anchor="ctr"/>
           <a:lstStyle/>
           <a:p>
-            <a:endParaRPr lang="ko-KR" altLang="en-US"/>
+            <a:endParaRPr lang="ko-KR" altLang="en-US" dirty="0"/>
           </a:p>
         </p:txBody>
       </p:sp>
@@ -1072,6 +1236,10 @@
             </a:lvl1pPr>
           </a:lstStyle>
           <a:p>
+            <a:r>
+              <a:rPr lang="en-US" altLang="ko-KR" dirty="0"/>
+              <a:t/>
+            </a:r>
             <a:br>
               <a:rPr lang="en-US" altLang="ko-KR" dirty="0"/>
             </a:br>
@@ -1116,7 +1284,7 @@
           <p:nvPr userDrawn="1">
             <p:extLst>
               <p:ext uri="{D42A27DB-BD31-4B8C-83A1-F6EECF244321}">
-                <p14:modId xmlns:p14="http://schemas.microsoft.com/office/powerpoint/2010/main" val="2700793136"/>
+                <p14:modId xmlns:p14="http://schemas.microsoft.com/office/powerpoint/2010/main" xmlns="" val="2700793136"/>
               </p:ext>
             </p:extLst>
           </p:nvPr>
@@ -1133,28 +1301,28 @@
                 <a:gridCol w="1022523">
                   <a:extLst>
                     <a:ext uri="{9D8B030D-6E8A-4147-A177-3AD203B41FA5}">
-                      <a16:colId xmlns:a16="http://schemas.microsoft.com/office/drawing/2014/main" val="20000"/>
+                      <a16:colId xmlns:a16="http://schemas.microsoft.com/office/drawing/2014/main" xmlns="" val="20000"/>
                     </a:ext>
                   </a:extLst>
                 </a:gridCol>
                 <a:gridCol w="3439486">
                   <a:extLst>
                     <a:ext uri="{9D8B030D-6E8A-4147-A177-3AD203B41FA5}">
-                      <a16:colId xmlns:a16="http://schemas.microsoft.com/office/drawing/2014/main" val="20001"/>
+                      <a16:colId xmlns:a16="http://schemas.microsoft.com/office/drawing/2014/main" xmlns="" val="20001"/>
                     </a:ext>
                   </a:extLst>
                 </a:gridCol>
                 <a:gridCol w="947956">
                   <a:extLst>
                     <a:ext uri="{9D8B030D-6E8A-4147-A177-3AD203B41FA5}">
-                      <a16:colId xmlns:a16="http://schemas.microsoft.com/office/drawing/2014/main" val="20002"/>
+                      <a16:colId xmlns:a16="http://schemas.microsoft.com/office/drawing/2014/main" xmlns="" val="20002"/>
                     </a:ext>
                   </a:extLst>
                 </a:gridCol>
                 <a:gridCol w="3523377">
                   <a:extLst>
                     <a:ext uri="{9D8B030D-6E8A-4147-A177-3AD203B41FA5}">
-                      <a16:colId xmlns:a16="http://schemas.microsoft.com/office/drawing/2014/main" val="20003"/>
+                      <a16:colId xmlns:a16="http://schemas.microsoft.com/office/drawing/2014/main" xmlns="" val="20003"/>
                     </a:ext>
                   </a:extLst>
                 </a:gridCol>
@@ -1278,7 +1446,7 @@
                         <a:tabLst/>
                       </a:pPr>
                       <a:r>
-                        <a:rPr kumimoji="1" lang="ko-KR" altLang="en-US" sz="1200" b="1" i="0" u="none" strike="noStrike" cap="none" normalizeH="0" baseline="0">
+                        <a:rPr kumimoji="1" lang="ko-KR" altLang="en-US" sz="1200" b="1" i="0" u="none" strike="noStrike" cap="none" normalizeH="0" baseline="0" dirty="0">
                           <a:ln>
                             <a:noFill/>
                           </a:ln>
@@ -1292,7 +1460,7 @@
                         <a:t>대학생을 위한 과목별 </a:t>
                       </a:r>
                       <a:r>
-                        <a:rPr kumimoji="1" lang="en-US" altLang="ko-KR" sz="1200" b="1" i="0" u="none" strike="noStrike" cap="none" normalizeH="0" baseline="0">
+                        <a:rPr kumimoji="1" lang="en-US" altLang="ko-KR" sz="1200" b="1" i="0" u="none" strike="noStrike" cap="none" normalizeH="0" baseline="0" dirty="0">
                           <a:ln>
                             <a:noFill/>
                           </a:ln>
@@ -1306,7 +1474,7 @@
                         <a:t>To do List </a:t>
                       </a:r>
                       <a:r>
-                        <a:rPr kumimoji="1" lang="ko-KR" altLang="en-US" sz="1200" b="1" i="0" u="none" strike="noStrike" cap="none" normalizeH="0" baseline="0">
+                        <a:rPr kumimoji="1" lang="ko-KR" altLang="en-US" sz="1200" b="1" i="0" u="none" strike="noStrike" cap="none" normalizeH="0" baseline="0" dirty="0">
                           <a:ln>
                             <a:noFill/>
                           </a:ln>
@@ -1570,7 +1738,7 @@
                 </a:tc>
                 <a:extLst>
                   <a:ext uri="{0D108BD9-81ED-4DB2-BD59-A6C34878D82A}">
-                    <a16:rowId xmlns:a16="http://schemas.microsoft.com/office/drawing/2014/main" val="10000"/>
+                    <a16:rowId xmlns:a16="http://schemas.microsoft.com/office/drawing/2014/main" xmlns="" val="10000"/>
                   </a:ext>
                 </a:extLst>
               </a:tr>
@@ -1855,7 +2023,7 @@
                         <a:tabLst/>
                       </a:pPr>
                       <a:r>
-                        <a:rPr kumimoji="1" lang="en-US" altLang="ko-KR" sz="900" b="0" i="0" u="none" strike="noStrike" cap="none" normalizeH="0" baseline="0" dirty="0">
+                        <a:rPr kumimoji="1" lang="en-US" altLang="ko-KR" sz="900" b="0" i="0" u="none" strike="noStrike" cap="none" normalizeH="0" baseline="0" dirty="0" smtClean="0">
                           <a:ln>
                             <a:noFill/>
                           </a:ln>
@@ -1866,7 +2034,7 @@
                           <a:latin typeface="맑은 고딕" pitchFamily="50" charset="-127"/>
                           <a:ea typeface="맑은 고딕" pitchFamily="50" charset="-127"/>
                         </a:rPr>
-                        <a:t>20170525_04</a:t>
+                        <a:t>20170525_05</a:t>
                       </a:r>
                       <a:endParaRPr kumimoji="1" lang="ko-KR" altLang="ko-KR" sz="900" b="0" i="0" u="none" strike="noStrike" cap="none" normalizeH="0" baseline="0" dirty="0">
                         <a:ln>
@@ -1929,7 +2097,7 @@
                 </a:tc>
                 <a:extLst>
                   <a:ext uri="{0D108BD9-81ED-4DB2-BD59-A6C34878D82A}">
-                    <a16:rowId xmlns:a16="http://schemas.microsoft.com/office/drawing/2014/main" val="10001"/>
+                    <a16:rowId xmlns:a16="http://schemas.microsoft.com/office/drawing/2014/main" xmlns="" val="10001"/>
                   </a:ext>
                 </a:extLst>
               </a:tr>
@@ -2040,7 +2208,7 @@
               <a:buNone/>
               <a:tabLst/>
             </a:pPr>
-            <a:endParaRPr kumimoji="0" lang="ko-KR" altLang="en-US" sz="1400" b="0" i="0" u="none" strike="noStrike" cap="none" normalizeH="0" baseline="0">
+            <a:endParaRPr kumimoji="0" lang="ko-KR" altLang="en-US" sz="1400" b="0" i="0" u="none" strike="noStrike" cap="none" normalizeH="0" baseline="0" dirty="0">
               <a:ln>
                 <a:noFill/>
               </a:ln>
@@ -2225,7 +2393,7 @@
           <a:bodyPr wrap="none" anchor="ctr"/>
           <a:lstStyle/>
           <a:p>
-            <a:endParaRPr lang="ko-KR" altLang="en-US"/>
+            <a:endParaRPr lang="ko-KR" altLang="en-US" dirty="0"/>
           </a:p>
         </p:txBody>
       </p:sp>
@@ -2260,7 +2428,7 @@
           <a:bodyPr/>
           <a:lstStyle/>
           <a:p>
-            <a:endParaRPr lang="ko-KR" altLang="en-US"/>
+            <a:endParaRPr lang="ko-KR" altLang="en-US" dirty="0"/>
           </a:p>
         </p:txBody>
       </p:sp>
@@ -2311,7 +2479,7 @@
           <a:p>
             <a:pPr algn="r"/>
             <a:r>
-              <a:rPr lang="ko-KR" altLang="en-US"/>
+              <a:rPr lang="ko-KR" altLang="en-US" dirty="0"/>
               <a:t>팀 명</a:t>
             </a:r>
             <a:endParaRPr lang="en-US" altLang="ko-KR" dirty="0"/>
@@ -2388,7 +2556,7 @@
               <a:pPr algn="ctr"/>
               <a:t>‹#›</a:t>
             </a:fld>
-            <a:endParaRPr lang="en-US" altLang="ko-KR" sz="1200">
+            <a:endParaRPr lang="en-US" altLang="ko-KR" sz="1200" dirty="0">
               <a:latin typeface="Times New Roman" charset="0"/>
             </a:endParaRPr>
           </a:p>
@@ -2516,7 +2684,7 @@
           <a:p>
             <a:pPr algn="r"/>
             <a:r>
-              <a:rPr lang="ko-KR" altLang="en-US"/>
+              <a:rPr lang="ko-KR" altLang="en-US" dirty="0"/>
               <a:t>팀 명</a:t>
             </a:r>
             <a:endParaRPr lang="en-US" altLang="ko-KR" dirty="0"/>
@@ -3062,6 +3230,10 @@
           <a:bodyPr/>
           <a:lstStyle/>
           <a:p>
+            <a:r>
+              <a:rPr lang="en-US" altLang="ko-KR" dirty="0"/>
+              <a:t/>
+            </a:r>
             <a:br>
               <a:rPr lang="en-US" altLang="ko-KR" dirty="0"/>
             </a:br>
@@ -3170,10 +3342,9 @@
           <a:p>
             <a:pPr algn="r"/>
             <a:r>
-              <a:rPr lang="en-US" altLang="ko-KR"/>
+              <a:rPr lang="en-US" altLang="ko-KR" dirty="0"/>
               <a:t>Tuna</a:t>
             </a:r>
-            <a:endParaRPr lang="en-US" altLang="ko-KR" dirty="0"/>
           </a:p>
         </p:txBody>
       </p:sp>
@@ -3187,7 +3358,7 @@
             <p:ph idx="1"/>
             <p:extLst>
               <p:ext uri="{D42A27DB-BD31-4B8C-83A1-F6EECF244321}">
-                <p14:modId xmlns:p14="http://schemas.microsoft.com/office/powerpoint/2010/main" val="3755899299"/>
+                <p14:modId xmlns:p14="http://schemas.microsoft.com/office/powerpoint/2010/main" xmlns="" val="3755899299"/>
               </p:ext>
             </p:extLst>
           </p:nvPr>
@@ -3206,28 +3377,28 @@
                 <a:gridCol w="2145506">
                   <a:extLst>
                     <a:ext uri="{9D8B030D-6E8A-4147-A177-3AD203B41FA5}">
-                      <a16:colId xmlns:a16="http://schemas.microsoft.com/office/drawing/2014/main" val="20000"/>
+                      <a16:colId xmlns:a16="http://schemas.microsoft.com/office/drawing/2014/main" xmlns="" val="20000"/>
                     </a:ext>
                   </a:extLst>
                 </a:gridCol>
                 <a:gridCol w="2145506">
                   <a:extLst>
                     <a:ext uri="{9D8B030D-6E8A-4147-A177-3AD203B41FA5}">
-                      <a16:colId xmlns:a16="http://schemas.microsoft.com/office/drawing/2014/main" val="20001"/>
+                      <a16:colId xmlns:a16="http://schemas.microsoft.com/office/drawing/2014/main" xmlns="" val="20001"/>
                     </a:ext>
                   </a:extLst>
                 </a:gridCol>
                 <a:gridCol w="2145506">
                   <a:extLst>
                     <a:ext uri="{9D8B030D-6E8A-4147-A177-3AD203B41FA5}">
-                      <a16:colId xmlns:a16="http://schemas.microsoft.com/office/drawing/2014/main" val="20002"/>
+                      <a16:colId xmlns:a16="http://schemas.microsoft.com/office/drawing/2014/main" xmlns="" val="20002"/>
                     </a:ext>
                   </a:extLst>
                 </a:gridCol>
                 <a:gridCol w="2145506">
                   <a:extLst>
                     <a:ext uri="{9D8B030D-6E8A-4147-A177-3AD203B41FA5}">
-                      <a16:colId xmlns:a16="http://schemas.microsoft.com/office/drawing/2014/main" val="20003"/>
+                      <a16:colId xmlns:a16="http://schemas.microsoft.com/office/drawing/2014/main" xmlns="" val="20003"/>
                     </a:ext>
                   </a:extLst>
                 </a:gridCol>
@@ -3355,7 +3526,7 @@
                 </a:tc>
                 <a:extLst>
                   <a:ext uri="{0D108BD9-81ED-4DB2-BD59-A6C34878D82A}">
-                    <a16:rowId xmlns:a16="http://schemas.microsoft.com/office/drawing/2014/main" val="10000"/>
+                    <a16:rowId xmlns:a16="http://schemas.microsoft.com/office/drawing/2014/main" xmlns="" val="10000"/>
                   </a:ext>
                 </a:extLst>
               </a:tr>
@@ -3592,7 +3763,7 @@
                 </a:tc>
                 <a:extLst>
                   <a:ext uri="{0D108BD9-81ED-4DB2-BD59-A6C34878D82A}">
-                    <a16:rowId xmlns:a16="http://schemas.microsoft.com/office/drawing/2014/main" val="10001"/>
+                    <a16:rowId xmlns:a16="http://schemas.microsoft.com/office/drawing/2014/main" xmlns="" val="10001"/>
                   </a:ext>
                 </a:extLst>
               </a:tr>
@@ -3782,7 +3953,7 @@
                 </a:tc>
                 <a:extLst>
                   <a:ext uri="{0D108BD9-81ED-4DB2-BD59-A6C34878D82A}">
-                    <a16:rowId xmlns:a16="http://schemas.microsoft.com/office/drawing/2014/main" val="10002"/>
+                    <a16:rowId xmlns:a16="http://schemas.microsoft.com/office/drawing/2014/main" xmlns="" val="10002"/>
                   </a:ext>
                 </a:extLst>
               </a:tr>
@@ -3949,7 +4120,7 @@
                 </a:tc>
                 <a:extLst>
                   <a:ext uri="{0D108BD9-81ED-4DB2-BD59-A6C34878D82A}">
-                    <a16:rowId xmlns:a16="http://schemas.microsoft.com/office/drawing/2014/main" val="10003"/>
+                    <a16:rowId xmlns:a16="http://schemas.microsoft.com/office/drawing/2014/main" xmlns="" val="10003"/>
                   </a:ext>
                 </a:extLst>
               </a:tr>
@@ -4165,7 +4336,7 @@
                 </a:tc>
                 <a:extLst>
                   <a:ext uri="{0D108BD9-81ED-4DB2-BD59-A6C34878D82A}">
-                    <a16:rowId xmlns:a16="http://schemas.microsoft.com/office/drawing/2014/main" val="10004"/>
+                    <a16:rowId xmlns:a16="http://schemas.microsoft.com/office/drawing/2014/main" xmlns="" val="10004"/>
                   </a:ext>
                 </a:extLst>
               </a:tr>
@@ -4381,7 +4552,188 @@
                 </a:tc>
                 <a:extLst>
                   <a:ext uri="{0D108BD9-81ED-4DB2-BD59-A6C34878D82A}">
-                    <a16:rowId xmlns:a16="http://schemas.microsoft.com/office/drawing/2014/main" val="10005"/>
+                    <a16:rowId xmlns:a16="http://schemas.microsoft.com/office/drawing/2014/main" xmlns="" val="10005"/>
+                  </a:ext>
+                </a:extLst>
+              </a:tr>
+              <a:tr h="370840">
+                <a:tc>
+                  <a:txBody>
+                    <a:bodyPr/>
+                    <a:lstStyle/>
+                    <a:p>
+                      <a:pPr algn="ctr" latinLnBrk="1"/>
+                      <a:r>
+                        <a:rPr lang="en-US" altLang="ko-KR" sz="1200" b="0" dirty="0" smtClean="0">
+                          <a:solidFill>
+                            <a:schemeClr val="tx1"/>
+                          </a:solidFill>
+                          <a:latin typeface="맑은 고딕" pitchFamily="50" charset="-127"/>
+                          <a:ea typeface="맑은 고딕" pitchFamily="50" charset="-127"/>
+                        </a:rPr>
+                        <a:t>2017</a:t>
+                      </a:r>
+                      <a:r>
+                        <a:rPr lang="ko-KR" altLang="en-US" sz="1200" b="0" dirty="0" smtClean="0">
+                          <a:solidFill>
+                            <a:schemeClr val="tx1"/>
+                          </a:solidFill>
+                          <a:latin typeface="맑은 고딕" pitchFamily="50" charset="-127"/>
+                          <a:ea typeface="맑은 고딕" pitchFamily="50" charset="-127"/>
+                        </a:rPr>
+                        <a:t>년 </a:t>
+                      </a:r>
+                      <a:r>
+                        <a:rPr lang="en-US" altLang="ko-KR" sz="1200" b="0" dirty="0" smtClean="0">
+                          <a:solidFill>
+                            <a:schemeClr val="tx1"/>
+                          </a:solidFill>
+                          <a:latin typeface="맑은 고딕" pitchFamily="50" charset="-127"/>
+                          <a:ea typeface="맑은 고딕" pitchFamily="50" charset="-127"/>
+                        </a:rPr>
+                        <a:t>05</a:t>
+                      </a:r>
+                      <a:r>
+                        <a:rPr lang="ko-KR" altLang="en-US" sz="1200" b="0" dirty="0" smtClean="0">
+                          <a:solidFill>
+                            <a:schemeClr val="tx1"/>
+                          </a:solidFill>
+                          <a:latin typeface="맑은 고딕" pitchFamily="50" charset="-127"/>
+                          <a:ea typeface="맑은 고딕" pitchFamily="50" charset="-127"/>
+                        </a:rPr>
+                        <a:t>월 </a:t>
+                      </a:r>
+                      <a:r>
+                        <a:rPr lang="en-US" altLang="ko-KR" sz="1200" b="0" dirty="0" smtClean="0">
+                          <a:solidFill>
+                            <a:schemeClr val="tx1"/>
+                          </a:solidFill>
+                          <a:latin typeface="맑은 고딕" pitchFamily="50" charset="-127"/>
+                          <a:ea typeface="맑은 고딕" pitchFamily="50" charset="-127"/>
+                        </a:rPr>
+                        <a:t>25</a:t>
+                      </a:r>
+                      <a:r>
+                        <a:rPr lang="ko-KR" altLang="en-US" sz="1200" b="0" dirty="0" smtClean="0">
+                          <a:solidFill>
+                            <a:schemeClr val="tx1"/>
+                          </a:solidFill>
+                          <a:latin typeface="맑은 고딕" pitchFamily="50" charset="-127"/>
+                          <a:ea typeface="맑은 고딕" pitchFamily="50" charset="-127"/>
+                        </a:rPr>
+                        <a:t>일</a:t>
+                      </a:r>
+                      <a:endParaRPr lang="ko-KR" altLang="en-US" sz="1200" b="0" dirty="0">
+                        <a:solidFill>
+                          <a:schemeClr val="tx1"/>
+                        </a:solidFill>
+                        <a:latin typeface="맑은 고딕" pitchFamily="50" charset="-127"/>
+                        <a:ea typeface="맑은 고딕" pitchFamily="50" charset="-127"/>
+                      </a:endParaRPr>
+                    </a:p>
+                  </a:txBody>
+                  <a:tcPr anchor="ctr">
+                    <a:solidFill>
+                      <a:schemeClr val="bg1"/>
+                    </a:solidFill>
+                  </a:tcPr>
+                </a:tc>
+                <a:tc>
+                  <a:txBody>
+                    <a:bodyPr/>
+                    <a:lstStyle/>
+                    <a:p>
+                      <a:pPr algn="ctr" latinLnBrk="1"/>
+                      <a:r>
+                        <a:rPr lang="en-US" altLang="ko-KR" sz="1200" b="0" dirty="0" smtClean="0">
+                          <a:solidFill>
+                            <a:schemeClr val="tx1"/>
+                          </a:solidFill>
+                          <a:latin typeface="맑은 고딕" pitchFamily="50" charset="-127"/>
+                          <a:ea typeface="맑은 고딕" pitchFamily="50" charset="-127"/>
+                        </a:rPr>
+                        <a:t>05</a:t>
+                      </a:r>
+                      <a:endParaRPr lang="ko-KR" altLang="en-US" sz="1200" b="0" dirty="0">
+                        <a:solidFill>
+                          <a:schemeClr val="tx1"/>
+                        </a:solidFill>
+                        <a:latin typeface="맑은 고딕" pitchFamily="50" charset="-127"/>
+                        <a:ea typeface="맑은 고딕" pitchFamily="50" charset="-127"/>
+                      </a:endParaRPr>
+                    </a:p>
+                  </a:txBody>
+                  <a:tcPr anchor="ctr">
+                    <a:solidFill>
+                      <a:schemeClr val="bg1"/>
+                    </a:solidFill>
+                  </a:tcPr>
+                </a:tc>
+                <a:tc>
+                  <a:txBody>
+                    <a:bodyPr/>
+                    <a:lstStyle/>
+                    <a:p>
+                      <a:pPr latinLnBrk="1"/>
+                      <a:r>
+                        <a:rPr lang="ko-KR" altLang="en-US" sz="1200" b="0" dirty="0" smtClean="0">
+                          <a:solidFill>
+                            <a:schemeClr val="tx1"/>
+                          </a:solidFill>
+                          <a:latin typeface="맑은 고딕" pitchFamily="50" charset="-127"/>
+                          <a:ea typeface="맑은 고딕" pitchFamily="50" charset="-127"/>
+                        </a:rPr>
+                        <a:t>최종 검토</a:t>
+                      </a:r>
+                      <a:endParaRPr lang="ko-KR" altLang="en-US" sz="1200" b="0" dirty="0">
+                        <a:solidFill>
+                          <a:schemeClr val="tx1"/>
+                        </a:solidFill>
+                        <a:latin typeface="맑은 고딕" pitchFamily="50" charset="-127"/>
+                        <a:ea typeface="맑은 고딕" pitchFamily="50" charset="-127"/>
+                      </a:endParaRPr>
+                    </a:p>
+                  </a:txBody>
+                  <a:tcPr anchor="ctr">
+                    <a:solidFill>
+                      <a:schemeClr val="bg1"/>
+                    </a:solidFill>
+                  </a:tcPr>
+                </a:tc>
+                <a:tc>
+                  <a:txBody>
+                    <a:bodyPr/>
+                    <a:lstStyle/>
+                    <a:p>
+                      <a:pPr algn="ctr" latinLnBrk="1"/>
+                      <a:r>
+                        <a:rPr lang="ko-KR" altLang="en-US" sz="1200" b="0" dirty="0" smtClean="0">
+                          <a:solidFill>
+                            <a:schemeClr val="tx1"/>
+                          </a:solidFill>
+                          <a:latin typeface="맑은 고딕" pitchFamily="50" charset="-127"/>
+                          <a:ea typeface="맑은 고딕" pitchFamily="50" charset="-127"/>
+                        </a:rPr>
+                        <a:t>김태현</a:t>
+                      </a:r>
+                      <a:endParaRPr lang="ko-KR" altLang="en-US" sz="1200" b="0" dirty="0">
+                        <a:solidFill>
+                          <a:schemeClr val="tx1"/>
+                        </a:solidFill>
+                        <a:latin typeface="맑은 고딕" pitchFamily="50" charset="-127"/>
+                        <a:ea typeface="맑은 고딕" pitchFamily="50" charset="-127"/>
+                      </a:endParaRPr>
+                    </a:p>
+                  </a:txBody>
+                  <a:tcPr anchor="ctr">
+                    <a:solidFill>
+                      <a:schemeClr val="bg1"/>
+                    </a:solidFill>
+                  </a:tcPr>
+                </a:tc>
+                <a:extLst>
+                  <a:ext uri="{0D108BD9-81ED-4DB2-BD59-A6C34878D82A}">
+                    <a16:rowId xmlns:a16="http://schemas.microsoft.com/office/drawing/2014/main" xmlns="" val="10006"/>
                   </a:ext>
                 </a:extLst>
               </a:tr>
@@ -4472,98 +4824,7 @@
                 </a:tc>
                 <a:extLst>
                   <a:ext uri="{0D108BD9-81ED-4DB2-BD59-A6C34878D82A}">
-                    <a16:rowId xmlns:a16="http://schemas.microsoft.com/office/drawing/2014/main" val="10006"/>
-                  </a:ext>
-                </a:extLst>
-              </a:tr>
-              <a:tr h="370840">
-                <a:tc>
-                  <a:txBody>
-                    <a:bodyPr/>
-                    <a:lstStyle/>
-                    <a:p>
-                      <a:pPr algn="ctr" latinLnBrk="1"/>
-                      <a:endParaRPr lang="ko-KR" altLang="en-US" sz="1200" b="0">
-                        <a:solidFill>
-                          <a:schemeClr val="tx1"/>
-                        </a:solidFill>
-                        <a:latin typeface="맑은 고딕" pitchFamily="50" charset="-127"/>
-                        <a:ea typeface="맑은 고딕" pitchFamily="50" charset="-127"/>
-                      </a:endParaRPr>
-                    </a:p>
-                  </a:txBody>
-                  <a:tcPr anchor="ctr">
-                    <a:solidFill>
-                      <a:schemeClr val="bg1"/>
-                    </a:solidFill>
-                  </a:tcPr>
-                </a:tc>
-                <a:tc>
-                  <a:txBody>
-                    <a:bodyPr/>
-                    <a:lstStyle/>
-                    <a:p>
-                      <a:pPr algn="ctr" latinLnBrk="1"/>
-                      <a:endParaRPr lang="ko-KR" altLang="en-US" sz="1200" b="0" dirty="0">
-                        <a:solidFill>
-                          <a:schemeClr val="tx1"/>
-                        </a:solidFill>
-                        <a:latin typeface="맑은 고딕" pitchFamily="50" charset="-127"/>
-                        <a:ea typeface="맑은 고딕" pitchFamily="50" charset="-127"/>
-                      </a:endParaRPr>
-                    </a:p>
-                  </a:txBody>
-                  <a:tcPr anchor="ctr">
-                    <a:solidFill>
-                      <a:schemeClr val="bg1"/>
-                    </a:solidFill>
-                  </a:tcPr>
-                </a:tc>
-                <a:tc>
-                  <a:txBody>
-                    <a:bodyPr/>
-                    <a:lstStyle/>
-                    <a:p>
-                      <a:pPr latinLnBrk="1"/>
-                      <a:endParaRPr lang="ko-KR" altLang="en-US" sz="1200" b="0" dirty="0">
-                        <a:solidFill>
-                          <a:schemeClr val="tx1"/>
-                        </a:solidFill>
-                        <a:latin typeface="맑은 고딕" pitchFamily="50" charset="-127"/>
-                        <a:ea typeface="맑은 고딕" pitchFamily="50" charset="-127"/>
-                      </a:endParaRPr>
-                    </a:p>
-                  </a:txBody>
-                  <a:tcPr anchor="ctr">
-                    <a:solidFill>
-                      <a:schemeClr val="bg1"/>
-                    </a:solidFill>
-                  </a:tcPr>
-                </a:tc>
-                <a:tc>
-                  <a:txBody>
-                    <a:bodyPr/>
-                    <a:lstStyle/>
-                    <a:p>
-                      <a:pPr algn="ctr" latinLnBrk="1"/>
-                      <a:endParaRPr lang="ko-KR" altLang="en-US" sz="1200" b="0" dirty="0">
-                        <a:solidFill>
-                          <a:schemeClr val="tx1"/>
-                        </a:solidFill>
-                        <a:latin typeface="맑은 고딕" pitchFamily="50" charset="-127"/>
-                        <a:ea typeface="맑은 고딕" pitchFamily="50" charset="-127"/>
-                      </a:endParaRPr>
-                    </a:p>
-                  </a:txBody>
-                  <a:tcPr anchor="ctr">
-                    <a:solidFill>
-                      <a:schemeClr val="bg1"/>
-                    </a:solidFill>
-                  </a:tcPr>
-                </a:tc>
-                <a:extLst>
-                  <a:ext uri="{0D108BD9-81ED-4DB2-BD59-A6C34878D82A}">
-                    <a16:rowId xmlns:a16="http://schemas.microsoft.com/office/drawing/2014/main" val="10007"/>
+                    <a16:rowId xmlns:a16="http://schemas.microsoft.com/office/drawing/2014/main" xmlns="" val="10007"/>
                   </a:ext>
                 </a:extLst>
               </a:tr>
@@ -4628,7 +4889,7 @@
           <p:nvPr/>
         </p:nvPicPr>
         <p:blipFill>
-          <a:blip r:embed="rId2"/>
+          <a:blip r:embed="rId3"/>
           <a:stretch>
             <a:fillRect/>
           </a:stretch>
@@ -4718,7 +4979,7 @@
     </p:spTree>
     <p:extLst>
       <p:ext uri="{BB962C8B-B14F-4D97-AF65-F5344CB8AC3E}">
-        <p14:creationId xmlns:p14="http://schemas.microsoft.com/office/powerpoint/2010/main" val="1665250424"/>
+        <p14:creationId xmlns:p14="http://schemas.microsoft.com/office/powerpoint/2010/main" xmlns="" val="1665250424"/>
       </p:ext>
     </p:extLst>
   </p:cSld>
@@ -4777,7 +5038,7 @@
           <p:nvPr/>
         </p:nvPicPr>
         <p:blipFill>
-          <a:blip r:embed="rId2"/>
+          <a:blip r:embed="rId3"/>
           <a:stretch>
             <a:fillRect/>
           </a:stretch>
@@ -4795,7 +5056,7 @@
     </p:spTree>
     <p:extLst>
       <p:ext uri="{BB962C8B-B14F-4D97-AF65-F5344CB8AC3E}">
-        <p14:creationId xmlns:p14="http://schemas.microsoft.com/office/powerpoint/2010/main" val="632426846"/>
+        <p14:creationId xmlns:p14="http://schemas.microsoft.com/office/powerpoint/2010/main" xmlns="" val="632426846"/>
       </p:ext>
     </p:extLst>
   </p:cSld>
@@ -4872,7 +5133,7 @@
     </p:spTree>
     <p:extLst>
       <p:ext uri="{BB962C8B-B14F-4D97-AF65-F5344CB8AC3E}">
-        <p14:creationId xmlns:p14="http://schemas.microsoft.com/office/powerpoint/2010/main" val="3338057399"/>
+        <p14:creationId xmlns:p14="http://schemas.microsoft.com/office/powerpoint/2010/main" xmlns="" val="3338057399"/>
       </p:ext>
     </p:extLst>
   </p:cSld>
@@ -4949,7 +5210,7 @@
     </p:spTree>
     <p:extLst>
       <p:ext uri="{BB962C8B-B14F-4D97-AF65-F5344CB8AC3E}">
-        <p14:creationId xmlns:p14="http://schemas.microsoft.com/office/powerpoint/2010/main" val="4003923472"/>
+        <p14:creationId xmlns:p14="http://schemas.microsoft.com/office/powerpoint/2010/main" xmlns="" val="4003923472"/>
       </p:ext>
     </p:extLst>
   </p:cSld>
@@ -5026,7 +5287,7 @@
     </p:spTree>
     <p:extLst>
       <p:ext uri="{BB962C8B-B14F-4D97-AF65-F5344CB8AC3E}">
-        <p14:creationId xmlns:p14="http://schemas.microsoft.com/office/powerpoint/2010/main" val="683381687"/>
+        <p14:creationId xmlns:p14="http://schemas.microsoft.com/office/powerpoint/2010/main" xmlns="" val="683381687"/>
       </p:ext>
     </p:extLst>
   </p:cSld>
@@ -5103,7 +5364,7 @@
     </p:spTree>
     <p:extLst>
       <p:ext uri="{BB962C8B-B14F-4D97-AF65-F5344CB8AC3E}">
-        <p14:creationId xmlns:p14="http://schemas.microsoft.com/office/powerpoint/2010/main" val="77776264"/>
+        <p14:creationId xmlns:p14="http://schemas.microsoft.com/office/powerpoint/2010/main" xmlns="" val="77776264"/>
       </p:ext>
     </p:extLst>
   </p:cSld>

</xml_diff>

<commit_message>
doc/3_ 설계서/Class Design.pptx Class Design_4_tuna_김태현_20170525_최종 최종 제출
</commit_message>
<xml_diff>
--- a/doc/3_ 설계서/Class Design.pptx
+++ b/doc/3_ 설계서/Class Design.pptx
@@ -150,7 +150,7 @@
   </p:defaultTextStyle>
   <p:extLst>
     <p:ext uri="{EFAFB233-063F-42B5-8137-9DF3F51BA10A}">
-      <p15:sldGuideLst xmlns:p15="http://schemas.microsoft.com/office/powerpoint/2012/main" xmlns="">
+      <p15:sldGuideLst xmlns="" xmlns:p15="http://schemas.microsoft.com/office/powerpoint/2012/main">
         <p15:guide id="1" orient="horz">
           <p15:clr>
             <a:srgbClr val="A4A3A4"/>
@@ -169,7 +169,7 @@
       </p15:sldGuideLst>
     </p:ext>
     <p:ext uri="{2D200454-40CA-4A62-9FC3-DE9A4176ACB9}">
-      <p15:notesGuideLst xmlns:p15="http://schemas.microsoft.com/office/powerpoint/2012/main" xmlns="">
+      <p15:notesGuideLst xmlns="" xmlns:p15="http://schemas.microsoft.com/office/powerpoint/2012/main">
         <p15:guide id="1" orient="horz" pos="3126">
           <p15:clr>
             <a:srgbClr val="A4A3A4"/>
@@ -407,7 +407,7 @@
     </p:spTree>
     <p:extLst>
       <p:ext uri="{BB962C8B-B14F-4D97-AF65-F5344CB8AC3E}">
-        <p14:creationId xmlns:p14="http://schemas.microsoft.com/office/powerpoint/2010/main" xmlns="" val="508471591"/>
+        <p14:creationId xmlns="" xmlns:p14="http://schemas.microsoft.com/office/powerpoint/2010/main" val="508471591"/>
       </p:ext>
     </p:extLst>
   </p:cSld>
@@ -733,7 +733,7 @@
     </p:spTree>
     <p:extLst>
       <p:ext uri="{BB962C8B-B14F-4D97-AF65-F5344CB8AC3E}">
-        <p14:creationId xmlns:p14="http://schemas.microsoft.com/office/powerpoint/2010/main" xmlns="" val="860101577"/>
+        <p14:creationId xmlns="" xmlns:p14="http://schemas.microsoft.com/office/powerpoint/2010/main" val="860101577"/>
       </p:ext>
     </p:extLst>
   </p:cSld>
@@ -1284,7 +1284,7 @@
           <p:nvPr userDrawn="1">
             <p:extLst>
               <p:ext uri="{D42A27DB-BD31-4B8C-83A1-F6EECF244321}">
-                <p14:modId xmlns:p14="http://schemas.microsoft.com/office/powerpoint/2010/main" xmlns="" val="2700793136"/>
+                <p14:modId xmlns="" xmlns:p14="http://schemas.microsoft.com/office/powerpoint/2010/main" val="2700793136"/>
               </p:ext>
             </p:extLst>
           </p:nvPr>
@@ -1301,28 +1301,28 @@
                 <a:gridCol w="1022523">
                   <a:extLst>
                     <a:ext uri="{9D8B030D-6E8A-4147-A177-3AD203B41FA5}">
-                      <a16:colId xmlns:a16="http://schemas.microsoft.com/office/drawing/2014/main" xmlns="" val="20000"/>
+                      <a16:colId xmlns="" xmlns:a16="http://schemas.microsoft.com/office/drawing/2014/main" val="20000"/>
                     </a:ext>
                   </a:extLst>
                 </a:gridCol>
                 <a:gridCol w="3439486">
                   <a:extLst>
                     <a:ext uri="{9D8B030D-6E8A-4147-A177-3AD203B41FA5}">
-                      <a16:colId xmlns:a16="http://schemas.microsoft.com/office/drawing/2014/main" xmlns="" val="20001"/>
+                      <a16:colId xmlns="" xmlns:a16="http://schemas.microsoft.com/office/drawing/2014/main" val="20001"/>
                     </a:ext>
                   </a:extLst>
                 </a:gridCol>
                 <a:gridCol w="947956">
                   <a:extLst>
                     <a:ext uri="{9D8B030D-6E8A-4147-A177-3AD203B41FA5}">
-                      <a16:colId xmlns:a16="http://schemas.microsoft.com/office/drawing/2014/main" xmlns="" val="20002"/>
+                      <a16:colId xmlns="" xmlns:a16="http://schemas.microsoft.com/office/drawing/2014/main" val="20002"/>
                     </a:ext>
                   </a:extLst>
                 </a:gridCol>
                 <a:gridCol w="3523377">
                   <a:extLst>
                     <a:ext uri="{9D8B030D-6E8A-4147-A177-3AD203B41FA5}">
-                      <a16:colId xmlns:a16="http://schemas.microsoft.com/office/drawing/2014/main" xmlns="" val="20003"/>
+                      <a16:colId xmlns="" xmlns:a16="http://schemas.microsoft.com/office/drawing/2014/main" val="20003"/>
                     </a:ext>
                   </a:extLst>
                 </a:gridCol>
@@ -1738,7 +1738,7 @@
                 </a:tc>
                 <a:extLst>
                   <a:ext uri="{0D108BD9-81ED-4DB2-BD59-A6C34878D82A}">
-                    <a16:rowId xmlns:a16="http://schemas.microsoft.com/office/drawing/2014/main" xmlns="" val="10000"/>
+                    <a16:rowId xmlns="" xmlns:a16="http://schemas.microsoft.com/office/drawing/2014/main" val="10000"/>
                   </a:ext>
                 </a:extLst>
               </a:tr>
@@ -2034,9 +2034,23 @@
                           <a:latin typeface="맑은 고딕" pitchFamily="50" charset="-127"/>
                           <a:ea typeface="맑은 고딕" pitchFamily="50" charset="-127"/>
                         </a:rPr>
-                        <a:t>20170525_05</a:t>
-                      </a:r>
-                      <a:endParaRPr kumimoji="1" lang="ko-KR" altLang="ko-KR" sz="900" b="0" i="0" u="none" strike="noStrike" cap="none" normalizeH="0" baseline="0" dirty="0">
+                        <a:t>20170525_</a:t>
+                      </a:r>
+                      <a:r>
+                        <a:rPr kumimoji="1" lang="ko-KR" altLang="en-US" sz="900" b="0" i="0" u="none" strike="noStrike" cap="none" normalizeH="0" baseline="0" dirty="0" smtClean="0">
+                          <a:ln>
+                            <a:noFill/>
+                          </a:ln>
+                          <a:solidFill>
+                            <a:schemeClr val="tx1"/>
+                          </a:solidFill>
+                          <a:effectLst/>
+                          <a:latin typeface="맑은 고딕" pitchFamily="50" charset="-127"/>
+                          <a:ea typeface="맑은 고딕" pitchFamily="50" charset="-127"/>
+                        </a:rPr>
+                        <a:t>최종</a:t>
+                      </a:r>
+                      <a:endParaRPr kumimoji="1" lang="en-US" altLang="ko-KR" sz="900" b="0" i="0" u="none" strike="noStrike" cap="none" normalizeH="0" baseline="0" dirty="0" smtClean="0">
                         <a:ln>
                           <a:noFill/>
                         </a:ln>
@@ -2097,7 +2111,7 @@
                 </a:tc>
                 <a:extLst>
                   <a:ext uri="{0D108BD9-81ED-4DB2-BD59-A6C34878D82A}">
-                    <a16:rowId xmlns:a16="http://schemas.microsoft.com/office/drawing/2014/main" xmlns="" val="10001"/>
+                    <a16:rowId xmlns="" xmlns:a16="http://schemas.microsoft.com/office/drawing/2014/main" val="10001"/>
                   </a:ext>
                 </a:extLst>
               </a:tr>
@@ -3358,7 +3372,7 @@
             <p:ph idx="1"/>
             <p:extLst>
               <p:ext uri="{D42A27DB-BD31-4B8C-83A1-F6EECF244321}">
-                <p14:modId xmlns:p14="http://schemas.microsoft.com/office/powerpoint/2010/main" xmlns="" val="3755899299"/>
+                <p14:modId xmlns="" xmlns:p14="http://schemas.microsoft.com/office/powerpoint/2010/main" val="3755899299"/>
               </p:ext>
             </p:extLst>
           </p:nvPr>
@@ -3377,28 +3391,28 @@
                 <a:gridCol w="2145506">
                   <a:extLst>
                     <a:ext uri="{9D8B030D-6E8A-4147-A177-3AD203B41FA5}">
-                      <a16:colId xmlns:a16="http://schemas.microsoft.com/office/drawing/2014/main" xmlns="" val="20000"/>
+                      <a16:colId xmlns="" xmlns:a16="http://schemas.microsoft.com/office/drawing/2014/main" val="20000"/>
                     </a:ext>
                   </a:extLst>
                 </a:gridCol>
                 <a:gridCol w="2145506">
                   <a:extLst>
                     <a:ext uri="{9D8B030D-6E8A-4147-A177-3AD203B41FA5}">
-                      <a16:colId xmlns:a16="http://schemas.microsoft.com/office/drawing/2014/main" xmlns="" val="20001"/>
+                      <a16:colId xmlns="" xmlns:a16="http://schemas.microsoft.com/office/drawing/2014/main" val="20001"/>
                     </a:ext>
                   </a:extLst>
                 </a:gridCol>
                 <a:gridCol w="2145506">
                   <a:extLst>
                     <a:ext uri="{9D8B030D-6E8A-4147-A177-3AD203B41FA5}">
-                      <a16:colId xmlns:a16="http://schemas.microsoft.com/office/drawing/2014/main" xmlns="" val="20002"/>
+                      <a16:colId xmlns="" xmlns:a16="http://schemas.microsoft.com/office/drawing/2014/main" val="20002"/>
                     </a:ext>
                   </a:extLst>
                 </a:gridCol>
                 <a:gridCol w="2145506">
                   <a:extLst>
                     <a:ext uri="{9D8B030D-6E8A-4147-A177-3AD203B41FA5}">
-                      <a16:colId xmlns:a16="http://schemas.microsoft.com/office/drawing/2014/main" xmlns="" val="20003"/>
+                      <a16:colId xmlns="" xmlns:a16="http://schemas.microsoft.com/office/drawing/2014/main" val="20003"/>
                     </a:ext>
                   </a:extLst>
                 </a:gridCol>
@@ -3526,7 +3540,7 @@
                 </a:tc>
                 <a:extLst>
                   <a:ext uri="{0D108BD9-81ED-4DB2-BD59-A6C34878D82A}">
-                    <a16:rowId xmlns:a16="http://schemas.microsoft.com/office/drawing/2014/main" xmlns="" val="10000"/>
+                    <a16:rowId xmlns="" xmlns:a16="http://schemas.microsoft.com/office/drawing/2014/main" val="10000"/>
                   </a:ext>
                 </a:extLst>
               </a:tr>
@@ -3641,7 +3655,7 @@
                     <a:bodyPr/>
                     <a:lstStyle/>
                     <a:p>
-                      <a:pPr latinLnBrk="1"/>
+                      <a:pPr algn="ctr" latinLnBrk="1"/>
                       <a:r>
                         <a:rPr lang="ko-KR" altLang="en-US" sz="1200" b="0" dirty="0">
                           <a:solidFill>
@@ -3763,7 +3777,7 @@
                 </a:tc>
                 <a:extLst>
                   <a:ext uri="{0D108BD9-81ED-4DB2-BD59-A6C34878D82A}">
-                    <a16:rowId xmlns:a16="http://schemas.microsoft.com/office/drawing/2014/main" xmlns="" val="10001"/>
+                    <a16:rowId xmlns="" xmlns:a16="http://schemas.microsoft.com/office/drawing/2014/main" val="10001"/>
                   </a:ext>
                 </a:extLst>
               </a:tr>
@@ -3878,7 +3892,7 @@
                     <a:bodyPr/>
                     <a:lstStyle/>
                     <a:p>
-                      <a:pPr latinLnBrk="1"/>
+                      <a:pPr algn="ctr" latinLnBrk="1"/>
                       <a:r>
                         <a:rPr lang="en-US" altLang="ko-KR" sz="1200" b="0" dirty="0">
                           <a:solidFill>
@@ -3953,7 +3967,7 @@
                 </a:tc>
                 <a:extLst>
                   <a:ext uri="{0D108BD9-81ED-4DB2-BD59-A6C34878D82A}">
-                    <a16:rowId xmlns:a16="http://schemas.microsoft.com/office/drawing/2014/main" xmlns="" val="10002"/>
+                    <a16:rowId xmlns="" xmlns:a16="http://schemas.microsoft.com/office/drawing/2014/main" val="10002"/>
                   </a:ext>
                 </a:extLst>
               </a:tr>
@@ -4068,7 +4082,7 @@
                     <a:bodyPr/>
                     <a:lstStyle/>
                     <a:p>
-                      <a:pPr latinLnBrk="1"/>
+                      <a:pPr algn="ctr" latinLnBrk="1"/>
                       <a:r>
                         <a:rPr lang="ko-KR" altLang="en-US" sz="1200" b="0" dirty="0">
                           <a:solidFill>
@@ -4120,7 +4134,7 @@
                 </a:tc>
                 <a:extLst>
                   <a:ext uri="{0D108BD9-81ED-4DB2-BD59-A6C34878D82A}">
-                    <a16:rowId xmlns:a16="http://schemas.microsoft.com/office/drawing/2014/main" xmlns="" val="10003"/>
+                    <a16:rowId xmlns="" xmlns:a16="http://schemas.microsoft.com/office/drawing/2014/main" val="10003"/>
                   </a:ext>
                 </a:extLst>
               </a:tr>
@@ -4251,7 +4265,7 @@
                     <a:bodyPr/>
                     <a:lstStyle/>
                     <a:p>
-                      <a:pPr latinLnBrk="1"/>
+                      <a:pPr algn="ctr" latinLnBrk="1"/>
                       <a:r>
                         <a:rPr lang="ko-KR" altLang="en-US" sz="1200" b="0" dirty="0">
                           <a:solidFill>
@@ -4336,7 +4350,7 @@
                 </a:tc>
                 <a:extLst>
                   <a:ext uri="{0D108BD9-81ED-4DB2-BD59-A6C34878D82A}">
-                    <a16:rowId xmlns:a16="http://schemas.microsoft.com/office/drawing/2014/main" xmlns="" val="10004"/>
+                    <a16:rowId xmlns="" xmlns:a16="http://schemas.microsoft.com/office/drawing/2014/main" val="10004"/>
                   </a:ext>
                 </a:extLst>
               </a:tr>
@@ -4467,7 +4481,7 @@
                     <a:bodyPr/>
                     <a:lstStyle/>
                     <a:p>
-                      <a:pPr latinLnBrk="1"/>
+                      <a:pPr algn="ctr" latinLnBrk="1"/>
                       <a:r>
                         <a:rPr lang="ko-KR" altLang="en-US" sz="1200" b="0" dirty="0">
                           <a:solidFill>
@@ -4552,7 +4566,7 @@
                 </a:tc>
                 <a:extLst>
                   <a:ext uri="{0D108BD9-81ED-4DB2-BD59-A6C34878D82A}">
-                    <a16:rowId xmlns:a16="http://schemas.microsoft.com/office/drawing/2014/main" xmlns="" val="10005"/>
+                    <a16:rowId xmlns="" xmlns:a16="http://schemas.microsoft.com/office/drawing/2014/main" val="10005"/>
                   </a:ext>
                 </a:extLst>
               </a:tr>
@@ -4674,7 +4688,7 @@
                     <a:bodyPr/>
                     <a:lstStyle/>
                     <a:p>
-                      <a:pPr latinLnBrk="1"/>
+                      <a:pPr algn="ctr" latinLnBrk="1"/>
                       <a:r>
                         <a:rPr lang="ko-KR" altLang="en-US" sz="1200" b="0" dirty="0" smtClean="0">
                           <a:solidFill>
@@ -4733,7 +4747,7 @@
                 </a:tc>
                 <a:extLst>
                   <a:ext uri="{0D108BD9-81ED-4DB2-BD59-A6C34878D82A}">
-                    <a16:rowId xmlns:a16="http://schemas.microsoft.com/office/drawing/2014/main" xmlns="" val="10006"/>
+                    <a16:rowId xmlns="" xmlns:a16="http://schemas.microsoft.com/office/drawing/2014/main" val="10006"/>
                   </a:ext>
                 </a:extLst>
               </a:tr>
@@ -4744,48 +4758,66 @@
                     <a:lstStyle/>
                     <a:p>
                       <a:pPr algn="ctr" latinLnBrk="1"/>
-                      <a:endParaRPr lang="ko-KR" altLang="en-US" sz="1200" b="0">
-                        <a:solidFill>
-                          <a:schemeClr val="tx1"/>
-                        </a:solidFill>
-                        <a:latin typeface="맑은 고딕" pitchFamily="50" charset="-127"/>
-                        <a:ea typeface="맑은 고딕" pitchFamily="50" charset="-127"/>
-                      </a:endParaRPr>
-                    </a:p>
-                  </a:txBody>
-                  <a:tcPr anchor="ctr">
-                    <a:solidFill>
-                      <a:schemeClr val="bg1"/>
-                    </a:solidFill>
-                  </a:tcPr>
-                </a:tc>
-                <a:tc>
-                  <a:txBody>
-                    <a:bodyPr/>
-                    <a:lstStyle/>
-                    <a:p>
-                      <a:pPr algn="ctr" latinLnBrk="1"/>
-                      <a:endParaRPr lang="ko-KR" altLang="en-US" sz="1200" b="0" dirty="0">
-                        <a:solidFill>
-                          <a:schemeClr val="tx1"/>
-                        </a:solidFill>
-                        <a:latin typeface="맑은 고딕" pitchFamily="50" charset="-127"/>
-                        <a:ea typeface="맑은 고딕" pitchFamily="50" charset="-127"/>
-                      </a:endParaRPr>
-                    </a:p>
-                  </a:txBody>
-                  <a:tcPr anchor="ctr">
-                    <a:solidFill>
-                      <a:schemeClr val="bg1"/>
-                    </a:solidFill>
-                  </a:tcPr>
-                </a:tc>
-                <a:tc>
-                  <a:txBody>
-                    <a:bodyPr/>
-                    <a:lstStyle/>
-                    <a:p>
-                      <a:pPr latinLnBrk="1"/>
+                      <a:r>
+                        <a:rPr lang="en-US" altLang="ko-KR" sz="1200" b="0" dirty="0" smtClean="0">
+                          <a:solidFill>
+                            <a:schemeClr val="tx1"/>
+                          </a:solidFill>
+                          <a:latin typeface="맑은 고딕" pitchFamily="50" charset="-127"/>
+                          <a:ea typeface="맑은 고딕" pitchFamily="50" charset="-127"/>
+                        </a:rPr>
+                        <a:t>2017</a:t>
+                      </a:r>
+                      <a:r>
+                        <a:rPr lang="ko-KR" altLang="en-US" sz="1200" b="0" dirty="0" smtClean="0">
+                          <a:solidFill>
+                            <a:schemeClr val="tx1"/>
+                          </a:solidFill>
+                          <a:latin typeface="맑은 고딕" pitchFamily="50" charset="-127"/>
+                          <a:ea typeface="맑은 고딕" pitchFamily="50" charset="-127"/>
+                        </a:rPr>
+                        <a:t>년 </a:t>
+                      </a:r>
+                      <a:r>
+                        <a:rPr lang="en-US" altLang="ko-KR" sz="1200" b="0" dirty="0" smtClean="0">
+                          <a:solidFill>
+                            <a:schemeClr val="tx1"/>
+                          </a:solidFill>
+                          <a:latin typeface="맑은 고딕" pitchFamily="50" charset="-127"/>
+                          <a:ea typeface="맑은 고딕" pitchFamily="50" charset="-127"/>
+                        </a:rPr>
+                        <a:t>05</a:t>
+                      </a:r>
+                      <a:r>
+                        <a:rPr lang="ko-KR" altLang="en-US" sz="1200" b="0" dirty="0" smtClean="0">
+                          <a:solidFill>
+                            <a:schemeClr val="tx1"/>
+                          </a:solidFill>
+                          <a:latin typeface="맑은 고딕" pitchFamily="50" charset="-127"/>
+                          <a:ea typeface="맑은 고딕" pitchFamily="50" charset="-127"/>
+                        </a:rPr>
+                        <a:t>월 </a:t>
+                      </a:r>
+                      <a:r>
+                        <a:rPr lang="en-US" altLang="ko-KR" sz="1200" b="0" dirty="0" smtClean="0">
+                          <a:solidFill>
+                            <a:schemeClr val="tx1"/>
+                          </a:solidFill>
+                          <a:latin typeface="맑은 고딕" pitchFamily="50" charset="-127"/>
+                          <a:ea typeface="맑은 고딕" pitchFamily="50" charset="-127"/>
+                        </a:rPr>
+                        <a:t>25</a:t>
+                      </a:r>
+                      <a:r>
+                        <a:rPr lang="ko-KR" altLang="en-US" sz="1200" b="0" dirty="0" smtClean="0">
+                          <a:solidFill>
+                            <a:schemeClr val="tx1"/>
+                          </a:solidFill>
+                          <a:latin typeface="맑은 고딕" pitchFamily="50" charset="-127"/>
+                          <a:ea typeface="맑은 고딕" pitchFamily="50" charset="-127"/>
+                        </a:rPr>
+                        <a:t>일</a:t>
+                      </a:r>
                       <a:endParaRPr lang="ko-KR" altLang="en-US" sz="1200" b="0" dirty="0">
                         <a:solidFill>
                           <a:schemeClr val="tx1"/>
@@ -4807,6 +4839,78 @@
                     <a:lstStyle/>
                     <a:p>
                       <a:pPr algn="ctr" latinLnBrk="1"/>
+                      <a:r>
+                        <a:rPr lang="ko-KR" altLang="en-US" sz="1200" b="0" dirty="0" smtClean="0">
+                          <a:solidFill>
+                            <a:schemeClr val="tx1"/>
+                          </a:solidFill>
+                          <a:latin typeface="맑은 고딕" pitchFamily="50" charset="-127"/>
+                          <a:ea typeface="맑은 고딕" pitchFamily="50" charset="-127"/>
+                        </a:rPr>
+                        <a:t>최종</a:t>
+                      </a:r>
+                      <a:endParaRPr lang="ko-KR" altLang="en-US" sz="1200" b="0" dirty="0">
+                        <a:solidFill>
+                          <a:schemeClr val="tx1"/>
+                        </a:solidFill>
+                        <a:latin typeface="맑은 고딕" pitchFamily="50" charset="-127"/>
+                        <a:ea typeface="맑은 고딕" pitchFamily="50" charset="-127"/>
+                      </a:endParaRPr>
+                    </a:p>
+                  </a:txBody>
+                  <a:tcPr anchor="ctr">
+                    <a:solidFill>
+                      <a:schemeClr val="bg1"/>
+                    </a:solidFill>
+                  </a:tcPr>
+                </a:tc>
+                <a:tc>
+                  <a:txBody>
+                    <a:bodyPr/>
+                    <a:lstStyle/>
+                    <a:p>
+                      <a:pPr algn="ctr" latinLnBrk="1"/>
+                      <a:r>
+                        <a:rPr lang="ko-KR" altLang="en-US" sz="1200" b="0" dirty="0" smtClean="0">
+                          <a:solidFill>
+                            <a:schemeClr val="tx1"/>
+                          </a:solidFill>
+                          <a:latin typeface="맑은 고딕" pitchFamily="50" charset="-127"/>
+                          <a:ea typeface="맑은 고딕" pitchFamily="50" charset="-127"/>
+                        </a:rPr>
+                        <a:t>최종 제출</a:t>
+                      </a:r>
+                      <a:endParaRPr lang="ko-KR" altLang="en-US" sz="1200" b="0" dirty="0">
+                        <a:solidFill>
+                          <a:schemeClr val="tx1"/>
+                        </a:solidFill>
+                        <a:latin typeface="맑은 고딕" pitchFamily="50" charset="-127"/>
+                        <a:ea typeface="맑은 고딕" pitchFamily="50" charset="-127"/>
+                      </a:endParaRPr>
+                    </a:p>
+                  </a:txBody>
+                  <a:tcPr anchor="ctr">
+                    <a:solidFill>
+                      <a:schemeClr val="bg1"/>
+                    </a:solidFill>
+                  </a:tcPr>
+                </a:tc>
+                <a:tc>
+                  <a:txBody>
+                    <a:bodyPr/>
+                    <a:lstStyle/>
+                    <a:p>
+                      <a:pPr algn="ctr" latinLnBrk="1"/>
+                      <a:r>
+                        <a:rPr lang="ko-KR" altLang="en-US" sz="1200" b="0" dirty="0" smtClean="0">
+                          <a:solidFill>
+                            <a:schemeClr val="tx1"/>
+                          </a:solidFill>
+                          <a:latin typeface="맑은 고딕" pitchFamily="50" charset="-127"/>
+                          <a:ea typeface="맑은 고딕" pitchFamily="50" charset="-127"/>
+                        </a:rPr>
+                        <a:t>김태현</a:t>
+                      </a:r>
                       <a:endParaRPr lang="ko-KR" altLang="en-US" sz="1200" b="0" dirty="0">
                         <a:solidFill>
                           <a:schemeClr val="tx1"/>
@@ -4824,7 +4928,7 @@
                 </a:tc>
                 <a:extLst>
                   <a:ext uri="{0D108BD9-81ED-4DB2-BD59-A6C34878D82A}">
-                    <a16:rowId xmlns:a16="http://schemas.microsoft.com/office/drawing/2014/main" xmlns="" val="10007"/>
+                    <a16:rowId xmlns="" xmlns:a16="http://schemas.microsoft.com/office/drawing/2014/main" val="10007"/>
                   </a:ext>
                 </a:extLst>
               </a:tr>
@@ -4979,7 +5083,7 @@
     </p:spTree>
     <p:extLst>
       <p:ext uri="{BB962C8B-B14F-4D97-AF65-F5344CB8AC3E}">
-        <p14:creationId xmlns:p14="http://schemas.microsoft.com/office/powerpoint/2010/main" xmlns="" val="1665250424"/>
+        <p14:creationId xmlns="" xmlns:p14="http://schemas.microsoft.com/office/powerpoint/2010/main" val="1665250424"/>
       </p:ext>
     </p:extLst>
   </p:cSld>
@@ -5056,7 +5160,7 @@
     </p:spTree>
     <p:extLst>
       <p:ext uri="{BB962C8B-B14F-4D97-AF65-F5344CB8AC3E}">
-        <p14:creationId xmlns:p14="http://schemas.microsoft.com/office/powerpoint/2010/main" xmlns="" val="632426846"/>
+        <p14:creationId xmlns="" xmlns:p14="http://schemas.microsoft.com/office/powerpoint/2010/main" val="632426846"/>
       </p:ext>
     </p:extLst>
   </p:cSld>
@@ -5133,7 +5237,7 @@
     </p:spTree>
     <p:extLst>
       <p:ext uri="{BB962C8B-B14F-4D97-AF65-F5344CB8AC3E}">
-        <p14:creationId xmlns:p14="http://schemas.microsoft.com/office/powerpoint/2010/main" xmlns="" val="3338057399"/>
+        <p14:creationId xmlns="" xmlns:p14="http://schemas.microsoft.com/office/powerpoint/2010/main" val="3338057399"/>
       </p:ext>
     </p:extLst>
   </p:cSld>
@@ -5210,7 +5314,7 @@
     </p:spTree>
     <p:extLst>
       <p:ext uri="{BB962C8B-B14F-4D97-AF65-F5344CB8AC3E}">
-        <p14:creationId xmlns:p14="http://schemas.microsoft.com/office/powerpoint/2010/main" xmlns="" val="4003923472"/>
+        <p14:creationId xmlns="" xmlns:p14="http://schemas.microsoft.com/office/powerpoint/2010/main" val="4003923472"/>
       </p:ext>
     </p:extLst>
   </p:cSld>
@@ -5287,7 +5391,7 @@
     </p:spTree>
     <p:extLst>
       <p:ext uri="{BB962C8B-B14F-4D97-AF65-F5344CB8AC3E}">
-        <p14:creationId xmlns:p14="http://schemas.microsoft.com/office/powerpoint/2010/main" xmlns="" val="683381687"/>
+        <p14:creationId xmlns="" xmlns:p14="http://schemas.microsoft.com/office/powerpoint/2010/main" val="683381687"/>
       </p:ext>
     </p:extLst>
   </p:cSld>
@@ -5364,7 +5468,7 @@
     </p:spTree>
     <p:extLst>
       <p:ext uri="{BB962C8B-B14F-4D97-AF65-F5344CB8AC3E}">
-        <p14:creationId xmlns:p14="http://schemas.microsoft.com/office/powerpoint/2010/main" xmlns="" val="77776264"/>
+        <p14:creationId xmlns="" xmlns:p14="http://schemas.microsoft.com/office/powerpoint/2010/main" val="77776264"/>
       </p:ext>
     </p:extLst>
   </p:cSld>

</xml_diff>

<commit_message>
#898 doc/3_ 설계서/Class Design.pptx ClassDesign_20170604_김주민_01 // 요구사항 변경에 따른 전체 Class Design, MainFrame 변경
</commit_message>
<xml_diff>
--- a/doc/3_ 설계서/Class Design.pptx
+++ b/doc/3_ 설계서/Class Design.pptx
@@ -150,7 +150,7 @@
   </p:defaultTextStyle>
   <p:extLst>
     <p:ext uri="{EFAFB233-063F-42B5-8137-9DF3F51BA10A}">
-      <p15:sldGuideLst xmlns="" xmlns:p15="http://schemas.microsoft.com/office/powerpoint/2012/main">
+      <p15:sldGuideLst xmlns:p15="http://schemas.microsoft.com/office/powerpoint/2012/main">
         <p15:guide id="1" orient="horz">
           <p15:clr>
             <a:srgbClr val="A4A3A4"/>
@@ -169,7 +169,7 @@
       </p15:sldGuideLst>
     </p:ext>
     <p:ext uri="{2D200454-40CA-4A62-9FC3-DE9A4176ACB9}">
-      <p15:notesGuideLst xmlns="" xmlns:p15="http://schemas.microsoft.com/office/powerpoint/2012/main">
+      <p15:notesGuideLst xmlns:p15="http://schemas.microsoft.com/office/powerpoint/2012/main">
         <p15:guide id="1" orient="horz" pos="3126">
           <p15:clr>
             <a:srgbClr val="A4A3A4"/>
@@ -407,7 +407,7 @@
     </p:spTree>
     <p:extLst>
       <p:ext uri="{BB962C8B-B14F-4D97-AF65-F5344CB8AC3E}">
-        <p14:creationId xmlns="" xmlns:p14="http://schemas.microsoft.com/office/powerpoint/2010/main" val="508471591"/>
+        <p14:creationId xmlns:p14="http://schemas.microsoft.com/office/powerpoint/2010/main" val="508471591"/>
       </p:ext>
     </p:extLst>
   </p:cSld>
@@ -733,7 +733,7 @@
     </p:spTree>
     <p:extLst>
       <p:ext uri="{BB962C8B-B14F-4D97-AF65-F5344CB8AC3E}">
-        <p14:creationId xmlns="" xmlns:p14="http://schemas.microsoft.com/office/powerpoint/2010/main" val="860101577"/>
+        <p14:creationId xmlns:p14="http://schemas.microsoft.com/office/powerpoint/2010/main" val="860101577"/>
       </p:ext>
     </p:extLst>
   </p:cSld>
@@ -1236,10 +1236,6 @@
             </a:lvl1pPr>
           </a:lstStyle>
           <a:p>
-            <a:r>
-              <a:rPr lang="en-US" altLang="ko-KR" dirty="0"/>
-              <a:t/>
-            </a:r>
             <a:br>
               <a:rPr lang="en-US" altLang="ko-KR" dirty="0"/>
             </a:br>
@@ -1284,7 +1280,7 @@
           <p:nvPr userDrawn="1">
             <p:extLst>
               <p:ext uri="{D42A27DB-BD31-4B8C-83A1-F6EECF244321}">
-                <p14:modId xmlns="" xmlns:p14="http://schemas.microsoft.com/office/powerpoint/2010/main" val="2700793136"/>
+                <p14:modId xmlns:p14="http://schemas.microsoft.com/office/powerpoint/2010/main" val="89139025"/>
               </p:ext>
             </p:extLst>
           </p:nvPr>
@@ -1301,28 +1297,28 @@
                 <a:gridCol w="1022523">
                   <a:extLst>
                     <a:ext uri="{9D8B030D-6E8A-4147-A177-3AD203B41FA5}">
-                      <a16:colId xmlns="" xmlns:a16="http://schemas.microsoft.com/office/drawing/2014/main" val="20000"/>
+                      <a16:colId xmlns:a16="http://schemas.microsoft.com/office/drawing/2014/main" val="20000"/>
                     </a:ext>
                   </a:extLst>
                 </a:gridCol>
                 <a:gridCol w="3439486">
                   <a:extLst>
                     <a:ext uri="{9D8B030D-6E8A-4147-A177-3AD203B41FA5}">
-                      <a16:colId xmlns="" xmlns:a16="http://schemas.microsoft.com/office/drawing/2014/main" val="20001"/>
+                      <a16:colId xmlns:a16="http://schemas.microsoft.com/office/drawing/2014/main" val="20001"/>
                     </a:ext>
                   </a:extLst>
                 </a:gridCol>
                 <a:gridCol w="947956">
                   <a:extLst>
                     <a:ext uri="{9D8B030D-6E8A-4147-A177-3AD203B41FA5}">
-                      <a16:colId xmlns="" xmlns:a16="http://schemas.microsoft.com/office/drawing/2014/main" val="20002"/>
+                      <a16:colId xmlns:a16="http://schemas.microsoft.com/office/drawing/2014/main" val="20002"/>
                     </a:ext>
                   </a:extLst>
                 </a:gridCol>
                 <a:gridCol w="3523377">
                   <a:extLst>
                     <a:ext uri="{9D8B030D-6E8A-4147-A177-3AD203B41FA5}">
-                      <a16:colId xmlns="" xmlns:a16="http://schemas.microsoft.com/office/drawing/2014/main" val="20003"/>
+                      <a16:colId xmlns:a16="http://schemas.microsoft.com/office/drawing/2014/main" val="20003"/>
                     </a:ext>
                   </a:extLst>
                 </a:gridCol>
@@ -1738,7 +1734,7 @@
                 </a:tc>
                 <a:extLst>
                   <a:ext uri="{0D108BD9-81ED-4DB2-BD59-A6C34878D82A}">
-                    <a16:rowId xmlns="" xmlns:a16="http://schemas.microsoft.com/office/drawing/2014/main" val="10000"/>
+                    <a16:rowId xmlns:a16="http://schemas.microsoft.com/office/drawing/2014/main" val="10000"/>
                   </a:ext>
                 </a:extLst>
               </a:tr>
@@ -2023,7 +2019,7 @@
                         <a:tabLst/>
                       </a:pPr>
                       <a:r>
-                        <a:rPr kumimoji="1" lang="en-US" altLang="ko-KR" sz="900" b="0" i="0" u="none" strike="noStrike" cap="none" normalizeH="0" baseline="0" dirty="0" smtClean="0">
+                        <a:rPr kumimoji="1" lang="en-US" altLang="ko-KR" sz="900" b="0" i="0" u="none" strike="noStrike" cap="none" normalizeH="0" baseline="0" dirty="0">
                           <a:ln>
                             <a:noFill/>
                           </a:ln>
@@ -2034,33 +2030,8 @@
                           <a:latin typeface="맑은 고딕" pitchFamily="50" charset="-127"/>
                           <a:ea typeface="맑은 고딕" pitchFamily="50" charset="-127"/>
                         </a:rPr>
-                        <a:t>20170525_</a:t>
-                      </a:r>
-                      <a:r>
-                        <a:rPr kumimoji="1" lang="ko-KR" altLang="en-US" sz="900" b="0" i="0" u="none" strike="noStrike" cap="none" normalizeH="0" baseline="0" dirty="0" smtClean="0">
-                          <a:ln>
-                            <a:noFill/>
-                          </a:ln>
-                          <a:solidFill>
-                            <a:schemeClr val="tx1"/>
-                          </a:solidFill>
-                          <a:effectLst/>
-                          <a:latin typeface="맑은 고딕" pitchFamily="50" charset="-127"/>
-                          <a:ea typeface="맑은 고딕" pitchFamily="50" charset="-127"/>
-                        </a:rPr>
-                        <a:t>최종</a:t>
-                      </a:r>
-                      <a:endParaRPr kumimoji="1" lang="en-US" altLang="ko-KR" sz="900" b="0" i="0" u="none" strike="noStrike" cap="none" normalizeH="0" baseline="0" dirty="0" smtClean="0">
-                        <a:ln>
-                          <a:noFill/>
-                        </a:ln>
-                        <a:solidFill>
-                          <a:schemeClr val="tx1"/>
-                        </a:solidFill>
-                        <a:effectLst/>
-                        <a:latin typeface="맑은 고딕" pitchFamily="50" charset="-127"/>
-                        <a:ea typeface="맑은 고딕" pitchFamily="50" charset="-127"/>
-                      </a:endParaRPr>
+                        <a:t>20170604_01</a:t>
+                      </a:r>
                     </a:p>
                   </a:txBody>
                   <a:tcPr marL="36000" marR="36000" marT="18000" marB="18000" anchor="ctr" horzOverflow="overflow">
@@ -2111,7 +2082,7 @@
                 </a:tc>
                 <a:extLst>
                   <a:ext uri="{0D108BD9-81ED-4DB2-BD59-A6C34878D82A}">
-                    <a16:rowId xmlns="" xmlns:a16="http://schemas.microsoft.com/office/drawing/2014/main" val="10001"/>
+                    <a16:rowId xmlns:a16="http://schemas.microsoft.com/office/drawing/2014/main" val="10001"/>
                   </a:ext>
                 </a:extLst>
               </a:tr>
@@ -3244,10 +3215,6 @@
           <a:bodyPr/>
           <a:lstStyle/>
           <a:p>
-            <a:r>
-              <a:rPr lang="en-US" altLang="ko-KR" dirty="0"/>
-              <a:t/>
-            </a:r>
             <a:br>
               <a:rPr lang="en-US" altLang="ko-KR" dirty="0"/>
             </a:br>
@@ -3372,14 +3339,14 @@
             <p:ph idx="1"/>
             <p:extLst>
               <p:ext uri="{D42A27DB-BD31-4B8C-83A1-F6EECF244321}">
-                <p14:modId xmlns="" xmlns:p14="http://schemas.microsoft.com/office/powerpoint/2010/main" val="3755899299"/>
+                <p14:modId xmlns:p14="http://schemas.microsoft.com/office/powerpoint/2010/main" val="4265214196"/>
               </p:ext>
             </p:extLst>
           </p:nvPr>
         </p:nvGraphicFramePr>
         <p:xfrm>
           <a:off x="280988" y="1025525"/>
-          <a:ext cx="8582024" cy="3495040"/>
+          <a:ext cx="8582024" cy="4135120"/>
         </p:xfrm>
         <a:graphic>
           <a:graphicData uri="http://schemas.openxmlformats.org/drawingml/2006/table">
@@ -3391,28 +3358,28 @@
                 <a:gridCol w="2145506">
                   <a:extLst>
                     <a:ext uri="{9D8B030D-6E8A-4147-A177-3AD203B41FA5}">
-                      <a16:colId xmlns="" xmlns:a16="http://schemas.microsoft.com/office/drawing/2014/main" val="20000"/>
+                      <a16:colId xmlns:a16="http://schemas.microsoft.com/office/drawing/2014/main" val="20000"/>
                     </a:ext>
                   </a:extLst>
                 </a:gridCol>
                 <a:gridCol w="2145506">
                   <a:extLst>
                     <a:ext uri="{9D8B030D-6E8A-4147-A177-3AD203B41FA5}">
-                      <a16:colId xmlns="" xmlns:a16="http://schemas.microsoft.com/office/drawing/2014/main" val="20001"/>
+                      <a16:colId xmlns:a16="http://schemas.microsoft.com/office/drawing/2014/main" val="20001"/>
                     </a:ext>
                   </a:extLst>
                 </a:gridCol>
                 <a:gridCol w="2145506">
                   <a:extLst>
                     <a:ext uri="{9D8B030D-6E8A-4147-A177-3AD203B41FA5}">
-                      <a16:colId xmlns="" xmlns:a16="http://schemas.microsoft.com/office/drawing/2014/main" val="20002"/>
+                      <a16:colId xmlns:a16="http://schemas.microsoft.com/office/drawing/2014/main" val="20002"/>
                     </a:ext>
                   </a:extLst>
                 </a:gridCol>
                 <a:gridCol w="2145506">
                   <a:extLst>
                     <a:ext uri="{9D8B030D-6E8A-4147-A177-3AD203B41FA5}">
-                      <a16:colId xmlns="" xmlns:a16="http://schemas.microsoft.com/office/drawing/2014/main" val="20003"/>
+                      <a16:colId xmlns:a16="http://schemas.microsoft.com/office/drawing/2014/main" val="20003"/>
                     </a:ext>
                   </a:extLst>
                 </a:gridCol>
@@ -3540,7 +3507,7 @@
                 </a:tc>
                 <a:extLst>
                   <a:ext uri="{0D108BD9-81ED-4DB2-BD59-A6C34878D82A}">
-                    <a16:rowId xmlns="" xmlns:a16="http://schemas.microsoft.com/office/drawing/2014/main" val="10000"/>
+                    <a16:rowId xmlns:a16="http://schemas.microsoft.com/office/drawing/2014/main" val="10000"/>
                   </a:ext>
                 </a:extLst>
               </a:tr>
@@ -3777,7 +3744,7 @@
                 </a:tc>
                 <a:extLst>
                   <a:ext uri="{0D108BD9-81ED-4DB2-BD59-A6C34878D82A}">
-                    <a16:rowId xmlns="" xmlns:a16="http://schemas.microsoft.com/office/drawing/2014/main" val="10001"/>
+                    <a16:rowId xmlns:a16="http://schemas.microsoft.com/office/drawing/2014/main" val="10001"/>
                   </a:ext>
                 </a:extLst>
               </a:tr>
@@ -3967,7 +3934,7 @@
                 </a:tc>
                 <a:extLst>
                   <a:ext uri="{0D108BD9-81ED-4DB2-BD59-A6C34878D82A}">
-                    <a16:rowId xmlns="" xmlns:a16="http://schemas.microsoft.com/office/drawing/2014/main" val="10002"/>
+                    <a16:rowId xmlns:a16="http://schemas.microsoft.com/office/drawing/2014/main" val="10002"/>
                   </a:ext>
                 </a:extLst>
               </a:tr>
@@ -4134,7 +4101,7 @@
                 </a:tc>
                 <a:extLst>
                   <a:ext uri="{0D108BD9-81ED-4DB2-BD59-A6C34878D82A}">
-                    <a16:rowId xmlns="" xmlns:a16="http://schemas.microsoft.com/office/drawing/2014/main" val="10003"/>
+                    <a16:rowId xmlns:a16="http://schemas.microsoft.com/office/drawing/2014/main" val="10003"/>
                   </a:ext>
                 </a:extLst>
               </a:tr>
@@ -4350,7 +4317,7 @@
                 </a:tc>
                 <a:extLst>
                   <a:ext uri="{0D108BD9-81ED-4DB2-BD59-A6C34878D82A}">
-                    <a16:rowId xmlns="" xmlns:a16="http://schemas.microsoft.com/office/drawing/2014/main" val="10004"/>
+                    <a16:rowId xmlns:a16="http://schemas.microsoft.com/office/drawing/2014/main" val="10004"/>
                   </a:ext>
                 </a:extLst>
               </a:tr>
@@ -4566,7 +4533,7 @@
                 </a:tc>
                 <a:extLst>
                   <a:ext uri="{0D108BD9-81ED-4DB2-BD59-A6C34878D82A}">
-                    <a16:rowId xmlns="" xmlns:a16="http://schemas.microsoft.com/office/drawing/2014/main" val="10005"/>
+                    <a16:rowId xmlns:a16="http://schemas.microsoft.com/office/drawing/2014/main" val="10005"/>
                   </a:ext>
                 </a:extLst>
               </a:tr>
@@ -4578,7 +4545,7 @@
                     <a:p>
                       <a:pPr algn="ctr" latinLnBrk="1"/>
                       <a:r>
-                        <a:rPr lang="en-US" altLang="ko-KR" sz="1200" b="0" dirty="0" smtClean="0">
+                        <a:rPr lang="en-US" altLang="ko-KR" sz="1200" b="0" dirty="0">
                           <a:solidFill>
                             <a:schemeClr val="tx1"/>
                           </a:solidFill>
@@ -4588,7 +4555,7 @@
                         <a:t>2017</a:t>
                       </a:r>
                       <a:r>
-                        <a:rPr lang="ko-KR" altLang="en-US" sz="1200" b="0" dirty="0" smtClean="0">
+                        <a:rPr lang="ko-KR" altLang="en-US" sz="1200" b="0" dirty="0">
                           <a:solidFill>
                             <a:schemeClr val="tx1"/>
                           </a:solidFill>
@@ -4598,7 +4565,7 @@
                         <a:t>년 </a:t>
                       </a:r>
                       <a:r>
-                        <a:rPr lang="en-US" altLang="ko-KR" sz="1200" b="0" dirty="0" smtClean="0">
+                        <a:rPr lang="en-US" altLang="ko-KR" sz="1200" b="0" dirty="0">
                           <a:solidFill>
                             <a:schemeClr val="tx1"/>
                           </a:solidFill>
@@ -4608,7 +4575,7 @@
                         <a:t>05</a:t>
                       </a:r>
                       <a:r>
-                        <a:rPr lang="ko-KR" altLang="en-US" sz="1200" b="0" dirty="0" smtClean="0">
+                        <a:rPr lang="ko-KR" altLang="en-US" sz="1200" b="0" dirty="0">
                           <a:solidFill>
                             <a:schemeClr val="tx1"/>
                           </a:solidFill>
@@ -4618,7 +4585,7 @@
                         <a:t>월 </a:t>
                       </a:r>
                       <a:r>
-                        <a:rPr lang="en-US" altLang="ko-KR" sz="1200" b="0" dirty="0" smtClean="0">
+                        <a:rPr lang="en-US" altLang="ko-KR" sz="1200" b="0" dirty="0">
                           <a:solidFill>
                             <a:schemeClr val="tx1"/>
                           </a:solidFill>
@@ -4628,7 +4595,7 @@
                         <a:t>25</a:t>
                       </a:r>
                       <a:r>
-                        <a:rPr lang="ko-KR" altLang="en-US" sz="1200" b="0" dirty="0" smtClean="0">
+                        <a:rPr lang="ko-KR" altLang="en-US" sz="1200" b="0" dirty="0">
                           <a:solidFill>
                             <a:schemeClr val="tx1"/>
                           </a:solidFill>
@@ -4636,6 +4603,30 @@
                           <a:ea typeface="맑은 고딕" pitchFamily="50" charset="-127"/>
                         </a:rPr>
                         <a:t>일</a:t>
+                      </a:r>
+                    </a:p>
+                  </a:txBody>
+                  <a:tcPr anchor="ctr">
+                    <a:solidFill>
+                      <a:schemeClr val="bg1"/>
+                    </a:solidFill>
+                  </a:tcPr>
+                </a:tc>
+                <a:tc>
+                  <a:txBody>
+                    <a:bodyPr/>
+                    <a:lstStyle/>
+                    <a:p>
+                      <a:pPr algn="ctr" latinLnBrk="1"/>
+                      <a:r>
+                        <a:rPr lang="en-US" altLang="ko-KR" sz="1200" b="0" dirty="0">
+                          <a:solidFill>
+                            <a:schemeClr val="tx1"/>
+                          </a:solidFill>
+                          <a:latin typeface="맑은 고딕" pitchFamily="50" charset="-127"/>
+                          <a:ea typeface="맑은 고딕" pitchFamily="50" charset="-127"/>
+                        </a:rPr>
+                        <a:t>05</a:t>
                       </a:r>
                       <a:endParaRPr lang="ko-KR" altLang="en-US" sz="1200" b="0" dirty="0">
                         <a:solidFill>
@@ -4659,7 +4650,82 @@
                     <a:p>
                       <a:pPr algn="ctr" latinLnBrk="1"/>
                       <a:r>
-                        <a:rPr lang="en-US" altLang="ko-KR" sz="1200" b="0" dirty="0" smtClean="0">
+                        <a:rPr lang="ko-KR" altLang="en-US" sz="1200" b="0" dirty="0">
+                          <a:solidFill>
+                            <a:schemeClr val="tx1"/>
+                          </a:solidFill>
+                          <a:latin typeface="맑은 고딕" pitchFamily="50" charset="-127"/>
+                          <a:ea typeface="맑은 고딕" pitchFamily="50" charset="-127"/>
+                        </a:rPr>
+                        <a:t>최종 검토</a:t>
+                      </a:r>
+                    </a:p>
+                  </a:txBody>
+                  <a:tcPr anchor="ctr">
+                    <a:solidFill>
+                      <a:schemeClr val="bg1"/>
+                    </a:solidFill>
+                  </a:tcPr>
+                </a:tc>
+                <a:tc>
+                  <a:txBody>
+                    <a:bodyPr/>
+                    <a:lstStyle/>
+                    <a:p>
+                      <a:pPr algn="ctr" latinLnBrk="1"/>
+                      <a:r>
+                        <a:rPr lang="ko-KR" altLang="en-US" sz="1200" b="0" dirty="0">
+                          <a:solidFill>
+                            <a:schemeClr val="tx1"/>
+                          </a:solidFill>
+                          <a:latin typeface="맑은 고딕" pitchFamily="50" charset="-127"/>
+                          <a:ea typeface="맑은 고딕" pitchFamily="50" charset="-127"/>
+                        </a:rPr>
+                        <a:t>김태현</a:t>
+                      </a:r>
+                    </a:p>
+                  </a:txBody>
+                  <a:tcPr anchor="ctr">
+                    <a:solidFill>
+                      <a:schemeClr val="bg1"/>
+                    </a:solidFill>
+                  </a:tcPr>
+                </a:tc>
+                <a:extLst>
+                  <a:ext uri="{0D108BD9-81ED-4DB2-BD59-A6C34878D82A}">
+                    <a16:rowId xmlns:a16="http://schemas.microsoft.com/office/drawing/2014/main" val="10006"/>
+                  </a:ext>
+                </a:extLst>
+              </a:tr>
+              <a:tr h="370840">
+                <a:tc>
+                  <a:txBody>
+                    <a:bodyPr/>
+                    <a:lstStyle/>
+                    <a:p>
+                      <a:pPr algn="ctr" latinLnBrk="1"/>
+                      <a:r>
+                        <a:rPr lang="en-US" altLang="ko-KR" sz="1200" b="0" dirty="0">
+                          <a:solidFill>
+                            <a:schemeClr val="tx1"/>
+                          </a:solidFill>
+                          <a:latin typeface="맑은 고딕" pitchFamily="50" charset="-127"/>
+                          <a:ea typeface="맑은 고딕" pitchFamily="50" charset="-127"/>
+                        </a:rPr>
+                        <a:t>2017</a:t>
+                      </a:r>
+                      <a:r>
+                        <a:rPr lang="ko-KR" altLang="en-US" sz="1200" b="0" dirty="0">
+                          <a:solidFill>
+                            <a:schemeClr val="tx1"/>
+                          </a:solidFill>
+                          <a:latin typeface="맑은 고딕" pitchFamily="50" charset="-127"/>
+                          <a:ea typeface="맑은 고딕" pitchFamily="50" charset="-127"/>
+                        </a:rPr>
+                        <a:t>년 </a:t>
+                      </a:r>
+                      <a:r>
+                        <a:rPr lang="en-US" altLang="ko-KR" sz="1200" b="0" dirty="0">
                           <a:solidFill>
                             <a:schemeClr val="tx1"/>
                           </a:solidFill>
@@ -4667,6 +4733,220 @@
                           <a:ea typeface="맑은 고딕" pitchFamily="50" charset="-127"/>
                         </a:rPr>
                         <a:t>05</a:t>
+                      </a:r>
+                      <a:r>
+                        <a:rPr lang="ko-KR" altLang="en-US" sz="1200" b="0" dirty="0">
+                          <a:solidFill>
+                            <a:schemeClr val="tx1"/>
+                          </a:solidFill>
+                          <a:latin typeface="맑은 고딕" pitchFamily="50" charset="-127"/>
+                          <a:ea typeface="맑은 고딕" pitchFamily="50" charset="-127"/>
+                        </a:rPr>
+                        <a:t>월 </a:t>
+                      </a:r>
+                      <a:r>
+                        <a:rPr lang="en-US" altLang="ko-KR" sz="1200" b="0" dirty="0">
+                          <a:solidFill>
+                            <a:schemeClr val="tx1"/>
+                          </a:solidFill>
+                          <a:latin typeface="맑은 고딕" pitchFamily="50" charset="-127"/>
+                          <a:ea typeface="맑은 고딕" pitchFamily="50" charset="-127"/>
+                        </a:rPr>
+                        <a:t>25</a:t>
+                      </a:r>
+                      <a:r>
+                        <a:rPr lang="ko-KR" altLang="en-US" sz="1200" b="0" dirty="0">
+                          <a:solidFill>
+                            <a:schemeClr val="tx1"/>
+                          </a:solidFill>
+                          <a:latin typeface="맑은 고딕" pitchFamily="50" charset="-127"/>
+                          <a:ea typeface="맑은 고딕" pitchFamily="50" charset="-127"/>
+                        </a:rPr>
+                        <a:t>일</a:t>
+                      </a:r>
+                    </a:p>
+                  </a:txBody>
+                  <a:tcPr anchor="ctr">
+                    <a:solidFill>
+                      <a:schemeClr val="bg1"/>
+                    </a:solidFill>
+                  </a:tcPr>
+                </a:tc>
+                <a:tc>
+                  <a:txBody>
+                    <a:bodyPr/>
+                    <a:lstStyle/>
+                    <a:p>
+                      <a:pPr algn="ctr" latinLnBrk="1"/>
+                      <a:r>
+                        <a:rPr lang="ko-KR" altLang="en-US" sz="1200" b="0" dirty="0">
+                          <a:solidFill>
+                            <a:schemeClr val="tx1"/>
+                          </a:solidFill>
+                          <a:latin typeface="맑은 고딕" pitchFamily="50" charset="-127"/>
+                          <a:ea typeface="맑은 고딕" pitchFamily="50" charset="-127"/>
+                        </a:rPr>
+                        <a:t>최종</a:t>
+                      </a:r>
+                    </a:p>
+                  </a:txBody>
+                  <a:tcPr anchor="ctr">
+                    <a:solidFill>
+                      <a:schemeClr val="bg1"/>
+                    </a:solidFill>
+                  </a:tcPr>
+                </a:tc>
+                <a:tc>
+                  <a:txBody>
+                    <a:bodyPr/>
+                    <a:lstStyle/>
+                    <a:p>
+                      <a:pPr algn="ctr" latinLnBrk="1"/>
+                      <a:r>
+                        <a:rPr lang="ko-KR" altLang="en-US" sz="1200" b="0" dirty="0">
+                          <a:solidFill>
+                            <a:schemeClr val="tx1"/>
+                          </a:solidFill>
+                          <a:latin typeface="맑은 고딕" pitchFamily="50" charset="-127"/>
+                          <a:ea typeface="맑은 고딕" pitchFamily="50" charset="-127"/>
+                        </a:rPr>
+                        <a:t>최종 제출</a:t>
+                      </a:r>
+                    </a:p>
+                  </a:txBody>
+                  <a:tcPr anchor="ctr">
+                    <a:solidFill>
+                      <a:schemeClr val="bg1"/>
+                    </a:solidFill>
+                  </a:tcPr>
+                </a:tc>
+                <a:tc>
+                  <a:txBody>
+                    <a:bodyPr/>
+                    <a:lstStyle/>
+                    <a:p>
+                      <a:pPr algn="ctr" latinLnBrk="1"/>
+                      <a:r>
+                        <a:rPr lang="ko-KR" altLang="en-US" sz="1200" b="0" dirty="0">
+                          <a:solidFill>
+                            <a:schemeClr val="tx1"/>
+                          </a:solidFill>
+                          <a:latin typeface="맑은 고딕" pitchFamily="50" charset="-127"/>
+                          <a:ea typeface="맑은 고딕" pitchFamily="50" charset="-127"/>
+                        </a:rPr>
+                        <a:t>김태현</a:t>
+                      </a:r>
+                      <a:endParaRPr lang="en-US" altLang="ko-KR" sz="1200" b="0" dirty="0">
+                        <a:solidFill>
+                          <a:schemeClr val="tx1"/>
+                        </a:solidFill>
+                        <a:latin typeface="맑은 고딕" pitchFamily="50" charset="-127"/>
+                        <a:ea typeface="맑은 고딕" pitchFamily="50" charset="-127"/>
+                      </a:endParaRPr>
+                    </a:p>
+                  </a:txBody>
+                  <a:tcPr anchor="ctr">
+                    <a:solidFill>
+                      <a:schemeClr val="bg1"/>
+                    </a:solidFill>
+                  </a:tcPr>
+                </a:tc>
+                <a:extLst>
+                  <a:ext uri="{0D108BD9-81ED-4DB2-BD59-A6C34878D82A}">
+                    <a16:rowId xmlns:a16="http://schemas.microsoft.com/office/drawing/2014/main" val="10007"/>
+                  </a:ext>
+                </a:extLst>
+              </a:tr>
+              <a:tr h="370840">
+                <a:tc>
+                  <a:txBody>
+                    <a:bodyPr/>
+                    <a:lstStyle/>
+                    <a:p>
+                      <a:pPr algn="ctr" latinLnBrk="1"/>
+                      <a:r>
+                        <a:rPr lang="en-US" altLang="ko-KR" sz="1200" b="0" dirty="0">
+                          <a:solidFill>
+                            <a:schemeClr val="tx1"/>
+                          </a:solidFill>
+                          <a:latin typeface="맑은 고딕" pitchFamily="50" charset="-127"/>
+                          <a:ea typeface="맑은 고딕" pitchFamily="50" charset="-127"/>
+                        </a:rPr>
+                        <a:t>2017</a:t>
+                      </a:r>
+                      <a:r>
+                        <a:rPr lang="ko-KR" altLang="en-US" sz="1200" b="0" dirty="0">
+                          <a:solidFill>
+                            <a:schemeClr val="tx1"/>
+                          </a:solidFill>
+                          <a:latin typeface="맑은 고딕" pitchFamily="50" charset="-127"/>
+                          <a:ea typeface="맑은 고딕" pitchFamily="50" charset="-127"/>
+                        </a:rPr>
+                        <a:t>년 </a:t>
+                      </a:r>
+                      <a:r>
+                        <a:rPr lang="en-US" altLang="ko-KR" sz="1200" b="0" dirty="0">
+                          <a:solidFill>
+                            <a:schemeClr val="tx1"/>
+                          </a:solidFill>
+                          <a:latin typeface="맑은 고딕" pitchFamily="50" charset="-127"/>
+                          <a:ea typeface="맑은 고딕" pitchFamily="50" charset="-127"/>
+                        </a:rPr>
+                        <a:t>6</a:t>
+                      </a:r>
+                      <a:r>
+                        <a:rPr lang="ko-KR" altLang="en-US" sz="1200" b="0" dirty="0">
+                          <a:solidFill>
+                            <a:schemeClr val="tx1"/>
+                          </a:solidFill>
+                          <a:latin typeface="맑은 고딕" pitchFamily="50" charset="-127"/>
+                          <a:ea typeface="맑은 고딕" pitchFamily="50" charset="-127"/>
+                        </a:rPr>
+                        <a:t>월 </a:t>
+                      </a:r>
+                      <a:r>
+                        <a:rPr lang="en-US" altLang="ko-KR" sz="1200" b="0" dirty="0">
+                          <a:solidFill>
+                            <a:schemeClr val="tx1"/>
+                          </a:solidFill>
+                          <a:latin typeface="맑은 고딕" pitchFamily="50" charset="-127"/>
+                          <a:ea typeface="맑은 고딕" pitchFamily="50" charset="-127"/>
+                        </a:rPr>
+                        <a:t>04</a:t>
+                      </a:r>
+                      <a:r>
+                        <a:rPr lang="ko-KR" altLang="en-US" sz="1200" b="0" dirty="0">
+                          <a:solidFill>
+                            <a:schemeClr val="tx1"/>
+                          </a:solidFill>
+                          <a:latin typeface="맑은 고딕" pitchFamily="50" charset="-127"/>
+                          <a:ea typeface="맑은 고딕" pitchFamily="50" charset="-127"/>
+                        </a:rPr>
+                        <a:t>일</a:t>
+                      </a:r>
+                    </a:p>
+                  </a:txBody>
+                  <a:tcPr anchor="ctr">
+                    <a:solidFill>
+                      <a:schemeClr val="bg1"/>
+                    </a:solidFill>
+                  </a:tcPr>
+                </a:tc>
+                <a:tc>
+                  <a:txBody>
+                    <a:bodyPr/>
+                    <a:lstStyle/>
+                    <a:p>
+                      <a:pPr algn="ctr" latinLnBrk="1"/>
+                      <a:r>
+                        <a:rPr lang="en-US" altLang="ko-KR" sz="1200" b="0" dirty="0">
+                          <a:solidFill>
+                            <a:schemeClr val="tx1"/>
+                          </a:solidFill>
+                          <a:latin typeface="맑은 고딕" pitchFamily="50" charset="-127"/>
+                          <a:ea typeface="맑은 고딕" pitchFamily="50" charset="-127"/>
+                        </a:rPr>
+                        <a:t>01</a:t>
                       </a:r>
                       <a:endParaRPr lang="ko-KR" altLang="en-US" sz="1200" b="0" dirty="0">
                         <a:solidFill>
@@ -4690,22 +4970,85 @@
                     <a:p>
                       <a:pPr algn="ctr" latinLnBrk="1"/>
                       <a:r>
-                        <a:rPr lang="ko-KR" altLang="en-US" sz="1200" b="0" dirty="0" smtClean="0">
-                          <a:solidFill>
-                            <a:schemeClr val="tx1"/>
-                          </a:solidFill>
-                          <a:latin typeface="맑은 고딕" pitchFamily="50" charset="-127"/>
-                          <a:ea typeface="맑은 고딕" pitchFamily="50" charset="-127"/>
-                        </a:rPr>
-                        <a:t>최종 검토</a:t>
-                      </a:r>
-                      <a:endParaRPr lang="ko-KR" altLang="en-US" sz="1200" b="0" dirty="0">
-                        <a:solidFill>
-                          <a:schemeClr val="tx1"/>
-                        </a:solidFill>
-                        <a:latin typeface="맑은 고딕" pitchFamily="50" charset="-127"/>
-                        <a:ea typeface="맑은 고딕" pitchFamily="50" charset="-127"/>
-                      </a:endParaRPr>
+                        <a:rPr lang="ko-KR" altLang="en-US" sz="1200" b="0" dirty="0">
+                          <a:solidFill>
+                            <a:schemeClr val="tx1"/>
+                          </a:solidFill>
+                          <a:latin typeface="맑은 고딕" pitchFamily="50" charset="-127"/>
+                          <a:ea typeface="맑은 고딕" pitchFamily="50" charset="-127"/>
+                        </a:rPr>
+                        <a:t>요구사항 변경에 따른 전체 </a:t>
+                      </a:r>
+                      <a:r>
+                        <a:rPr lang="en-US" altLang="ko-KR" sz="1200" b="0" dirty="0">
+                          <a:solidFill>
+                            <a:schemeClr val="tx1"/>
+                          </a:solidFill>
+                          <a:latin typeface="맑은 고딕" pitchFamily="50" charset="-127"/>
+                          <a:ea typeface="맑은 고딕" pitchFamily="50" charset="-127"/>
+                        </a:rPr>
+                        <a:t>Class</a:t>
+                      </a:r>
+                      <a:r>
+                        <a:rPr lang="ko-KR" altLang="en-US" sz="1200" b="0">
+                          <a:solidFill>
+                            <a:schemeClr val="tx1"/>
+                          </a:solidFill>
+                          <a:latin typeface="맑은 고딕" pitchFamily="50" charset="-127"/>
+                          <a:ea typeface="맑은 고딕" pitchFamily="50" charset="-127"/>
+                        </a:rPr>
+                        <a:t> </a:t>
+                      </a:r>
+                      <a:r>
+                        <a:rPr lang="en-US" altLang="ko-KR" sz="1200" b="0">
+                          <a:solidFill>
+                            <a:schemeClr val="tx1"/>
+                          </a:solidFill>
+                          <a:latin typeface="맑은 고딕" pitchFamily="50" charset="-127"/>
+                          <a:ea typeface="맑은 고딕" pitchFamily="50" charset="-127"/>
+                        </a:rPr>
+                        <a:t>Design</a:t>
+                      </a:r>
+                      <a:r>
+                        <a:rPr lang="en-US" altLang="ko-KR" sz="1200" b="0" dirty="0">
+                          <a:solidFill>
+                            <a:schemeClr val="tx1"/>
+                          </a:solidFill>
+                          <a:latin typeface="맑은 고딕" pitchFamily="50" charset="-127"/>
+                          <a:ea typeface="맑은 고딕" pitchFamily="50" charset="-127"/>
+                        </a:rPr>
+                        <a:t>, </a:t>
+                      </a:r>
+                      <a:r>
+                        <a:rPr lang="en-US" altLang="ko-KR" sz="1200" b="0" dirty="0" err="1">
+                          <a:solidFill>
+                            <a:schemeClr val="tx1"/>
+                          </a:solidFill>
+                          <a:latin typeface="맑은 고딕" pitchFamily="50" charset="-127"/>
+                          <a:ea typeface="맑은 고딕" pitchFamily="50" charset="-127"/>
+                        </a:rPr>
+                        <a:t>MainFrame</a:t>
+                      </a:r>
+                      <a:r>
+                        <a:rPr lang="en-US" altLang="ko-KR" sz="1200" b="0" dirty="0">
+                          <a:solidFill>
+                            <a:schemeClr val="tx1"/>
+                          </a:solidFill>
+                          <a:latin typeface="맑은 고딕" pitchFamily="50" charset="-127"/>
+                          <a:ea typeface="맑은 고딕" pitchFamily="50" charset="-127"/>
+                        </a:rPr>
+                        <a:t> </a:t>
+                      </a:r>
+                      <a:r>
+                        <a:rPr lang="ko-KR" altLang="en-US" sz="1200" b="0" dirty="0">
+                          <a:solidFill>
+                            <a:schemeClr val="tx1"/>
+                          </a:solidFill>
+                          <a:latin typeface="맑은 고딕" pitchFamily="50" charset="-127"/>
+                          <a:ea typeface="맑은 고딕" pitchFamily="50" charset="-127"/>
+                        </a:rPr>
+                        <a:t>변경</a:t>
+                      </a:r>
                     </a:p>
                   </a:txBody>
                   <a:tcPr anchor="ctr">
@@ -4721,16 +5064,16 @@
                     <a:p>
                       <a:pPr algn="ctr" latinLnBrk="1"/>
                       <a:r>
-                        <a:rPr lang="ko-KR" altLang="en-US" sz="1200" b="0" dirty="0" smtClean="0">
-                          <a:solidFill>
-                            <a:schemeClr val="tx1"/>
-                          </a:solidFill>
-                          <a:latin typeface="맑은 고딕" pitchFamily="50" charset="-127"/>
-                          <a:ea typeface="맑은 고딕" pitchFamily="50" charset="-127"/>
-                        </a:rPr>
-                        <a:t>김태현</a:t>
-                      </a:r>
-                      <a:endParaRPr lang="ko-KR" altLang="en-US" sz="1200" b="0" dirty="0">
+                        <a:rPr lang="ko-KR" altLang="en-US" sz="1200" b="0" dirty="0" err="1">
+                          <a:solidFill>
+                            <a:schemeClr val="tx1"/>
+                          </a:solidFill>
+                          <a:latin typeface="맑은 고딕" pitchFamily="50" charset="-127"/>
+                          <a:ea typeface="맑은 고딕" pitchFamily="50" charset="-127"/>
+                        </a:rPr>
+                        <a:t>김주민</a:t>
+                      </a:r>
+                      <a:endParaRPr lang="en-US" altLang="ko-KR" sz="1200" b="0" dirty="0">
                         <a:solidFill>
                           <a:schemeClr val="tx1"/>
                         </a:solidFill>
@@ -4747,188 +5090,7 @@
                 </a:tc>
                 <a:extLst>
                   <a:ext uri="{0D108BD9-81ED-4DB2-BD59-A6C34878D82A}">
-                    <a16:rowId xmlns="" xmlns:a16="http://schemas.microsoft.com/office/drawing/2014/main" val="10006"/>
-                  </a:ext>
-                </a:extLst>
-              </a:tr>
-              <a:tr h="370840">
-                <a:tc>
-                  <a:txBody>
-                    <a:bodyPr/>
-                    <a:lstStyle/>
-                    <a:p>
-                      <a:pPr algn="ctr" latinLnBrk="1"/>
-                      <a:r>
-                        <a:rPr lang="en-US" altLang="ko-KR" sz="1200" b="0" dirty="0" smtClean="0">
-                          <a:solidFill>
-                            <a:schemeClr val="tx1"/>
-                          </a:solidFill>
-                          <a:latin typeface="맑은 고딕" pitchFamily="50" charset="-127"/>
-                          <a:ea typeface="맑은 고딕" pitchFamily="50" charset="-127"/>
-                        </a:rPr>
-                        <a:t>2017</a:t>
-                      </a:r>
-                      <a:r>
-                        <a:rPr lang="ko-KR" altLang="en-US" sz="1200" b="0" dirty="0" smtClean="0">
-                          <a:solidFill>
-                            <a:schemeClr val="tx1"/>
-                          </a:solidFill>
-                          <a:latin typeface="맑은 고딕" pitchFamily="50" charset="-127"/>
-                          <a:ea typeface="맑은 고딕" pitchFamily="50" charset="-127"/>
-                        </a:rPr>
-                        <a:t>년 </a:t>
-                      </a:r>
-                      <a:r>
-                        <a:rPr lang="en-US" altLang="ko-KR" sz="1200" b="0" dirty="0" smtClean="0">
-                          <a:solidFill>
-                            <a:schemeClr val="tx1"/>
-                          </a:solidFill>
-                          <a:latin typeface="맑은 고딕" pitchFamily="50" charset="-127"/>
-                          <a:ea typeface="맑은 고딕" pitchFamily="50" charset="-127"/>
-                        </a:rPr>
-                        <a:t>05</a:t>
-                      </a:r>
-                      <a:r>
-                        <a:rPr lang="ko-KR" altLang="en-US" sz="1200" b="0" dirty="0" smtClean="0">
-                          <a:solidFill>
-                            <a:schemeClr val="tx1"/>
-                          </a:solidFill>
-                          <a:latin typeface="맑은 고딕" pitchFamily="50" charset="-127"/>
-                          <a:ea typeface="맑은 고딕" pitchFamily="50" charset="-127"/>
-                        </a:rPr>
-                        <a:t>월 </a:t>
-                      </a:r>
-                      <a:r>
-                        <a:rPr lang="en-US" altLang="ko-KR" sz="1200" b="0" dirty="0" smtClean="0">
-                          <a:solidFill>
-                            <a:schemeClr val="tx1"/>
-                          </a:solidFill>
-                          <a:latin typeface="맑은 고딕" pitchFamily="50" charset="-127"/>
-                          <a:ea typeface="맑은 고딕" pitchFamily="50" charset="-127"/>
-                        </a:rPr>
-                        <a:t>25</a:t>
-                      </a:r>
-                      <a:r>
-                        <a:rPr lang="ko-KR" altLang="en-US" sz="1200" b="0" dirty="0" smtClean="0">
-                          <a:solidFill>
-                            <a:schemeClr val="tx1"/>
-                          </a:solidFill>
-                          <a:latin typeface="맑은 고딕" pitchFamily="50" charset="-127"/>
-                          <a:ea typeface="맑은 고딕" pitchFamily="50" charset="-127"/>
-                        </a:rPr>
-                        <a:t>일</a:t>
-                      </a:r>
-                      <a:endParaRPr lang="ko-KR" altLang="en-US" sz="1200" b="0" dirty="0">
-                        <a:solidFill>
-                          <a:schemeClr val="tx1"/>
-                        </a:solidFill>
-                        <a:latin typeface="맑은 고딕" pitchFamily="50" charset="-127"/>
-                        <a:ea typeface="맑은 고딕" pitchFamily="50" charset="-127"/>
-                      </a:endParaRPr>
-                    </a:p>
-                  </a:txBody>
-                  <a:tcPr anchor="ctr">
-                    <a:solidFill>
-                      <a:schemeClr val="bg1"/>
-                    </a:solidFill>
-                  </a:tcPr>
-                </a:tc>
-                <a:tc>
-                  <a:txBody>
-                    <a:bodyPr/>
-                    <a:lstStyle/>
-                    <a:p>
-                      <a:pPr algn="ctr" latinLnBrk="1"/>
-                      <a:r>
-                        <a:rPr lang="ko-KR" altLang="en-US" sz="1200" b="0" dirty="0" smtClean="0">
-                          <a:solidFill>
-                            <a:schemeClr val="tx1"/>
-                          </a:solidFill>
-                          <a:latin typeface="맑은 고딕" pitchFamily="50" charset="-127"/>
-                          <a:ea typeface="맑은 고딕" pitchFamily="50" charset="-127"/>
-                        </a:rPr>
-                        <a:t>최종</a:t>
-                      </a:r>
-                      <a:endParaRPr lang="ko-KR" altLang="en-US" sz="1200" b="0" dirty="0">
-                        <a:solidFill>
-                          <a:schemeClr val="tx1"/>
-                        </a:solidFill>
-                        <a:latin typeface="맑은 고딕" pitchFamily="50" charset="-127"/>
-                        <a:ea typeface="맑은 고딕" pitchFamily="50" charset="-127"/>
-                      </a:endParaRPr>
-                    </a:p>
-                  </a:txBody>
-                  <a:tcPr anchor="ctr">
-                    <a:solidFill>
-                      <a:schemeClr val="bg1"/>
-                    </a:solidFill>
-                  </a:tcPr>
-                </a:tc>
-                <a:tc>
-                  <a:txBody>
-                    <a:bodyPr/>
-                    <a:lstStyle/>
-                    <a:p>
-                      <a:pPr algn="ctr" latinLnBrk="1"/>
-                      <a:r>
-                        <a:rPr lang="ko-KR" altLang="en-US" sz="1200" b="0" dirty="0" smtClean="0">
-                          <a:solidFill>
-                            <a:schemeClr val="tx1"/>
-                          </a:solidFill>
-                          <a:latin typeface="맑은 고딕" pitchFamily="50" charset="-127"/>
-                          <a:ea typeface="맑은 고딕" pitchFamily="50" charset="-127"/>
-                        </a:rPr>
-                        <a:t>최종 제출</a:t>
-                      </a:r>
-                      <a:endParaRPr lang="ko-KR" altLang="en-US" sz="1200" b="0" dirty="0">
-                        <a:solidFill>
-                          <a:schemeClr val="tx1"/>
-                        </a:solidFill>
-                        <a:latin typeface="맑은 고딕" pitchFamily="50" charset="-127"/>
-                        <a:ea typeface="맑은 고딕" pitchFamily="50" charset="-127"/>
-                      </a:endParaRPr>
-                    </a:p>
-                  </a:txBody>
-                  <a:tcPr anchor="ctr">
-                    <a:solidFill>
-                      <a:schemeClr val="bg1"/>
-                    </a:solidFill>
-                  </a:tcPr>
-                </a:tc>
-                <a:tc>
-                  <a:txBody>
-                    <a:bodyPr/>
-                    <a:lstStyle/>
-                    <a:p>
-                      <a:pPr algn="ctr" latinLnBrk="1"/>
-                      <a:r>
-                        <a:rPr lang="ko-KR" altLang="en-US" sz="1200" b="0" dirty="0" smtClean="0">
-                          <a:solidFill>
-                            <a:schemeClr val="tx1"/>
-                          </a:solidFill>
-                          <a:latin typeface="맑은 고딕" pitchFamily="50" charset="-127"/>
-                          <a:ea typeface="맑은 고딕" pitchFamily="50" charset="-127"/>
-                        </a:rPr>
-                        <a:t>김태현</a:t>
-                      </a:r>
-                      <a:endParaRPr lang="ko-KR" altLang="en-US" sz="1200" b="0" dirty="0">
-                        <a:solidFill>
-                          <a:schemeClr val="tx1"/>
-                        </a:solidFill>
-                        <a:latin typeface="맑은 고딕" pitchFamily="50" charset="-127"/>
-                        <a:ea typeface="맑은 고딕" pitchFamily="50" charset="-127"/>
-                      </a:endParaRPr>
-                    </a:p>
-                  </a:txBody>
-                  <a:tcPr anchor="ctr">
-                    <a:solidFill>
-                      <a:schemeClr val="bg1"/>
-                    </a:solidFill>
-                  </a:tcPr>
-                </a:tc>
-                <a:extLst>
-                  <a:ext uri="{0D108BD9-81ED-4DB2-BD59-A6C34878D82A}">
-                    <a16:rowId xmlns="" xmlns:a16="http://schemas.microsoft.com/office/drawing/2014/main" val="10007"/>
+                    <a16:rowId xmlns:a16="http://schemas.microsoft.com/office/drawing/2014/main" val="3450764579"/>
                   </a:ext>
                 </a:extLst>
               </a:tr>
@@ -4986,7 +5148,13 @@
       </p:sp>
       <p:pic>
         <p:nvPicPr>
-          <p:cNvPr id="5" name="그림 4"/>
+          <p:cNvPr id="9" name="그림 8">
+            <a:extLst>
+              <a:ext uri="{FF2B5EF4-FFF2-40B4-BE49-F238E27FC236}">
+                <a16:creationId xmlns:a16="http://schemas.microsoft.com/office/drawing/2014/main" id="{C3BFB4A3-DFFD-4574-AF0F-155B7469C48D}"/>
+              </a:ext>
+            </a:extLst>
+          </p:cNvPr>
           <p:cNvPicPr>
             <a:picLocks noChangeAspect="1"/>
           </p:cNvPicPr>
@@ -5000,8 +5168,8 @@
         </p:blipFill>
         <p:spPr>
           <a:xfrm>
-            <a:off x="1537301" y="769434"/>
-            <a:ext cx="6246250" cy="5694866"/>
+            <a:off x="1587207" y="742950"/>
+            <a:ext cx="6365792" cy="5802313"/>
           </a:xfrm>
           <a:prstGeom prst="rect">
             <a:avLst/>
@@ -5058,7 +5226,13 @@
       </p:sp>
       <p:pic>
         <p:nvPicPr>
-          <p:cNvPr id="4" name="그림 3"/>
+          <p:cNvPr id="3" name="그림 2">
+            <a:extLst>
+              <a:ext uri="{FF2B5EF4-FFF2-40B4-BE49-F238E27FC236}">
+                <a16:creationId xmlns:a16="http://schemas.microsoft.com/office/drawing/2014/main" id="{8D92676A-0247-4627-B406-FD10543381C3}"/>
+              </a:ext>
+            </a:extLst>
+          </p:cNvPr>
           <p:cNvPicPr>
             <a:picLocks noChangeAspect="1"/>
           </p:cNvPicPr>
@@ -5072,8 +5246,8 @@
         </p:blipFill>
         <p:spPr>
           <a:xfrm>
-            <a:off x="167268" y="935479"/>
-            <a:ext cx="8787161" cy="5198132"/>
+            <a:off x="185421" y="914400"/>
+            <a:ext cx="8771541" cy="5252219"/>
           </a:xfrm>
           <a:prstGeom prst="rect">
             <a:avLst/>
@@ -5083,7 +5257,7 @@
     </p:spTree>
     <p:extLst>
       <p:ext uri="{BB962C8B-B14F-4D97-AF65-F5344CB8AC3E}">
-        <p14:creationId xmlns="" xmlns:p14="http://schemas.microsoft.com/office/powerpoint/2010/main" val="1665250424"/>
+        <p14:creationId xmlns:p14="http://schemas.microsoft.com/office/powerpoint/2010/main" val="1665250424"/>
       </p:ext>
     </p:extLst>
   </p:cSld>
@@ -5160,7 +5334,7 @@
     </p:spTree>
     <p:extLst>
       <p:ext uri="{BB962C8B-B14F-4D97-AF65-F5344CB8AC3E}">
-        <p14:creationId xmlns="" xmlns:p14="http://schemas.microsoft.com/office/powerpoint/2010/main" val="632426846"/>
+        <p14:creationId xmlns:p14="http://schemas.microsoft.com/office/powerpoint/2010/main" val="632426846"/>
       </p:ext>
     </p:extLst>
   </p:cSld>
@@ -5237,7 +5411,7 @@
     </p:spTree>
     <p:extLst>
       <p:ext uri="{BB962C8B-B14F-4D97-AF65-F5344CB8AC3E}">
-        <p14:creationId xmlns="" xmlns:p14="http://schemas.microsoft.com/office/powerpoint/2010/main" val="3338057399"/>
+        <p14:creationId xmlns:p14="http://schemas.microsoft.com/office/powerpoint/2010/main" val="3338057399"/>
       </p:ext>
     </p:extLst>
   </p:cSld>
@@ -5314,7 +5488,7 @@
     </p:spTree>
     <p:extLst>
       <p:ext uri="{BB962C8B-B14F-4D97-AF65-F5344CB8AC3E}">
-        <p14:creationId xmlns="" xmlns:p14="http://schemas.microsoft.com/office/powerpoint/2010/main" val="4003923472"/>
+        <p14:creationId xmlns:p14="http://schemas.microsoft.com/office/powerpoint/2010/main" val="4003923472"/>
       </p:ext>
     </p:extLst>
   </p:cSld>
@@ -5391,7 +5565,7 @@
     </p:spTree>
     <p:extLst>
       <p:ext uri="{BB962C8B-B14F-4D97-AF65-F5344CB8AC3E}">
-        <p14:creationId xmlns="" xmlns:p14="http://schemas.microsoft.com/office/powerpoint/2010/main" val="683381687"/>
+        <p14:creationId xmlns:p14="http://schemas.microsoft.com/office/powerpoint/2010/main" val="683381687"/>
       </p:ext>
     </p:extLst>
   </p:cSld>
@@ -5468,7 +5642,7 @@
     </p:spTree>
     <p:extLst>
       <p:ext uri="{BB962C8B-B14F-4D97-AF65-F5344CB8AC3E}">
-        <p14:creationId xmlns="" xmlns:p14="http://schemas.microsoft.com/office/powerpoint/2010/main" val="77776264"/>
+        <p14:creationId xmlns:p14="http://schemas.microsoft.com/office/powerpoint/2010/main" val="77776264"/>
       </p:ext>
     </p:extLst>
   </p:cSld>

</xml_diff>